<commit_message>
Regroupement du prototype en un seul fichier projet, Réorganisation des dossiers
</commit_message>
<xml_diff>
--- a/Diagrammes/Scenarios - Schemas.pptx
+++ b/Diagrammes/Scenarios - Schemas.pptx
@@ -5,12 +5,17 @@
     <p:sldMasterId id="2147483648" r:id="rId1"/>
   </p:sldMasterIdLst>
   <p:notesMasterIdLst>
-    <p:notesMasterId r:id="rId5"/>
+    <p:notesMasterId r:id="rId10"/>
   </p:notesMasterIdLst>
   <p:sldIdLst>
     <p:sldId id="256" r:id="rId2"/>
-    <p:sldId id="258" r:id="rId3"/>
-    <p:sldId id="257" r:id="rId4"/>
+    <p:sldId id="259" r:id="rId3"/>
+    <p:sldId id="260" r:id="rId4"/>
+    <p:sldId id="261" r:id="rId5"/>
+    <p:sldId id="262" r:id="rId6"/>
+    <p:sldId id="258" r:id="rId7"/>
+    <p:sldId id="257" r:id="rId8"/>
+    <p:sldId id="263" r:id="rId9"/>
   </p:sldIdLst>
   <p:sldSz cx="9144000" cy="6858000" type="screen4x3"/>
   <p:notesSz cx="6858000" cy="9144000"/>
@@ -194,7 +199,7 @@
           <a:p>
             <a:fld id="{9DC360AA-BC29-41D1-BC41-D450D544EA21}" type="datetimeFigureOut">
               <a:rPr lang="fr-FR" smtClean="0"/>
-              <a:t>29/05/2013</a:t>
+              <a:t>04/06/2013</a:t>
             </a:fld>
             <a:endParaRPr lang="fr-FR"/>
           </a:p>
@@ -595,8 +600,13 @@
           <a:p>
             <a:r>
               <a:rPr lang="fr-FR" dirty="0" smtClean="0"/>
-              <a:t>Récupérer des informations sur un commerce (1/2)</a:t>
-            </a:r>
+              <a:t>Rechercher</a:t>
+            </a:r>
+            <a:r>
+              <a:rPr lang="fr-FR" baseline="0" dirty="0" smtClean="0"/>
+              <a:t> un commerce (1)</a:t>
+            </a:r>
+            <a:endParaRPr lang="fr-FR" dirty="0" smtClean="0"/>
           </a:p>
         </p:txBody>
       </p:sp>
@@ -680,6 +690,369 @@
           <a:bodyPr/>
           <a:lstStyle/>
           <a:p>
+            <a:r>
+              <a:rPr lang="fr-FR" dirty="0" smtClean="0"/>
+              <a:t>Rechercher</a:t>
+            </a:r>
+            <a:r>
+              <a:rPr lang="fr-FR" baseline="0" dirty="0" smtClean="0"/>
+              <a:t> un commerce (2)</a:t>
+            </a:r>
+            <a:endParaRPr lang="fr-FR" dirty="0" smtClean="0"/>
+          </a:p>
+        </p:txBody>
+      </p:sp>
+      <p:sp>
+        <p:nvSpPr>
+          <p:cNvPr id="4" name="Espace réservé du numéro de diapositive 3"/>
+          <p:cNvSpPr>
+            <a:spLocks noGrp="1"/>
+          </p:cNvSpPr>
+          <p:nvPr>
+            <p:ph type="sldNum" sz="quarter" idx="10"/>
+          </p:nvPr>
+        </p:nvSpPr>
+        <p:spPr/>
+        <p:txBody>
+          <a:bodyPr/>
+          <a:lstStyle/>
+          <a:p>
+            <a:fld id="{70C5B279-D8FA-4EB8-A0B5-CACAE048C97A}" type="slidenum">
+              <a:rPr lang="fr-FR" smtClean="0"/>
+              <a:t>3</a:t>
+            </a:fld>
+            <a:endParaRPr lang="fr-FR"/>
+          </a:p>
+        </p:txBody>
+      </p:sp>
+    </p:spTree>
+    <p:extLst>
+      <p:ext uri="{BB962C8B-B14F-4D97-AF65-F5344CB8AC3E}">
+        <p14:creationId xmlns:p14="http://schemas.microsoft.com/office/powerpoint/2010/main" val="2110943"/>
+      </p:ext>
+    </p:extLst>
+  </p:cSld>
+  <p:clrMapOvr>
+    <a:masterClrMapping/>
+  </p:clrMapOvr>
+</p:notes>
+</file>
+
+<file path=ppt/notesSlides/notesSlide4.xml><?xml version="1.0" encoding="utf-8"?>
+<p:notes xmlns:a="http://schemas.openxmlformats.org/drawingml/2006/main" xmlns:r="http://schemas.openxmlformats.org/officeDocument/2006/relationships" xmlns:p="http://schemas.openxmlformats.org/presentationml/2006/main">
+  <p:cSld>
+    <p:spTree>
+      <p:nvGrpSpPr>
+        <p:cNvPr id="1" name=""/>
+        <p:cNvGrpSpPr/>
+        <p:nvPr/>
+      </p:nvGrpSpPr>
+      <p:grpSpPr>
+        <a:xfrm>
+          <a:off x="0" y="0"/>
+          <a:ext cx="0" cy="0"/>
+          <a:chOff x="0" y="0"/>
+          <a:chExt cx="0" cy="0"/>
+        </a:xfrm>
+      </p:grpSpPr>
+      <p:sp>
+        <p:nvSpPr>
+          <p:cNvPr id="2" name="Espace réservé de l'image des diapositives 1"/>
+          <p:cNvSpPr>
+            <a:spLocks noGrp="1" noRot="1" noChangeAspect="1"/>
+          </p:cNvSpPr>
+          <p:nvPr>
+            <p:ph type="sldImg"/>
+          </p:nvPr>
+        </p:nvSpPr>
+        <p:spPr/>
+      </p:sp>
+      <p:sp>
+        <p:nvSpPr>
+          <p:cNvPr id="3" name="Espace réservé des commentaires 2"/>
+          <p:cNvSpPr>
+            <a:spLocks noGrp="1"/>
+          </p:cNvSpPr>
+          <p:nvPr>
+            <p:ph type="body" idx="1"/>
+          </p:nvPr>
+        </p:nvSpPr>
+        <p:spPr/>
+        <p:txBody>
+          <a:bodyPr/>
+          <a:lstStyle/>
+          <a:p>
+            <a:r>
+              <a:rPr lang="fr-FR" dirty="0" smtClean="0"/>
+              <a:t>Rechercher</a:t>
+            </a:r>
+            <a:r>
+              <a:rPr lang="fr-FR" baseline="0" dirty="0" smtClean="0"/>
+              <a:t> un commerce (2)</a:t>
+            </a:r>
+            <a:endParaRPr lang="fr-FR" dirty="0" smtClean="0"/>
+          </a:p>
+        </p:txBody>
+      </p:sp>
+      <p:sp>
+        <p:nvSpPr>
+          <p:cNvPr id="4" name="Espace réservé du numéro de diapositive 3"/>
+          <p:cNvSpPr>
+            <a:spLocks noGrp="1"/>
+          </p:cNvSpPr>
+          <p:nvPr>
+            <p:ph type="sldNum" sz="quarter" idx="10"/>
+          </p:nvPr>
+        </p:nvSpPr>
+        <p:spPr/>
+        <p:txBody>
+          <a:bodyPr/>
+          <a:lstStyle/>
+          <a:p>
+            <a:fld id="{70C5B279-D8FA-4EB8-A0B5-CACAE048C97A}" type="slidenum">
+              <a:rPr lang="fr-FR" smtClean="0"/>
+              <a:t>4</a:t>
+            </a:fld>
+            <a:endParaRPr lang="fr-FR"/>
+          </a:p>
+        </p:txBody>
+      </p:sp>
+    </p:spTree>
+    <p:extLst>
+      <p:ext uri="{BB962C8B-B14F-4D97-AF65-F5344CB8AC3E}">
+        <p14:creationId xmlns:p14="http://schemas.microsoft.com/office/powerpoint/2010/main" val="2110943"/>
+      </p:ext>
+    </p:extLst>
+  </p:cSld>
+  <p:clrMapOvr>
+    <a:masterClrMapping/>
+  </p:clrMapOvr>
+</p:notes>
+</file>
+
+<file path=ppt/notesSlides/notesSlide5.xml><?xml version="1.0" encoding="utf-8"?>
+<p:notes xmlns:a="http://schemas.openxmlformats.org/drawingml/2006/main" xmlns:r="http://schemas.openxmlformats.org/officeDocument/2006/relationships" xmlns:p="http://schemas.openxmlformats.org/presentationml/2006/main">
+  <p:cSld>
+    <p:spTree>
+      <p:nvGrpSpPr>
+        <p:cNvPr id="1" name=""/>
+        <p:cNvGrpSpPr/>
+        <p:nvPr/>
+      </p:nvGrpSpPr>
+      <p:grpSpPr>
+        <a:xfrm>
+          <a:off x="0" y="0"/>
+          <a:ext cx="0" cy="0"/>
+          <a:chOff x="0" y="0"/>
+          <a:chExt cx="0" cy="0"/>
+        </a:xfrm>
+      </p:grpSpPr>
+      <p:sp>
+        <p:nvSpPr>
+          <p:cNvPr id="2" name="Espace réservé de l'image des diapositives 1"/>
+          <p:cNvSpPr>
+            <a:spLocks noGrp="1" noRot="1" noChangeAspect="1"/>
+          </p:cNvSpPr>
+          <p:nvPr>
+            <p:ph type="sldImg"/>
+          </p:nvPr>
+        </p:nvSpPr>
+        <p:spPr/>
+      </p:sp>
+      <p:sp>
+        <p:nvSpPr>
+          <p:cNvPr id="3" name="Espace réservé des commentaires 2"/>
+          <p:cNvSpPr>
+            <a:spLocks noGrp="1"/>
+          </p:cNvSpPr>
+          <p:nvPr>
+            <p:ph type="body" idx="1"/>
+          </p:nvPr>
+        </p:nvSpPr>
+        <p:spPr/>
+        <p:txBody>
+          <a:bodyPr/>
+          <a:lstStyle/>
+          <a:p>
+            <a:r>
+              <a:rPr lang="fr-FR" dirty="0" smtClean="0"/>
+              <a:t>Rechercher</a:t>
+            </a:r>
+            <a:r>
+              <a:rPr lang="fr-FR" baseline="0" dirty="0" smtClean="0"/>
+              <a:t> un commerce (2)</a:t>
+            </a:r>
+            <a:endParaRPr lang="fr-FR" dirty="0" smtClean="0"/>
+          </a:p>
+        </p:txBody>
+      </p:sp>
+      <p:sp>
+        <p:nvSpPr>
+          <p:cNvPr id="4" name="Espace réservé du numéro de diapositive 3"/>
+          <p:cNvSpPr>
+            <a:spLocks noGrp="1"/>
+          </p:cNvSpPr>
+          <p:nvPr>
+            <p:ph type="sldNum" sz="quarter" idx="10"/>
+          </p:nvPr>
+        </p:nvSpPr>
+        <p:spPr/>
+        <p:txBody>
+          <a:bodyPr/>
+          <a:lstStyle/>
+          <a:p>
+            <a:fld id="{70C5B279-D8FA-4EB8-A0B5-CACAE048C97A}" type="slidenum">
+              <a:rPr lang="fr-FR" smtClean="0"/>
+              <a:t>5</a:t>
+            </a:fld>
+            <a:endParaRPr lang="fr-FR"/>
+          </a:p>
+        </p:txBody>
+      </p:sp>
+    </p:spTree>
+    <p:extLst>
+      <p:ext uri="{BB962C8B-B14F-4D97-AF65-F5344CB8AC3E}">
+        <p14:creationId xmlns:p14="http://schemas.microsoft.com/office/powerpoint/2010/main" val="2110943"/>
+      </p:ext>
+    </p:extLst>
+  </p:cSld>
+  <p:clrMapOvr>
+    <a:masterClrMapping/>
+  </p:clrMapOvr>
+</p:notes>
+</file>
+
+<file path=ppt/notesSlides/notesSlide6.xml><?xml version="1.0" encoding="utf-8"?>
+<p:notes xmlns:a="http://schemas.openxmlformats.org/drawingml/2006/main" xmlns:r="http://schemas.openxmlformats.org/officeDocument/2006/relationships" xmlns:p="http://schemas.openxmlformats.org/presentationml/2006/main">
+  <p:cSld>
+    <p:spTree>
+      <p:nvGrpSpPr>
+        <p:cNvPr id="1" name=""/>
+        <p:cNvGrpSpPr/>
+        <p:nvPr/>
+      </p:nvGrpSpPr>
+      <p:grpSpPr>
+        <a:xfrm>
+          <a:off x="0" y="0"/>
+          <a:ext cx="0" cy="0"/>
+          <a:chOff x="0" y="0"/>
+          <a:chExt cx="0" cy="0"/>
+        </a:xfrm>
+      </p:grpSpPr>
+      <p:sp>
+        <p:nvSpPr>
+          <p:cNvPr id="2" name="Espace réservé de l'image des diapositives 1"/>
+          <p:cNvSpPr>
+            <a:spLocks noGrp="1" noRot="1" noChangeAspect="1"/>
+          </p:cNvSpPr>
+          <p:nvPr>
+            <p:ph type="sldImg"/>
+          </p:nvPr>
+        </p:nvSpPr>
+        <p:spPr/>
+      </p:sp>
+      <p:sp>
+        <p:nvSpPr>
+          <p:cNvPr id="3" name="Espace réservé des commentaires 2"/>
+          <p:cNvSpPr>
+            <a:spLocks noGrp="1"/>
+          </p:cNvSpPr>
+          <p:nvPr>
+            <p:ph type="body" idx="1"/>
+          </p:nvPr>
+        </p:nvSpPr>
+        <p:spPr/>
+        <p:txBody>
+          <a:bodyPr/>
+          <a:lstStyle/>
+          <a:p>
+            <a:r>
+              <a:rPr lang="fr-FR" dirty="0" smtClean="0"/>
+              <a:t>Récupérer des informations sur un commerce (1/2)</a:t>
+            </a:r>
+          </a:p>
+        </p:txBody>
+      </p:sp>
+      <p:sp>
+        <p:nvSpPr>
+          <p:cNvPr id="4" name="Espace réservé du numéro de diapositive 3"/>
+          <p:cNvSpPr>
+            <a:spLocks noGrp="1"/>
+          </p:cNvSpPr>
+          <p:nvPr>
+            <p:ph type="sldNum" sz="quarter" idx="10"/>
+          </p:nvPr>
+        </p:nvSpPr>
+        <p:spPr/>
+        <p:txBody>
+          <a:bodyPr/>
+          <a:lstStyle/>
+          <a:p>
+            <a:fld id="{70C5B279-D8FA-4EB8-A0B5-CACAE048C97A}" type="slidenum">
+              <a:rPr lang="fr-FR" smtClean="0"/>
+              <a:t>6</a:t>
+            </a:fld>
+            <a:endParaRPr lang="fr-FR"/>
+          </a:p>
+        </p:txBody>
+      </p:sp>
+    </p:spTree>
+    <p:extLst>
+      <p:ext uri="{BB962C8B-B14F-4D97-AF65-F5344CB8AC3E}">
+        <p14:creationId xmlns:p14="http://schemas.microsoft.com/office/powerpoint/2010/main" val="2110943"/>
+      </p:ext>
+    </p:extLst>
+  </p:cSld>
+  <p:clrMapOvr>
+    <a:masterClrMapping/>
+  </p:clrMapOvr>
+</p:notes>
+</file>
+
+<file path=ppt/notesSlides/notesSlide7.xml><?xml version="1.0" encoding="utf-8"?>
+<p:notes xmlns:a="http://schemas.openxmlformats.org/drawingml/2006/main" xmlns:r="http://schemas.openxmlformats.org/officeDocument/2006/relationships" xmlns:p="http://schemas.openxmlformats.org/presentationml/2006/main">
+  <p:cSld>
+    <p:spTree>
+      <p:nvGrpSpPr>
+        <p:cNvPr id="1" name=""/>
+        <p:cNvGrpSpPr/>
+        <p:nvPr/>
+      </p:nvGrpSpPr>
+      <p:grpSpPr>
+        <a:xfrm>
+          <a:off x="0" y="0"/>
+          <a:ext cx="0" cy="0"/>
+          <a:chOff x="0" y="0"/>
+          <a:chExt cx="0" cy="0"/>
+        </a:xfrm>
+      </p:grpSpPr>
+      <p:sp>
+        <p:nvSpPr>
+          <p:cNvPr id="2" name="Espace réservé de l'image des diapositives 1"/>
+          <p:cNvSpPr>
+            <a:spLocks noGrp="1" noRot="1" noChangeAspect="1"/>
+          </p:cNvSpPr>
+          <p:nvPr>
+            <p:ph type="sldImg"/>
+          </p:nvPr>
+        </p:nvSpPr>
+        <p:spPr/>
+      </p:sp>
+      <p:sp>
+        <p:nvSpPr>
+          <p:cNvPr id="3" name="Espace réservé des commentaires 2"/>
+          <p:cNvSpPr>
+            <a:spLocks noGrp="1"/>
+          </p:cNvSpPr>
+          <p:nvPr>
+            <p:ph type="body" idx="1"/>
+          </p:nvPr>
+        </p:nvSpPr>
+        <p:spPr/>
+        <p:txBody>
+          <a:bodyPr/>
+          <a:lstStyle/>
+          <a:p>
             <a:pPr marL="0" marR="0" indent="0" algn="l" defTabSz="914400" rtl="0" eaLnBrk="1" fontAlgn="auto" latinLnBrk="0" hangingPunct="1">
               <a:lnSpc>
                 <a:spcPct val="100000"/>
@@ -721,7 +1094,7 @@
           <a:p>
             <a:fld id="{70C5B279-D8FA-4EB8-A0B5-CACAE048C97A}" type="slidenum">
               <a:rPr lang="fr-FR" smtClean="0"/>
-              <a:t>3</a:t>
+              <a:t>7</a:t>
             </a:fld>
             <a:endParaRPr lang="fr-FR"/>
           </a:p>
@@ -921,7 +1294,7 @@
           <a:p>
             <a:fld id="{ADD8993A-F23A-49CB-BEF1-B5681606AAB7}" type="datetimeFigureOut">
               <a:rPr lang="fr-FR" smtClean="0"/>
-              <a:t>29/05/2013</a:t>
+              <a:t>04/06/2013</a:t>
             </a:fld>
             <a:endParaRPr lang="fr-FR"/>
           </a:p>
@@ -1091,7 +1464,7 @@
           <a:p>
             <a:fld id="{ADD8993A-F23A-49CB-BEF1-B5681606AAB7}" type="datetimeFigureOut">
               <a:rPr lang="fr-FR" smtClean="0"/>
-              <a:t>29/05/2013</a:t>
+              <a:t>04/06/2013</a:t>
             </a:fld>
             <a:endParaRPr lang="fr-FR"/>
           </a:p>
@@ -1271,7 +1644,7 @@
           <a:p>
             <a:fld id="{ADD8993A-F23A-49CB-BEF1-B5681606AAB7}" type="datetimeFigureOut">
               <a:rPr lang="fr-FR" smtClean="0"/>
-              <a:t>29/05/2013</a:t>
+              <a:t>04/06/2013</a:t>
             </a:fld>
             <a:endParaRPr lang="fr-FR"/>
           </a:p>
@@ -1441,7 +1814,7 @@
           <a:p>
             <a:fld id="{ADD8993A-F23A-49CB-BEF1-B5681606AAB7}" type="datetimeFigureOut">
               <a:rPr lang="fr-FR" smtClean="0"/>
-              <a:t>29/05/2013</a:t>
+              <a:t>04/06/2013</a:t>
             </a:fld>
             <a:endParaRPr lang="fr-FR"/>
           </a:p>
@@ -1687,7 +2060,7 @@
           <a:p>
             <a:fld id="{ADD8993A-F23A-49CB-BEF1-B5681606AAB7}" type="datetimeFigureOut">
               <a:rPr lang="fr-FR" smtClean="0"/>
-              <a:t>29/05/2013</a:t>
+              <a:t>04/06/2013</a:t>
             </a:fld>
             <a:endParaRPr lang="fr-FR"/>
           </a:p>
@@ -1975,7 +2348,7 @@
           <a:p>
             <a:fld id="{ADD8993A-F23A-49CB-BEF1-B5681606AAB7}" type="datetimeFigureOut">
               <a:rPr lang="fr-FR" smtClean="0"/>
-              <a:t>29/05/2013</a:t>
+              <a:t>04/06/2013</a:t>
             </a:fld>
             <a:endParaRPr lang="fr-FR"/>
           </a:p>
@@ -2397,7 +2770,7 @@
           <a:p>
             <a:fld id="{ADD8993A-F23A-49CB-BEF1-B5681606AAB7}" type="datetimeFigureOut">
               <a:rPr lang="fr-FR" smtClean="0"/>
-              <a:t>29/05/2013</a:t>
+              <a:t>04/06/2013</a:t>
             </a:fld>
             <a:endParaRPr lang="fr-FR"/>
           </a:p>
@@ -2515,7 +2888,7 @@
           <a:p>
             <a:fld id="{ADD8993A-F23A-49CB-BEF1-B5681606AAB7}" type="datetimeFigureOut">
               <a:rPr lang="fr-FR" smtClean="0"/>
-              <a:t>29/05/2013</a:t>
+              <a:t>04/06/2013</a:t>
             </a:fld>
             <a:endParaRPr lang="fr-FR"/>
           </a:p>
@@ -2610,7 +2983,7 @@
           <a:p>
             <a:fld id="{ADD8993A-F23A-49CB-BEF1-B5681606AAB7}" type="datetimeFigureOut">
               <a:rPr lang="fr-FR" smtClean="0"/>
-              <a:t>29/05/2013</a:t>
+              <a:t>04/06/2013</a:t>
             </a:fld>
             <a:endParaRPr lang="fr-FR"/>
           </a:p>
@@ -2887,7 +3260,7 @@
           <a:p>
             <a:fld id="{ADD8993A-F23A-49CB-BEF1-B5681606AAB7}" type="datetimeFigureOut">
               <a:rPr lang="fr-FR" smtClean="0"/>
-              <a:t>29/05/2013</a:t>
+              <a:t>04/06/2013</a:t>
             </a:fld>
             <a:endParaRPr lang="fr-FR"/>
           </a:p>
@@ -3140,7 +3513,7 @@
           <a:p>
             <a:fld id="{ADD8993A-F23A-49CB-BEF1-B5681606AAB7}" type="datetimeFigureOut">
               <a:rPr lang="fr-FR" smtClean="0"/>
-              <a:t>29/05/2013</a:t>
+              <a:t>04/06/2013</a:t>
             </a:fld>
             <a:endParaRPr lang="fr-FR"/>
           </a:p>
@@ -3353,7 +3726,7 @@
           <a:p>
             <a:fld id="{ADD8993A-F23A-49CB-BEF1-B5681606AAB7}" type="datetimeFigureOut">
               <a:rPr lang="fr-FR" smtClean="0"/>
-              <a:t>29/05/2013</a:t>
+              <a:t>04/06/2013</a:t>
             </a:fld>
             <a:endParaRPr lang="fr-FR"/>
           </a:p>
@@ -3800,6 +4173,1258 @@
       </p:grpSpPr>
       <p:pic>
         <p:nvPicPr>
+          <p:cNvPr id="1027" name="Picture 3" descr="C:\Users\Jeremie\Downloads\1369879771_man_person_mens_room.png"/>
+          <p:cNvPicPr>
+            <a:picLocks noChangeAspect="1" noChangeArrowheads="1"/>
+          </p:cNvPicPr>
+          <p:nvPr/>
+        </p:nvPicPr>
+        <p:blipFill>
+          <a:blip r:embed="rId3">
+            <a:extLst>
+              <a:ext uri="{28A0092B-C50C-407E-A947-70E740481C1C}">
+                <a14:useLocalDpi xmlns:a14="http://schemas.microsoft.com/office/drawing/2010/main" val="0"/>
+              </a:ext>
+            </a:extLst>
+          </a:blip>
+          <a:srcRect/>
+          <a:stretch>
+            <a:fillRect/>
+          </a:stretch>
+        </p:blipFill>
+        <p:spPr bwMode="auto">
+          <a:xfrm>
+            <a:off x="3376264" y="1887293"/>
+            <a:ext cx="2438400" cy="2438400"/>
+          </a:xfrm>
+          <a:prstGeom prst="rect">
+            <a:avLst/>
+          </a:prstGeom>
+          <a:noFill/>
+          <a:extLst>
+            <a:ext uri="{909E8E84-426E-40DD-AFC4-6F175D3DCCD1}">
+              <a14:hiddenFill xmlns:a14="http://schemas.microsoft.com/office/drawing/2010/main">
+                <a:solidFill>
+                  <a:srgbClr val="FFFFFF"/>
+                </a:solidFill>
+              </a14:hiddenFill>
+            </a:ext>
+          </a:extLst>
+        </p:spPr>
+      </p:pic>
+      <p:sp>
+        <p:nvSpPr>
+          <p:cNvPr id="4" name="Ellipse 3"/>
+          <p:cNvSpPr/>
+          <p:nvPr/>
+        </p:nvSpPr>
+        <p:spPr>
+          <a:xfrm>
+            <a:off x="3986436" y="4781229"/>
+            <a:ext cx="1218056" cy="1218056"/>
+          </a:xfrm>
+          <a:prstGeom prst="ellipse">
+            <a:avLst/>
+          </a:prstGeom>
+          <a:noFill/>
+          <a:ln w="76200">
+            <a:solidFill>
+              <a:schemeClr val="tx1"/>
+            </a:solidFill>
+          </a:ln>
+        </p:spPr>
+        <p:style>
+          <a:lnRef idx="1">
+            <a:schemeClr val="dk1"/>
+          </a:lnRef>
+          <a:fillRef idx="2">
+            <a:schemeClr val="dk1"/>
+          </a:fillRef>
+          <a:effectRef idx="1">
+            <a:schemeClr val="dk1"/>
+          </a:effectRef>
+          <a:fontRef idx="minor">
+            <a:schemeClr val="dk1"/>
+          </a:fontRef>
+        </p:style>
+        <p:txBody>
+          <a:bodyPr rtlCol="0" anchor="ctr"/>
+          <a:lstStyle/>
+          <a:p>
+            <a:pPr algn="ctr"/>
+            <a:r>
+              <a:rPr lang="fr-FR" sz="9600" b="1" dirty="0" smtClean="0"/>
+              <a:t>1</a:t>
+            </a:r>
+            <a:endParaRPr lang="fr-FR" sz="9600" b="1" dirty="0"/>
+          </a:p>
+        </p:txBody>
+      </p:sp>
+      <p:sp>
+        <p:nvSpPr>
+          <p:cNvPr id="5" name="Pensées 4"/>
+          <p:cNvSpPr/>
+          <p:nvPr/>
+        </p:nvSpPr>
+        <p:spPr>
+          <a:xfrm>
+            <a:off x="4763291" y="766047"/>
+            <a:ext cx="1584176" cy="1194597"/>
+          </a:xfrm>
+          <a:prstGeom prst="cloudCallout">
+            <a:avLst/>
+          </a:prstGeom>
+          <a:noFill/>
+          <a:ln w="76200"/>
+        </p:spPr>
+        <p:style>
+          <a:lnRef idx="1">
+            <a:schemeClr val="dk1"/>
+          </a:lnRef>
+          <a:fillRef idx="2">
+            <a:schemeClr val="dk1"/>
+          </a:fillRef>
+          <a:effectRef idx="1">
+            <a:schemeClr val="dk1"/>
+          </a:effectRef>
+          <a:fontRef idx="minor">
+            <a:schemeClr val="dk1"/>
+          </a:fontRef>
+        </p:style>
+        <p:txBody>
+          <a:bodyPr rtlCol="0" anchor="ctr"/>
+          <a:lstStyle/>
+          <a:p>
+            <a:pPr algn="ctr"/>
+            <a:endParaRPr lang="fr-FR"/>
+          </a:p>
+        </p:txBody>
+      </p:sp>
+      <p:pic>
+        <p:nvPicPr>
+          <p:cNvPr id="6" name="Picture 2" descr="C:\Users\Jeremie\Downloads\1369914267_Hamburger.png"/>
+          <p:cNvPicPr>
+            <a:picLocks noChangeAspect="1" noChangeArrowheads="1"/>
+          </p:cNvPicPr>
+          <p:nvPr/>
+        </p:nvPicPr>
+        <p:blipFill>
+          <a:blip r:embed="rId4">
+            <a:extLst>
+              <a:ext uri="{28A0092B-C50C-407E-A947-70E740481C1C}">
+                <a14:useLocalDpi xmlns:a14="http://schemas.microsoft.com/office/drawing/2010/main" val="0"/>
+              </a:ext>
+            </a:extLst>
+          </a:blip>
+          <a:srcRect/>
+          <a:stretch>
+            <a:fillRect/>
+          </a:stretch>
+        </p:blipFill>
+        <p:spPr bwMode="auto">
+          <a:xfrm>
+            <a:off x="5250579" y="1057275"/>
+            <a:ext cx="609600" cy="609600"/>
+          </a:xfrm>
+          <a:prstGeom prst="rect">
+            <a:avLst/>
+          </a:prstGeom>
+          <a:noFill/>
+          <a:extLst>
+            <a:ext uri="{909E8E84-426E-40DD-AFC4-6F175D3DCCD1}">
+              <a14:hiddenFill xmlns:a14="http://schemas.microsoft.com/office/drawing/2010/main">
+                <a:solidFill>
+                  <a:srgbClr val="FFFFFF"/>
+                </a:solidFill>
+              </a14:hiddenFill>
+            </a:ext>
+          </a:extLst>
+        </p:spPr>
+      </p:pic>
+    </p:spTree>
+    <p:extLst>
+      <p:ext uri="{BB962C8B-B14F-4D97-AF65-F5344CB8AC3E}">
+        <p14:creationId xmlns:p14="http://schemas.microsoft.com/office/powerpoint/2010/main" val="3406662263"/>
+      </p:ext>
+    </p:extLst>
+  </p:cSld>
+  <p:clrMapOvr>
+    <a:masterClrMapping/>
+  </p:clrMapOvr>
+</p:sld>
+</file>
+
+<file path=ppt/slides/slide3.xml><?xml version="1.0" encoding="utf-8"?>
+<p:sld xmlns:a="http://schemas.openxmlformats.org/drawingml/2006/main" xmlns:r="http://schemas.openxmlformats.org/officeDocument/2006/relationships" xmlns:p="http://schemas.openxmlformats.org/presentationml/2006/main">
+  <p:cSld>
+    <p:spTree>
+      <p:nvGrpSpPr>
+        <p:cNvPr id="1" name=""/>
+        <p:cNvGrpSpPr/>
+        <p:nvPr/>
+      </p:nvGrpSpPr>
+      <p:grpSpPr>
+        <a:xfrm>
+          <a:off x="0" y="0"/>
+          <a:ext cx="0" cy="0"/>
+          <a:chOff x="0" y="0"/>
+          <a:chExt cx="0" cy="0"/>
+        </a:xfrm>
+      </p:grpSpPr>
+      <p:pic>
+        <p:nvPicPr>
+          <p:cNvPr id="1027" name="Picture 3" descr="C:\Users\Jeremie\Downloads\1369879771_man_person_mens_room.png"/>
+          <p:cNvPicPr>
+            <a:picLocks noChangeAspect="1" noChangeArrowheads="1"/>
+          </p:cNvPicPr>
+          <p:nvPr/>
+        </p:nvPicPr>
+        <p:blipFill>
+          <a:blip r:embed="rId3">
+            <a:extLst>
+              <a:ext uri="{28A0092B-C50C-407E-A947-70E740481C1C}">
+                <a14:useLocalDpi xmlns:a14="http://schemas.microsoft.com/office/drawing/2010/main" val="0"/>
+              </a:ext>
+            </a:extLst>
+          </a:blip>
+          <a:srcRect/>
+          <a:stretch>
+            <a:fillRect/>
+          </a:stretch>
+        </p:blipFill>
+        <p:spPr bwMode="auto">
+          <a:xfrm>
+            <a:off x="2925688" y="1887293"/>
+            <a:ext cx="2438400" cy="2438400"/>
+          </a:xfrm>
+          <a:prstGeom prst="rect">
+            <a:avLst/>
+          </a:prstGeom>
+          <a:noFill/>
+          <a:extLst>
+            <a:ext uri="{909E8E84-426E-40DD-AFC4-6F175D3DCCD1}">
+              <a14:hiddenFill xmlns:a14="http://schemas.microsoft.com/office/drawing/2010/main">
+                <a:solidFill>
+                  <a:srgbClr val="FFFFFF"/>
+                </a:solidFill>
+              </a14:hiddenFill>
+            </a:ext>
+          </a:extLst>
+        </p:spPr>
+      </p:pic>
+      <p:sp>
+        <p:nvSpPr>
+          <p:cNvPr id="4" name="Ellipse 3"/>
+          <p:cNvSpPr/>
+          <p:nvPr/>
+        </p:nvSpPr>
+        <p:spPr>
+          <a:xfrm>
+            <a:off x="3986436" y="4781229"/>
+            <a:ext cx="1218056" cy="1218056"/>
+          </a:xfrm>
+          <a:prstGeom prst="ellipse">
+            <a:avLst/>
+          </a:prstGeom>
+          <a:noFill/>
+          <a:ln w="76200">
+            <a:solidFill>
+              <a:schemeClr val="tx1"/>
+            </a:solidFill>
+          </a:ln>
+        </p:spPr>
+        <p:style>
+          <a:lnRef idx="1">
+            <a:schemeClr val="dk1"/>
+          </a:lnRef>
+          <a:fillRef idx="2">
+            <a:schemeClr val="dk1"/>
+          </a:fillRef>
+          <a:effectRef idx="1">
+            <a:schemeClr val="dk1"/>
+          </a:effectRef>
+          <a:fontRef idx="minor">
+            <a:schemeClr val="dk1"/>
+          </a:fontRef>
+        </p:style>
+        <p:txBody>
+          <a:bodyPr rtlCol="0" anchor="ctr"/>
+          <a:lstStyle/>
+          <a:p>
+            <a:pPr algn="ctr"/>
+            <a:r>
+              <a:rPr lang="fr-FR" sz="9600" b="1" dirty="0"/>
+              <a:t>2</a:t>
+            </a:r>
+          </a:p>
+        </p:txBody>
+      </p:sp>
+      <p:pic>
+        <p:nvPicPr>
+          <p:cNvPr id="2050" name="Picture 2" descr="C:\Users\Jeremie\Downloads\phone.png"/>
+          <p:cNvPicPr>
+            <a:picLocks noChangeAspect="1" noChangeArrowheads="1"/>
+          </p:cNvPicPr>
+          <p:nvPr/>
+        </p:nvPicPr>
+        <p:blipFill>
+          <a:blip r:embed="rId4" cstate="print">
+            <a:extLst>
+              <a:ext uri="{28A0092B-C50C-407E-A947-70E740481C1C}">
+                <a14:useLocalDpi xmlns:a14="http://schemas.microsoft.com/office/drawing/2010/main" val="0"/>
+              </a:ext>
+            </a:extLst>
+          </a:blip>
+          <a:srcRect/>
+          <a:stretch>
+            <a:fillRect/>
+          </a:stretch>
+        </p:blipFill>
+        <p:spPr bwMode="auto">
+          <a:xfrm>
+            <a:off x="4913512" y="2475176"/>
+            <a:ext cx="698368" cy="1262633"/>
+          </a:xfrm>
+          <a:prstGeom prst="rect">
+            <a:avLst/>
+          </a:prstGeom>
+          <a:noFill/>
+          <a:extLst>
+            <a:ext uri="{909E8E84-426E-40DD-AFC4-6F175D3DCCD1}">
+              <a14:hiddenFill xmlns:a14="http://schemas.microsoft.com/office/drawing/2010/main">
+                <a:solidFill>
+                  <a:srgbClr val="FFFFFF"/>
+                </a:solidFill>
+              </a14:hiddenFill>
+            </a:ext>
+          </a:extLst>
+        </p:spPr>
+      </p:pic>
+      <p:sp>
+        <p:nvSpPr>
+          <p:cNvPr id="2" name="Rectangle à coins arrondis 1"/>
+          <p:cNvSpPr/>
+          <p:nvPr/>
+        </p:nvSpPr>
+        <p:spPr>
+          <a:xfrm>
+            <a:off x="3263316" y="1008956"/>
+            <a:ext cx="2664296" cy="720080"/>
+          </a:xfrm>
+          <a:prstGeom prst="roundRect">
+            <a:avLst/>
+          </a:prstGeom>
+          <a:noFill/>
+          <a:ln w="76200"/>
+        </p:spPr>
+        <p:style>
+          <a:lnRef idx="1">
+            <a:schemeClr val="dk1"/>
+          </a:lnRef>
+          <a:fillRef idx="2">
+            <a:schemeClr val="dk1"/>
+          </a:fillRef>
+          <a:effectRef idx="1">
+            <a:schemeClr val="dk1"/>
+          </a:effectRef>
+          <a:fontRef idx="minor">
+            <a:schemeClr val="dk1"/>
+          </a:fontRef>
+        </p:style>
+        <p:txBody>
+          <a:bodyPr rtlCol="0" anchor="ctr"/>
+          <a:lstStyle/>
+          <a:p>
+            <a:pPr algn="ctr"/>
+            <a:r>
+              <a:rPr lang="fr-FR" sz="4400" b="1" dirty="0" err="1" smtClean="0"/>
+              <a:t>Flashmutt</a:t>
+            </a:r>
+            <a:endParaRPr lang="fr-FR" sz="4400" b="1" dirty="0"/>
+          </a:p>
+        </p:txBody>
+      </p:sp>
+      <p:sp>
+        <p:nvSpPr>
+          <p:cNvPr id="3" name="Rectangle à coins arrondis 2"/>
+          <p:cNvSpPr/>
+          <p:nvPr/>
+        </p:nvSpPr>
+        <p:spPr>
+          <a:xfrm>
+            <a:off x="5041694" y="2806659"/>
+            <a:ext cx="181470" cy="181549"/>
+          </a:xfrm>
+          <a:prstGeom prst="roundRect">
+            <a:avLst/>
+          </a:prstGeom>
+          <a:noFill/>
+        </p:spPr>
+        <p:style>
+          <a:lnRef idx="1">
+            <a:schemeClr val="dk1"/>
+          </a:lnRef>
+          <a:fillRef idx="2">
+            <a:schemeClr val="dk1"/>
+          </a:fillRef>
+          <a:effectRef idx="1">
+            <a:schemeClr val="dk1"/>
+          </a:effectRef>
+          <a:fontRef idx="minor">
+            <a:schemeClr val="dk1"/>
+          </a:fontRef>
+        </p:style>
+        <p:txBody>
+          <a:bodyPr rtlCol="0" anchor="ctr"/>
+          <a:lstStyle/>
+          <a:p>
+            <a:pPr algn="ctr"/>
+            <a:endParaRPr lang="fr-FR"/>
+          </a:p>
+        </p:txBody>
+      </p:sp>
+      <p:sp>
+        <p:nvSpPr>
+          <p:cNvPr id="9" name="Rectangle à coins arrondis 8"/>
+          <p:cNvSpPr/>
+          <p:nvPr/>
+        </p:nvSpPr>
+        <p:spPr>
+          <a:xfrm>
+            <a:off x="5292025" y="2806659"/>
+            <a:ext cx="181470" cy="181549"/>
+          </a:xfrm>
+          <a:prstGeom prst="roundRect">
+            <a:avLst/>
+          </a:prstGeom>
+          <a:noFill/>
+        </p:spPr>
+        <p:style>
+          <a:lnRef idx="1">
+            <a:schemeClr val="dk1"/>
+          </a:lnRef>
+          <a:fillRef idx="2">
+            <a:schemeClr val="dk1"/>
+          </a:fillRef>
+          <a:effectRef idx="1">
+            <a:schemeClr val="dk1"/>
+          </a:effectRef>
+          <a:fontRef idx="minor">
+            <a:schemeClr val="dk1"/>
+          </a:fontRef>
+        </p:style>
+        <p:txBody>
+          <a:bodyPr rtlCol="0" anchor="ctr"/>
+          <a:lstStyle/>
+          <a:p>
+            <a:pPr algn="ctr"/>
+            <a:endParaRPr lang="fr-FR"/>
+          </a:p>
+        </p:txBody>
+      </p:sp>
+      <p:sp>
+        <p:nvSpPr>
+          <p:cNvPr id="10" name="Rectangle à coins arrondis 9"/>
+          <p:cNvSpPr/>
+          <p:nvPr/>
+        </p:nvSpPr>
+        <p:spPr>
+          <a:xfrm>
+            <a:off x="5041694" y="3049833"/>
+            <a:ext cx="181470" cy="181549"/>
+          </a:xfrm>
+          <a:prstGeom prst="roundRect">
+            <a:avLst/>
+          </a:prstGeom>
+          <a:noFill/>
+        </p:spPr>
+        <p:style>
+          <a:lnRef idx="1">
+            <a:schemeClr val="dk1"/>
+          </a:lnRef>
+          <a:fillRef idx="2">
+            <a:schemeClr val="dk1"/>
+          </a:fillRef>
+          <a:effectRef idx="1">
+            <a:schemeClr val="dk1"/>
+          </a:effectRef>
+          <a:fontRef idx="minor">
+            <a:schemeClr val="dk1"/>
+          </a:fontRef>
+        </p:style>
+        <p:txBody>
+          <a:bodyPr rtlCol="0" anchor="ctr"/>
+          <a:lstStyle/>
+          <a:p>
+            <a:pPr algn="ctr"/>
+            <a:endParaRPr lang="fr-FR"/>
+          </a:p>
+        </p:txBody>
+      </p:sp>
+      <p:sp>
+        <p:nvSpPr>
+          <p:cNvPr id="11" name="Rectangle à coins arrondis 10"/>
+          <p:cNvSpPr/>
+          <p:nvPr/>
+        </p:nvSpPr>
+        <p:spPr>
+          <a:xfrm>
+            <a:off x="5292025" y="3049833"/>
+            <a:ext cx="181470" cy="181549"/>
+          </a:xfrm>
+          <a:prstGeom prst="roundRect">
+            <a:avLst/>
+          </a:prstGeom>
+          <a:noFill/>
+        </p:spPr>
+        <p:style>
+          <a:lnRef idx="1">
+            <a:schemeClr val="dk1"/>
+          </a:lnRef>
+          <a:fillRef idx="2">
+            <a:schemeClr val="dk1"/>
+          </a:fillRef>
+          <a:effectRef idx="1">
+            <a:schemeClr val="dk1"/>
+          </a:effectRef>
+          <a:fontRef idx="minor">
+            <a:schemeClr val="dk1"/>
+          </a:fontRef>
+        </p:style>
+        <p:txBody>
+          <a:bodyPr rtlCol="0" anchor="ctr"/>
+          <a:lstStyle/>
+          <a:p>
+            <a:pPr algn="ctr"/>
+            <a:endParaRPr lang="fr-FR"/>
+          </a:p>
+        </p:txBody>
+      </p:sp>
+      <p:sp>
+        <p:nvSpPr>
+          <p:cNvPr id="12" name="Rectangle à coins arrondis 11"/>
+          <p:cNvSpPr/>
+          <p:nvPr/>
+        </p:nvSpPr>
+        <p:spPr>
+          <a:xfrm>
+            <a:off x="5041694" y="3293007"/>
+            <a:ext cx="181470" cy="181549"/>
+          </a:xfrm>
+          <a:prstGeom prst="roundRect">
+            <a:avLst/>
+          </a:prstGeom>
+          <a:noFill/>
+        </p:spPr>
+        <p:style>
+          <a:lnRef idx="1">
+            <a:schemeClr val="dk1"/>
+          </a:lnRef>
+          <a:fillRef idx="2">
+            <a:schemeClr val="dk1"/>
+          </a:fillRef>
+          <a:effectRef idx="1">
+            <a:schemeClr val="dk1"/>
+          </a:effectRef>
+          <a:fontRef idx="minor">
+            <a:schemeClr val="dk1"/>
+          </a:fontRef>
+        </p:style>
+        <p:txBody>
+          <a:bodyPr rtlCol="0" anchor="ctr"/>
+          <a:lstStyle/>
+          <a:p>
+            <a:pPr algn="ctr"/>
+            <a:endParaRPr lang="fr-FR"/>
+          </a:p>
+        </p:txBody>
+      </p:sp>
+      <p:sp>
+        <p:nvSpPr>
+          <p:cNvPr id="13" name="Rectangle à coins arrondis 12"/>
+          <p:cNvSpPr/>
+          <p:nvPr/>
+        </p:nvSpPr>
+        <p:spPr>
+          <a:xfrm>
+            <a:off x="5292025" y="3293007"/>
+            <a:ext cx="181470" cy="181549"/>
+          </a:xfrm>
+          <a:prstGeom prst="roundRect">
+            <a:avLst/>
+          </a:prstGeom>
+          <a:noFill/>
+        </p:spPr>
+        <p:style>
+          <a:lnRef idx="1">
+            <a:schemeClr val="dk1"/>
+          </a:lnRef>
+          <a:fillRef idx="2">
+            <a:schemeClr val="dk1"/>
+          </a:fillRef>
+          <a:effectRef idx="1">
+            <a:schemeClr val="dk1"/>
+          </a:effectRef>
+          <a:fontRef idx="minor">
+            <a:schemeClr val="dk1"/>
+          </a:fontRef>
+        </p:style>
+        <p:txBody>
+          <a:bodyPr rtlCol="0" anchor="ctr"/>
+          <a:lstStyle/>
+          <a:p>
+            <a:pPr algn="ctr"/>
+            <a:endParaRPr lang="fr-FR"/>
+          </a:p>
+        </p:txBody>
+      </p:sp>
+      <p:sp>
+        <p:nvSpPr>
+          <p:cNvPr id="14" name="Flèche droite 13"/>
+          <p:cNvSpPr/>
+          <p:nvPr/>
+        </p:nvSpPr>
+        <p:spPr>
+          <a:xfrm rot="5400000" flipV="1">
+            <a:off x="4594952" y="1895720"/>
+            <a:ext cx="1074962" cy="741595"/>
+          </a:xfrm>
+          <a:prstGeom prst="rightArrow">
+            <a:avLst/>
+          </a:prstGeom>
+          <a:solidFill>
+            <a:schemeClr val="bg1"/>
+          </a:solidFill>
+          <a:ln w="76200"/>
+        </p:spPr>
+        <p:style>
+          <a:lnRef idx="1">
+            <a:schemeClr val="dk1"/>
+          </a:lnRef>
+          <a:fillRef idx="2">
+            <a:schemeClr val="dk1"/>
+          </a:fillRef>
+          <a:effectRef idx="1">
+            <a:schemeClr val="dk1"/>
+          </a:effectRef>
+          <a:fontRef idx="minor">
+            <a:schemeClr val="dk1"/>
+          </a:fontRef>
+        </p:style>
+        <p:txBody>
+          <a:bodyPr rtlCol="0" anchor="ctr"/>
+          <a:lstStyle/>
+          <a:p>
+            <a:pPr algn="ctr"/>
+            <a:endParaRPr lang="fr-FR"/>
+          </a:p>
+        </p:txBody>
+      </p:sp>
+    </p:spTree>
+    <p:extLst>
+      <p:ext uri="{BB962C8B-B14F-4D97-AF65-F5344CB8AC3E}">
+        <p14:creationId xmlns:p14="http://schemas.microsoft.com/office/powerpoint/2010/main" val="758697618"/>
+      </p:ext>
+    </p:extLst>
+  </p:cSld>
+  <p:clrMapOvr>
+    <a:masterClrMapping/>
+  </p:clrMapOvr>
+</p:sld>
+</file>
+
+<file path=ppt/slides/slide4.xml><?xml version="1.0" encoding="utf-8"?>
+<p:sld xmlns:a="http://schemas.openxmlformats.org/drawingml/2006/main" xmlns:r="http://schemas.openxmlformats.org/officeDocument/2006/relationships" xmlns:p="http://schemas.openxmlformats.org/presentationml/2006/main">
+  <p:cSld>
+    <p:spTree>
+      <p:nvGrpSpPr>
+        <p:cNvPr id="1" name=""/>
+        <p:cNvGrpSpPr/>
+        <p:nvPr/>
+      </p:nvGrpSpPr>
+      <p:grpSpPr>
+        <a:xfrm>
+          <a:off x="0" y="0"/>
+          <a:ext cx="0" cy="0"/>
+          <a:chOff x="0" y="0"/>
+          <a:chExt cx="0" cy="0"/>
+        </a:xfrm>
+      </p:grpSpPr>
+      <p:sp>
+        <p:nvSpPr>
+          <p:cNvPr id="4" name="Ellipse 3"/>
+          <p:cNvSpPr/>
+          <p:nvPr/>
+        </p:nvSpPr>
+        <p:spPr>
+          <a:xfrm>
+            <a:off x="3986436" y="4781229"/>
+            <a:ext cx="1218056" cy="1218056"/>
+          </a:xfrm>
+          <a:prstGeom prst="ellipse">
+            <a:avLst/>
+          </a:prstGeom>
+          <a:noFill/>
+          <a:ln w="76200">
+            <a:solidFill>
+              <a:schemeClr val="tx1"/>
+            </a:solidFill>
+          </a:ln>
+        </p:spPr>
+        <p:style>
+          <a:lnRef idx="1">
+            <a:schemeClr val="dk1"/>
+          </a:lnRef>
+          <a:fillRef idx="2">
+            <a:schemeClr val="dk1"/>
+          </a:fillRef>
+          <a:effectRef idx="1">
+            <a:schemeClr val="dk1"/>
+          </a:effectRef>
+          <a:fontRef idx="minor">
+            <a:schemeClr val="dk1"/>
+          </a:fontRef>
+        </p:style>
+        <p:txBody>
+          <a:bodyPr rtlCol="0" anchor="ctr"/>
+          <a:lstStyle/>
+          <a:p>
+            <a:pPr algn="ctr"/>
+            <a:r>
+              <a:rPr lang="fr-FR" sz="9600" b="1" dirty="0"/>
+              <a:t>3</a:t>
+            </a:r>
+          </a:p>
+        </p:txBody>
+      </p:sp>
+      <p:pic>
+        <p:nvPicPr>
+          <p:cNvPr id="2050" name="Picture 2" descr="C:\Users\Jeremie\Downloads\phone.png"/>
+          <p:cNvPicPr>
+            <a:picLocks noChangeAspect="1" noChangeArrowheads="1"/>
+          </p:cNvPicPr>
+          <p:nvPr/>
+        </p:nvPicPr>
+        <p:blipFill>
+          <a:blip r:embed="rId3" cstate="print">
+            <a:extLst>
+              <a:ext uri="{28A0092B-C50C-407E-A947-70E740481C1C}">
+                <a14:useLocalDpi xmlns:a14="http://schemas.microsoft.com/office/drawing/2010/main" val="0"/>
+              </a:ext>
+            </a:extLst>
+          </a:blip>
+          <a:srcRect/>
+          <a:stretch>
+            <a:fillRect/>
+          </a:stretch>
+        </p:blipFill>
+        <p:spPr bwMode="auto">
+          <a:xfrm>
+            <a:off x="3587352" y="764704"/>
+            <a:ext cx="2016224" cy="3645286"/>
+          </a:xfrm>
+          <a:prstGeom prst="rect">
+            <a:avLst/>
+          </a:prstGeom>
+          <a:noFill/>
+          <a:extLst>
+            <a:ext uri="{909E8E84-426E-40DD-AFC4-6F175D3DCCD1}">
+              <a14:hiddenFill xmlns:a14="http://schemas.microsoft.com/office/drawing/2010/main">
+                <a:solidFill>
+                  <a:srgbClr val="FFFFFF"/>
+                </a:solidFill>
+              </a14:hiddenFill>
+            </a:ext>
+          </a:extLst>
+        </p:spPr>
+      </p:pic>
+      <p:pic>
+        <p:nvPicPr>
+          <p:cNvPr id="5" name="Picture 3" descr="C:\Users\Jeremie\Documents\Etudes\2011-2013 - UTT\Semestre 5\IF11\Projet\Maquettes\1369915707_fast-food.png"/>
+          <p:cNvPicPr>
+            <a:picLocks noChangeAspect="1" noChangeArrowheads="1"/>
+          </p:cNvPicPr>
+          <p:nvPr/>
+        </p:nvPicPr>
+        <p:blipFill>
+          <a:blip r:embed="rId4" cstate="print">
+            <a:extLst>
+              <a:ext uri="{28A0092B-C50C-407E-A947-70E740481C1C}">
+                <a14:useLocalDpi xmlns:a14="http://schemas.microsoft.com/office/drawing/2010/main" val="0"/>
+              </a:ext>
+            </a:extLst>
+          </a:blip>
+          <a:srcRect/>
+          <a:stretch>
+            <a:fillRect/>
+          </a:stretch>
+        </p:blipFill>
+        <p:spPr bwMode="auto">
+          <a:xfrm>
+            <a:off x="3936308" y="1625810"/>
+            <a:ext cx="610469" cy="610469"/>
+          </a:xfrm>
+          <a:prstGeom prst="rect">
+            <a:avLst/>
+          </a:prstGeom>
+          <a:noFill/>
+          <a:extLst>
+            <a:ext uri="{909E8E84-426E-40DD-AFC4-6F175D3DCCD1}">
+              <a14:hiddenFill xmlns:a14="http://schemas.microsoft.com/office/drawing/2010/main">
+                <a:solidFill>
+                  <a:srgbClr val="FFFFFF"/>
+                </a:solidFill>
+              </a14:hiddenFill>
+            </a:ext>
+          </a:extLst>
+        </p:spPr>
+      </p:pic>
+      <p:pic>
+        <p:nvPicPr>
+          <p:cNvPr id="1028" name="Picture 4" descr="C:\Users\Jeremie\Documents\Etudes\2011-2013 - UTT\Semestre 5\IF11\Projet\Maquettes\1369915737_t-shirt.png"/>
+          <p:cNvPicPr>
+            <a:picLocks noChangeAspect="1" noChangeArrowheads="1"/>
+          </p:cNvPicPr>
+          <p:nvPr/>
+        </p:nvPicPr>
+        <p:blipFill>
+          <a:blip r:embed="rId5" cstate="print">
+            <a:extLst>
+              <a:ext uri="{28A0092B-C50C-407E-A947-70E740481C1C}">
+                <a14:useLocalDpi xmlns:a14="http://schemas.microsoft.com/office/drawing/2010/main" val="0"/>
+              </a:ext>
+            </a:extLst>
+          </a:blip>
+          <a:srcRect/>
+          <a:stretch>
+            <a:fillRect/>
+          </a:stretch>
+        </p:blipFill>
+        <p:spPr bwMode="auto">
+          <a:xfrm>
+            <a:off x="4759880" y="1713885"/>
+            <a:ext cx="434318" cy="434318"/>
+          </a:xfrm>
+          <a:prstGeom prst="rect">
+            <a:avLst/>
+          </a:prstGeom>
+          <a:noFill/>
+          <a:extLst>
+            <a:ext uri="{909E8E84-426E-40DD-AFC4-6F175D3DCCD1}">
+              <a14:hiddenFill xmlns:a14="http://schemas.microsoft.com/office/drawing/2010/main">
+                <a:solidFill>
+                  <a:srgbClr val="FFFFFF"/>
+                </a:solidFill>
+              </a14:hiddenFill>
+            </a:ext>
+          </a:extLst>
+        </p:spPr>
+      </p:pic>
+      <p:pic>
+        <p:nvPicPr>
+          <p:cNvPr id="1029" name="Picture 5" descr="C:\Users\Jeremie\Documents\Etudes\2011-2013 - UTT\Semestre 5\IF11\Projet\Maquettes\iconmonstr-home-6-icon.png"/>
+          <p:cNvPicPr>
+            <a:picLocks noChangeAspect="1" noChangeArrowheads="1"/>
+          </p:cNvPicPr>
+          <p:nvPr/>
+        </p:nvPicPr>
+        <p:blipFill>
+          <a:blip r:embed="rId6" cstate="print">
+            <a:extLst>
+              <a:ext uri="{28A0092B-C50C-407E-A947-70E740481C1C}">
+                <a14:useLocalDpi xmlns:a14="http://schemas.microsoft.com/office/drawing/2010/main" val="0"/>
+              </a:ext>
+            </a:extLst>
+          </a:blip>
+          <a:srcRect/>
+          <a:stretch>
+            <a:fillRect/>
+          </a:stretch>
+        </p:blipFill>
+        <p:spPr bwMode="auto">
+          <a:xfrm>
+            <a:off x="3914288" y="2249528"/>
+            <a:ext cx="654511" cy="654511"/>
+          </a:xfrm>
+          <a:prstGeom prst="rect">
+            <a:avLst/>
+          </a:prstGeom>
+          <a:noFill/>
+          <a:extLst>
+            <a:ext uri="{909E8E84-426E-40DD-AFC4-6F175D3DCCD1}">
+              <a14:hiddenFill xmlns:a14="http://schemas.microsoft.com/office/drawing/2010/main">
+                <a:solidFill>
+                  <a:srgbClr val="FFFFFF"/>
+                </a:solidFill>
+              </a14:hiddenFill>
+            </a:ext>
+          </a:extLst>
+        </p:spPr>
+      </p:pic>
+      <p:pic>
+        <p:nvPicPr>
+          <p:cNvPr id="1030" name="Picture 6" descr="C:\Users\Jeremie\Documents\Etudes\2011-2013 - UTT\Semestre 5\IF11\Projet\Maquettes\1369915694_cafe_coffee.png"/>
+          <p:cNvPicPr>
+            <a:picLocks noChangeAspect="1" noChangeArrowheads="1"/>
+          </p:cNvPicPr>
+          <p:nvPr/>
+        </p:nvPicPr>
+        <p:blipFill>
+          <a:blip r:embed="rId7" cstate="print">
+            <a:extLst>
+              <a:ext uri="{28A0092B-C50C-407E-A947-70E740481C1C}">
+                <a14:useLocalDpi xmlns:a14="http://schemas.microsoft.com/office/drawing/2010/main" val="0"/>
+              </a:ext>
+            </a:extLst>
+          </a:blip>
+          <a:srcRect/>
+          <a:stretch>
+            <a:fillRect/>
+          </a:stretch>
+        </p:blipFill>
+        <p:spPr bwMode="auto">
+          <a:xfrm>
+            <a:off x="4726536" y="2358862"/>
+            <a:ext cx="501005" cy="501005"/>
+          </a:xfrm>
+          <a:prstGeom prst="rect">
+            <a:avLst/>
+          </a:prstGeom>
+          <a:noFill/>
+          <a:extLst>
+            <a:ext uri="{909E8E84-426E-40DD-AFC4-6F175D3DCCD1}">
+              <a14:hiddenFill xmlns:a14="http://schemas.microsoft.com/office/drawing/2010/main">
+                <a:solidFill>
+                  <a:srgbClr val="FFFFFF"/>
+                </a:solidFill>
+              </a14:hiddenFill>
+            </a:ext>
+          </a:extLst>
+        </p:spPr>
+      </p:pic>
+    </p:spTree>
+    <p:extLst>
+      <p:ext uri="{BB962C8B-B14F-4D97-AF65-F5344CB8AC3E}">
+        <p14:creationId xmlns:p14="http://schemas.microsoft.com/office/powerpoint/2010/main" val="2346483839"/>
+      </p:ext>
+    </p:extLst>
+  </p:cSld>
+  <p:clrMapOvr>
+    <a:masterClrMapping/>
+  </p:clrMapOvr>
+</p:sld>
+</file>
+
+<file path=ppt/slides/slide5.xml><?xml version="1.0" encoding="utf-8"?>
+<p:sld xmlns:a="http://schemas.openxmlformats.org/drawingml/2006/main" xmlns:r="http://schemas.openxmlformats.org/officeDocument/2006/relationships" xmlns:p="http://schemas.openxmlformats.org/presentationml/2006/main">
+  <p:cSld>
+    <p:spTree>
+      <p:nvGrpSpPr>
+        <p:cNvPr id="1" name=""/>
+        <p:cNvGrpSpPr/>
+        <p:nvPr/>
+      </p:nvGrpSpPr>
+      <p:grpSpPr>
+        <a:xfrm>
+          <a:off x="0" y="0"/>
+          <a:ext cx="0" cy="0"/>
+          <a:chOff x="0" y="0"/>
+          <a:chExt cx="0" cy="0"/>
+        </a:xfrm>
+      </p:grpSpPr>
+      <p:sp>
+        <p:nvSpPr>
+          <p:cNvPr id="4" name="Ellipse 3"/>
+          <p:cNvSpPr/>
+          <p:nvPr/>
+        </p:nvSpPr>
+        <p:spPr>
+          <a:xfrm>
+            <a:off x="3986436" y="4781229"/>
+            <a:ext cx="1218056" cy="1218056"/>
+          </a:xfrm>
+          <a:prstGeom prst="ellipse">
+            <a:avLst/>
+          </a:prstGeom>
+          <a:noFill/>
+          <a:ln w="76200">
+            <a:solidFill>
+              <a:schemeClr val="tx1"/>
+            </a:solidFill>
+          </a:ln>
+        </p:spPr>
+        <p:style>
+          <a:lnRef idx="1">
+            <a:schemeClr val="dk1"/>
+          </a:lnRef>
+          <a:fillRef idx="2">
+            <a:schemeClr val="dk1"/>
+          </a:fillRef>
+          <a:effectRef idx="1">
+            <a:schemeClr val="dk1"/>
+          </a:effectRef>
+          <a:fontRef idx="minor">
+            <a:schemeClr val="dk1"/>
+          </a:fontRef>
+        </p:style>
+        <p:txBody>
+          <a:bodyPr rtlCol="0" anchor="ctr"/>
+          <a:lstStyle/>
+          <a:p>
+            <a:pPr algn="ctr"/>
+            <a:r>
+              <a:rPr lang="fr-FR" sz="9600" b="1" dirty="0"/>
+              <a:t>4</a:t>
+            </a:r>
+          </a:p>
+        </p:txBody>
+      </p:sp>
+      <p:pic>
+        <p:nvPicPr>
+          <p:cNvPr id="2050" name="Picture 2" descr="C:\Users\Jeremie\Downloads\phone.png"/>
+          <p:cNvPicPr>
+            <a:picLocks noChangeAspect="1" noChangeArrowheads="1"/>
+          </p:cNvPicPr>
+          <p:nvPr/>
+        </p:nvPicPr>
+        <p:blipFill>
+          <a:blip r:embed="rId3" cstate="print">
+            <a:extLst>
+              <a:ext uri="{28A0092B-C50C-407E-A947-70E740481C1C}">
+                <a14:useLocalDpi xmlns:a14="http://schemas.microsoft.com/office/drawing/2010/main" val="0"/>
+              </a:ext>
+            </a:extLst>
+          </a:blip>
+          <a:srcRect/>
+          <a:stretch>
+            <a:fillRect/>
+          </a:stretch>
+        </p:blipFill>
+        <p:spPr bwMode="auto">
+          <a:xfrm>
+            <a:off x="3587352" y="764704"/>
+            <a:ext cx="2016224" cy="3645286"/>
+          </a:xfrm>
+          <a:prstGeom prst="rect">
+            <a:avLst/>
+          </a:prstGeom>
+          <a:noFill/>
+          <a:extLst>
+            <a:ext uri="{909E8E84-426E-40DD-AFC4-6F175D3DCCD1}">
+              <a14:hiddenFill xmlns:a14="http://schemas.microsoft.com/office/drawing/2010/main">
+                <a:solidFill>
+                  <a:srgbClr val="FFFFFF"/>
+                </a:solidFill>
+              </a14:hiddenFill>
+            </a:ext>
+          </a:extLst>
+        </p:spPr>
+      </p:pic>
+      <p:pic>
+        <p:nvPicPr>
+          <p:cNvPr id="5" name="Picture 3" descr="C:\Users\Jeremie\Documents\Etudes\2011-2013 - UTT\Semestre 5\IF11\Projet\Maquettes\1369915707_fast-food.png"/>
+          <p:cNvPicPr>
+            <a:picLocks noChangeAspect="1" noChangeArrowheads="1"/>
+          </p:cNvPicPr>
+          <p:nvPr/>
+        </p:nvPicPr>
+        <p:blipFill>
+          <a:blip r:embed="rId4" cstate="print">
+            <a:extLst>
+              <a:ext uri="{28A0092B-C50C-407E-A947-70E740481C1C}">
+                <a14:useLocalDpi xmlns:a14="http://schemas.microsoft.com/office/drawing/2010/main" val="0"/>
+              </a:ext>
+            </a:extLst>
+          </a:blip>
+          <a:srcRect/>
+          <a:stretch>
+            <a:fillRect/>
+          </a:stretch>
+        </p:blipFill>
+        <p:spPr bwMode="auto">
+          <a:xfrm>
+            <a:off x="4290229" y="1604229"/>
+            <a:ext cx="610469" cy="610469"/>
+          </a:xfrm>
+          <a:prstGeom prst="rect">
+            <a:avLst/>
+          </a:prstGeom>
+          <a:noFill/>
+          <a:extLst>
+            <a:ext uri="{909E8E84-426E-40DD-AFC4-6F175D3DCCD1}">
+              <a14:hiddenFill xmlns:a14="http://schemas.microsoft.com/office/drawing/2010/main">
+                <a:solidFill>
+                  <a:srgbClr val="FFFFFF"/>
+                </a:solidFill>
+              </a14:hiddenFill>
+            </a:ext>
+          </a:extLst>
+        </p:spPr>
+      </p:pic>
+      <p:sp>
+        <p:nvSpPr>
+          <p:cNvPr id="8" name="Rectangle à coins arrondis 7"/>
+          <p:cNvSpPr/>
+          <p:nvPr/>
+        </p:nvSpPr>
+        <p:spPr>
+          <a:xfrm>
+            <a:off x="3839380" y="2214697"/>
+            <a:ext cx="1512167" cy="372649"/>
+          </a:xfrm>
+          <a:prstGeom prst="roundRect">
+            <a:avLst/>
+          </a:prstGeom>
+          <a:noFill/>
+          <a:ln w="28575"/>
+        </p:spPr>
+        <p:style>
+          <a:lnRef idx="1">
+            <a:schemeClr val="dk1"/>
+          </a:lnRef>
+          <a:fillRef idx="2">
+            <a:schemeClr val="dk1"/>
+          </a:fillRef>
+          <a:effectRef idx="1">
+            <a:schemeClr val="dk1"/>
+          </a:effectRef>
+          <a:fontRef idx="minor">
+            <a:schemeClr val="dk1"/>
+          </a:fontRef>
+        </p:style>
+        <p:txBody>
+          <a:bodyPr rtlCol="0" anchor="ctr"/>
+          <a:lstStyle/>
+          <a:p>
+            <a:pPr algn="ctr"/>
+            <a:r>
+              <a:rPr lang="fr-FR" sz="1400" b="1" dirty="0" smtClean="0"/>
+              <a:t>L’antre au goût</a:t>
+            </a:r>
+            <a:endParaRPr lang="fr-FR" sz="1400" b="1" dirty="0"/>
+          </a:p>
+        </p:txBody>
+      </p:sp>
+      <p:sp>
+        <p:nvSpPr>
+          <p:cNvPr id="9" name="Rectangle à coins arrondis 8"/>
+          <p:cNvSpPr/>
+          <p:nvPr/>
+        </p:nvSpPr>
+        <p:spPr>
+          <a:xfrm>
+            <a:off x="3839380" y="2725594"/>
+            <a:ext cx="1512167" cy="372649"/>
+          </a:xfrm>
+          <a:prstGeom prst="roundRect">
+            <a:avLst/>
+          </a:prstGeom>
+          <a:noFill/>
+          <a:ln w="28575"/>
+        </p:spPr>
+        <p:style>
+          <a:lnRef idx="1">
+            <a:schemeClr val="dk1"/>
+          </a:lnRef>
+          <a:fillRef idx="2">
+            <a:schemeClr val="dk1"/>
+          </a:fillRef>
+          <a:effectRef idx="1">
+            <a:schemeClr val="dk1"/>
+          </a:effectRef>
+          <a:fontRef idx="minor">
+            <a:schemeClr val="dk1"/>
+          </a:fontRef>
+        </p:style>
+        <p:txBody>
+          <a:bodyPr rtlCol="0" anchor="ctr"/>
+          <a:lstStyle/>
+          <a:p>
+            <a:pPr algn="ctr"/>
+            <a:r>
+              <a:rPr lang="fr-FR" sz="1400" b="1" dirty="0" err="1" smtClean="0"/>
+              <a:t>Pulp</a:t>
+            </a:r>
+            <a:endParaRPr lang="fr-FR" sz="1400" b="1" dirty="0"/>
+          </a:p>
+        </p:txBody>
+      </p:sp>
+      <p:sp>
+        <p:nvSpPr>
+          <p:cNvPr id="10" name="Rectangle à coins arrondis 9"/>
+          <p:cNvSpPr/>
+          <p:nvPr/>
+        </p:nvSpPr>
+        <p:spPr>
+          <a:xfrm>
+            <a:off x="3839380" y="3216026"/>
+            <a:ext cx="1512167" cy="372649"/>
+          </a:xfrm>
+          <a:prstGeom prst="roundRect">
+            <a:avLst/>
+          </a:prstGeom>
+          <a:noFill/>
+          <a:ln w="28575"/>
+        </p:spPr>
+        <p:style>
+          <a:lnRef idx="1">
+            <a:schemeClr val="dk1"/>
+          </a:lnRef>
+          <a:fillRef idx="2">
+            <a:schemeClr val="dk1"/>
+          </a:fillRef>
+          <a:effectRef idx="1">
+            <a:schemeClr val="dk1"/>
+          </a:effectRef>
+          <a:fontRef idx="minor">
+            <a:schemeClr val="dk1"/>
+          </a:fontRef>
+        </p:style>
+        <p:txBody>
+          <a:bodyPr rtlCol="0" anchor="ctr"/>
+          <a:lstStyle/>
+          <a:p>
+            <a:pPr algn="ctr"/>
+            <a:r>
+              <a:rPr lang="fr-FR" sz="1400" b="1" dirty="0" smtClean="0"/>
+              <a:t>La petite cantine</a:t>
+            </a:r>
+            <a:endParaRPr lang="fr-FR" sz="1400" b="1" dirty="0"/>
+          </a:p>
+        </p:txBody>
+      </p:sp>
+    </p:spTree>
+    <p:extLst>
+      <p:ext uri="{BB962C8B-B14F-4D97-AF65-F5344CB8AC3E}">
+        <p14:creationId xmlns:p14="http://schemas.microsoft.com/office/powerpoint/2010/main" val="3857384284"/>
+      </p:ext>
+    </p:extLst>
+  </p:cSld>
+  <p:clrMapOvr>
+    <a:masterClrMapping/>
+  </p:clrMapOvr>
+</p:sld>
+</file>
+
+<file path=ppt/slides/slide6.xml><?xml version="1.0" encoding="utf-8"?>
+<p:sld xmlns:a="http://schemas.openxmlformats.org/drawingml/2006/main" xmlns:r="http://schemas.openxmlformats.org/officeDocument/2006/relationships" xmlns:p="http://schemas.openxmlformats.org/presentationml/2006/main">
+  <p:cSld>
+    <p:spTree>
+      <p:nvGrpSpPr>
+        <p:cNvPr id="1" name=""/>
+        <p:cNvGrpSpPr/>
+        <p:nvPr/>
+      </p:nvGrpSpPr>
+      <p:grpSpPr>
+        <a:xfrm>
+          <a:off x="0" y="0"/>
+          <a:ext cx="0" cy="0"/>
+          <a:chOff x="0" y="0"/>
+          <a:chExt cx="0" cy="0"/>
+        </a:xfrm>
+      </p:grpSpPr>
+      <p:pic>
+        <p:nvPicPr>
           <p:cNvPr id="1026" name="Picture 2" descr="C:\Users\Jeremie\Downloads\1369879748_shop.png"/>
           <p:cNvPicPr>
             <a:picLocks noChangeAspect="1" noChangeArrowheads="1"/>
@@ -4061,7 +5686,7 @@
 </p:sld>
 </file>
 
-<file path=ppt/slides/slide3.xml><?xml version="1.0" encoding="utf-8"?>
+<file path=ppt/slides/slide7.xml><?xml version="1.0" encoding="utf-8"?>
 <p:sld xmlns:a="http://schemas.openxmlformats.org/drawingml/2006/main" xmlns:r="http://schemas.openxmlformats.org/officeDocument/2006/relationships" xmlns:p="http://schemas.openxmlformats.org/presentationml/2006/main">
   <p:cSld>
     <p:spTree>
@@ -4159,7 +5784,6 @@
               <a:rPr lang="fr-FR" sz="9600" b="1" dirty="0"/>
               <a:t>2</a:t>
             </a:r>
-            <a:endParaRPr lang="fr-FR" sz="9600" b="1" dirty="0"/>
           </a:p>
         </p:txBody>
       </p:sp>
@@ -4173,6 +5797,1596 @@
   <p:clrMapOvr>
     <a:masterClrMapping/>
   </p:clrMapOvr>
+</p:sld>
+</file>
+
+<file path=ppt/slides/slide8.xml><?xml version="1.0" encoding="utf-8"?>
+<p:sld xmlns:a="http://schemas.openxmlformats.org/drawingml/2006/main" xmlns:r="http://schemas.openxmlformats.org/officeDocument/2006/relationships" xmlns:p="http://schemas.openxmlformats.org/presentationml/2006/main">
+  <p:cSld>
+    <p:spTree>
+      <p:nvGrpSpPr>
+        <p:cNvPr id="1" name=""/>
+        <p:cNvGrpSpPr/>
+        <p:nvPr/>
+      </p:nvGrpSpPr>
+      <p:grpSpPr>
+        <a:xfrm>
+          <a:off x="0" y="0"/>
+          <a:ext cx="0" cy="0"/>
+          <a:chOff x="0" y="0"/>
+          <a:chExt cx="0" cy="0"/>
+        </a:xfrm>
+      </p:grpSpPr>
+      <p:pic>
+        <p:nvPicPr>
+          <p:cNvPr id="17" name="Picture 7"/>
+          <p:cNvPicPr>
+            <a:picLocks noChangeAspect="1" noChangeArrowheads="1"/>
+          </p:cNvPicPr>
+          <p:nvPr/>
+        </p:nvPicPr>
+        <p:blipFill>
+          <a:blip r:embed="rId2">
+            <a:extLst>
+              <a:ext uri="{28A0092B-C50C-407E-A947-70E740481C1C}">
+                <a14:useLocalDpi xmlns:a14="http://schemas.microsoft.com/office/drawing/2010/main" val="0"/>
+              </a:ext>
+            </a:extLst>
+          </a:blip>
+          <a:srcRect/>
+          <a:stretch>
+            <a:fillRect/>
+          </a:stretch>
+        </p:blipFill>
+        <p:spPr bwMode="auto">
+          <a:xfrm>
+            <a:off x="3827943" y="3359760"/>
+            <a:ext cx="1224136" cy="2187818"/>
+          </a:xfrm>
+          <a:prstGeom prst="rect">
+            <a:avLst/>
+          </a:prstGeom>
+          <a:noFill/>
+          <a:ln>
+            <a:noFill/>
+          </a:ln>
+          <a:effectLst/>
+          <a:extLst>
+            <a:ext uri="{909E8E84-426E-40DD-AFC4-6F175D3DCCD1}">
+              <a14:hiddenFill xmlns:a14="http://schemas.microsoft.com/office/drawing/2010/main">
+                <a:solidFill>
+                  <a:schemeClr val="accent1"/>
+                </a:solidFill>
+              </a14:hiddenFill>
+            </a:ext>
+            <a:ext uri="{91240B29-F687-4F45-9708-019B960494DF}">
+              <a14:hiddenLine xmlns:a14="http://schemas.microsoft.com/office/drawing/2010/main" w="9525">
+                <a:solidFill>
+                  <a:schemeClr val="tx1"/>
+                </a:solidFill>
+                <a:miter lim="800000"/>
+                <a:headEnd/>
+                <a:tailEnd/>
+              </a14:hiddenLine>
+            </a:ext>
+            <a:ext uri="{AF507438-7753-43E0-B8FC-AC1667EBCBE1}">
+              <a14:hiddenEffects xmlns:a14="http://schemas.microsoft.com/office/drawing/2010/main">
+                <a:effectLst>
+                  <a:outerShdw dist="35921" dir="2700000" algn="ctr" rotWithShape="0">
+                    <a:schemeClr val="bg2"/>
+                  </a:outerShdw>
+                </a:effectLst>
+              </a14:hiddenEffects>
+            </a:ext>
+          </a:extLst>
+        </p:spPr>
+      </p:pic>
+      <p:pic>
+        <p:nvPicPr>
+          <p:cNvPr id="1027" name="Picture 3"/>
+          <p:cNvPicPr>
+            <a:picLocks noChangeAspect="1" noChangeArrowheads="1"/>
+          </p:cNvPicPr>
+          <p:nvPr/>
+        </p:nvPicPr>
+        <p:blipFill>
+          <a:blip r:embed="rId3">
+            <a:extLst>
+              <a:ext uri="{28A0092B-C50C-407E-A947-70E740481C1C}">
+                <a14:useLocalDpi xmlns:a14="http://schemas.microsoft.com/office/drawing/2010/main" val="0"/>
+              </a:ext>
+            </a:extLst>
+          </a:blip>
+          <a:srcRect/>
+          <a:stretch>
+            <a:fillRect/>
+          </a:stretch>
+        </p:blipFill>
+        <p:spPr bwMode="auto">
+          <a:xfrm>
+            <a:off x="2377953" y="1385982"/>
+            <a:ext cx="666750" cy="1466850"/>
+          </a:xfrm>
+          <a:prstGeom prst="rect">
+            <a:avLst/>
+          </a:prstGeom>
+          <a:noFill/>
+          <a:ln>
+            <a:noFill/>
+          </a:ln>
+          <a:effectLst/>
+          <a:extLst>
+            <a:ext uri="{909E8E84-426E-40DD-AFC4-6F175D3DCCD1}">
+              <a14:hiddenFill xmlns:a14="http://schemas.microsoft.com/office/drawing/2010/main">
+                <a:solidFill>
+                  <a:schemeClr val="accent1"/>
+                </a:solidFill>
+              </a14:hiddenFill>
+            </a:ext>
+            <a:ext uri="{91240B29-F687-4F45-9708-019B960494DF}">
+              <a14:hiddenLine xmlns:a14="http://schemas.microsoft.com/office/drawing/2010/main" w="9525">
+                <a:solidFill>
+                  <a:schemeClr val="tx1"/>
+                </a:solidFill>
+                <a:miter lim="800000"/>
+                <a:headEnd/>
+                <a:tailEnd/>
+              </a14:hiddenLine>
+            </a:ext>
+            <a:ext uri="{AF507438-7753-43E0-B8FC-AC1667EBCBE1}">
+              <a14:hiddenEffects xmlns:a14="http://schemas.microsoft.com/office/drawing/2010/main">
+                <a:effectLst>
+                  <a:outerShdw dist="35921" dir="2700000" algn="ctr" rotWithShape="0">
+                    <a:schemeClr val="bg2"/>
+                  </a:outerShdw>
+                </a:effectLst>
+              </a14:hiddenEffects>
+            </a:ext>
+          </a:extLst>
+        </p:spPr>
+      </p:pic>
+      <p:sp>
+        <p:nvSpPr>
+          <p:cNvPr id="4" name="Rectangle à coins arrondis 3"/>
+          <p:cNvSpPr/>
+          <p:nvPr/>
+        </p:nvSpPr>
+        <p:spPr>
+          <a:xfrm>
+            <a:off x="2854463" y="993969"/>
+            <a:ext cx="409817" cy="318585"/>
+          </a:xfrm>
+          <a:prstGeom prst="wedgeRoundRectCallout">
+            <a:avLst>
+              <a:gd name="adj1" fmla="val -45163"/>
+              <a:gd name="adj2" fmla="val 120545"/>
+              <a:gd name="adj3" fmla="val 16667"/>
+            </a:avLst>
+          </a:prstGeom>
+          <a:solidFill>
+            <a:schemeClr val="bg1"/>
+          </a:solidFill>
+          <a:ln>
+            <a:solidFill>
+              <a:schemeClr val="tx1"/>
+            </a:solidFill>
+          </a:ln>
+        </p:spPr>
+        <p:style>
+          <a:lnRef idx="2">
+            <a:schemeClr val="accent1">
+              <a:shade val="50000"/>
+            </a:schemeClr>
+          </a:lnRef>
+          <a:fillRef idx="1">
+            <a:schemeClr val="accent1"/>
+          </a:fillRef>
+          <a:effectRef idx="0">
+            <a:schemeClr val="accent1"/>
+          </a:effectRef>
+          <a:fontRef idx="minor">
+            <a:schemeClr val="lt1"/>
+          </a:fontRef>
+        </p:style>
+        <p:txBody>
+          <a:bodyPr rtlCol="0" anchor="ctr"/>
+          <a:lstStyle/>
+          <a:p>
+            <a:pPr algn="ctr"/>
+            <a:endParaRPr lang="fr-FR"/>
+          </a:p>
+        </p:txBody>
+      </p:sp>
+      <p:pic>
+        <p:nvPicPr>
+          <p:cNvPr id="1029" name="Picture 5"/>
+          <p:cNvPicPr>
+            <a:picLocks noChangeAspect="1" noChangeArrowheads="1"/>
+          </p:cNvPicPr>
+          <p:nvPr/>
+        </p:nvPicPr>
+        <p:blipFill>
+          <a:blip r:embed="rId4">
+            <a:extLst>
+              <a:ext uri="{28A0092B-C50C-407E-A947-70E740481C1C}">
+                <a14:useLocalDpi xmlns:a14="http://schemas.microsoft.com/office/drawing/2010/main" val="0"/>
+              </a:ext>
+            </a:extLst>
+          </a:blip>
+          <a:srcRect/>
+          <a:stretch>
+            <a:fillRect/>
+          </a:stretch>
+        </p:blipFill>
+        <p:spPr bwMode="auto">
+          <a:xfrm>
+            <a:off x="2937546" y="1062773"/>
+            <a:ext cx="214313" cy="180975"/>
+          </a:xfrm>
+          <a:prstGeom prst="rect">
+            <a:avLst/>
+          </a:prstGeom>
+          <a:noFill/>
+          <a:ln>
+            <a:noFill/>
+          </a:ln>
+          <a:effectLst/>
+          <a:extLst>
+            <a:ext uri="{909E8E84-426E-40DD-AFC4-6F175D3DCCD1}">
+              <a14:hiddenFill xmlns:a14="http://schemas.microsoft.com/office/drawing/2010/main">
+                <a:solidFill>
+                  <a:schemeClr val="accent1"/>
+                </a:solidFill>
+              </a14:hiddenFill>
+            </a:ext>
+            <a:ext uri="{91240B29-F687-4F45-9708-019B960494DF}">
+              <a14:hiddenLine xmlns:a14="http://schemas.microsoft.com/office/drawing/2010/main" w="9525">
+                <a:solidFill>
+                  <a:schemeClr val="tx1"/>
+                </a:solidFill>
+                <a:miter lim="800000"/>
+                <a:headEnd/>
+                <a:tailEnd/>
+              </a14:hiddenLine>
+            </a:ext>
+            <a:ext uri="{AF507438-7753-43E0-B8FC-AC1667EBCBE1}">
+              <a14:hiddenEffects xmlns:a14="http://schemas.microsoft.com/office/drawing/2010/main">
+                <a:effectLst>
+                  <a:outerShdw dist="35921" dir="2700000" algn="ctr" rotWithShape="0">
+                    <a:schemeClr val="bg2"/>
+                  </a:outerShdw>
+                </a:effectLst>
+              </a14:hiddenEffects>
+            </a:ext>
+          </a:extLst>
+        </p:spPr>
+      </p:pic>
+      <p:pic>
+        <p:nvPicPr>
+          <p:cNvPr id="1030" name="Picture 6"/>
+          <p:cNvPicPr>
+            <a:picLocks noChangeAspect="1" noChangeArrowheads="1"/>
+          </p:cNvPicPr>
+          <p:nvPr/>
+        </p:nvPicPr>
+        <p:blipFill>
+          <a:blip r:embed="rId5">
+            <a:extLst>
+              <a:ext uri="{28A0092B-C50C-407E-A947-70E740481C1C}">
+                <a14:useLocalDpi xmlns:a14="http://schemas.microsoft.com/office/drawing/2010/main" val="0"/>
+              </a:ext>
+            </a:extLst>
+          </a:blip>
+          <a:srcRect/>
+          <a:stretch>
+            <a:fillRect/>
+          </a:stretch>
+        </p:blipFill>
+        <p:spPr bwMode="auto">
+          <a:xfrm>
+            <a:off x="3868511" y="1251677"/>
+            <a:ext cx="1143000" cy="1638300"/>
+          </a:xfrm>
+          <a:prstGeom prst="rect">
+            <a:avLst/>
+          </a:prstGeom>
+          <a:noFill/>
+          <a:ln>
+            <a:noFill/>
+          </a:ln>
+          <a:effectLst/>
+          <a:extLst>
+            <a:ext uri="{909E8E84-426E-40DD-AFC4-6F175D3DCCD1}">
+              <a14:hiddenFill xmlns:a14="http://schemas.microsoft.com/office/drawing/2010/main">
+                <a:solidFill>
+                  <a:schemeClr val="accent1"/>
+                </a:solidFill>
+              </a14:hiddenFill>
+            </a:ext>
+            <a:ext uri="{91240B29-F687-4F45-9708-019B960494DF}">
+              <a14:hiddenLine xmlns:a14="http://schemas.microsoft.com/office/drawing/2010/main" w="9525">
+                <a:solidFill>
+                  <a:schemeClr val="tx1"/>
+                </a:solidFill>
+                <a:miter lim="800000"/>
+                <a:headEnd/>
+                <a:tailEnd/>
+              </a14:hiddenLine>
+            </a:ext>
+            <a:ext uri="{AF507438-7753-43E0-B8FC-AC1667EBCBE1}">
+              <a14:hiddenEffects xmlns:a14="http://schemas.microsoft.com/office/drawing/2010/main">
+                <a:effectLst>
+                  <a:outerShdw dist="35921" dir="2700000" algn="ctr" rotWithShape="0">
+                    <a:schemeClr val="bg2"/>
+                  </a:outerShdw>
+                </a:effectLst>
+              </a14:hiddenEffects>
+            </a:ext>
+          </a:extLst>
+        </p:spPr>
+      </p:pic>
+      <p:sp>
+        <p:nvSpPr>
+          <p:cNvPr id="5" name="Flèche droite 4"/>
+          <p:cNvSpPr/>
+          <p:nvPr/>
+        </p:nvSpPr>
+        <p:spPr>
+          <a:xfrm>
+            <a:off x="3151859" y="1936008"/>
+            <a:ext cx="720080" cy="189334"/>
+          </a:xfrm>
+          <a:prstGeom prst="rightArrow">
+            <a:avLst/>
+          </a:prstGeom>
+          <a:solidFill>
+            <a:schemeClr val="bg1"/>
+          </a:solidFill>
+          <a:ln>
+            <a:solidFill>
+              <a:schemeClr val="tx1"/>
+            </a:solidFill>
+          </a:ln>
+        </p:spPr>
+        <p:style>
+          <a:lnRef idx="2">
+            <a:schemeClr val="accent1">
+              <a:shade val="50000"/>
+            </a:schemeClr>
+          </a:lnRef>
+          <a:fillRef idx="1">
+            <a:schemeClr val="accent1"/>
+          </a:fillRef>
+          <a:effectRef idx="0">
+            <a:schemeClr val="accent1"/>
+          </a:effectRef>
+          <a:fontRef idx="minor">
+            <a:schemeClr val="lt1"/>
+          </a:fontRef>
+        </p:style>
+        <p:txBody>
+          <a:bodyPr rtlCol="0" anchor="ctr"/>
+          <a:lstStyle/>
+          <a:p>
+            <a:pPr algn="ctr"/>
+            <a:endParaRPr lang="fr-FR"/>
+          </a:p>
+        </p:txBody>
+      </p:sp>
+      <p:sp>
+        <p:nvSpPr>
+          <p:cNvPr id="6" name="Rectangle 5"/>
+          <p:cNvSpPr/>
+          <p:nvPr/>
+        </p:nvSpPr>
+        <p:spPr>
+          <a:xfrm>
+            <a:off x="251520" y="1710787"/>
+            <a:ext cx="1224136" cy="720080"/>
+          </a:xfrm>
+          <a:prstGeom prst="rect">
+            <a:avLst/>
+          </a:prstGeom>
+          <a:solidFill>
+            <a:schemeClr val="bg1"/>
+          </a:solidFill>
+          <a:ln>
+            <a:solidFill>
+              <a:schemeClr val="tx1"/>
+            </a:solidFill>
+          </a:ln>
+        </p:spPr>
+        <p:style>
+          <a:lnRef idx="2">
+            <a:schemeClr val="accent1">
+              <a:shade val="50000"/>
+            </a:schemeClr>
+          </a:lnRef>
+          <a:fillRef idx="1">
+            <a:schemeClr val="accent1"/>
+          </a:fillRef>
+          <a:effectRef idx="0">
+            <a:schemeClr val="accent1"/>
+          </a:effectRef>
+          <a:fontRef idx="minor">
+            <a:schemeClr val="lt1"/>
+          </a:fontRef>
+        </p:style>
+        <p:txBody>
+          <a:bodyPr rtlCol="0" anchor="ctr"/>
+          <a:lstStyle/>
+          <a:p>
+            <a:pPr algn="ctr"/>
+            <a:r>
+              <a:rPr lang="fr-FR" sz="3200" b="1" dirty="0" smtClean="0">
+                <a:solidFill>
+                  <a:schemeClr val="tx1"/>
+                </a:solidFill>
+              </a:rPr>
+              <a:t>12:00</a:t>
+            </a:r>
+            <a:endParaRPr lang="fr-FR" b="1" dirty="0">
+              <a:solidFill>
+                <a:schemeClr val="tx1"/>
+              </a:solidFill>
+            </a:endParaRPr>
+          </a:p>
+        </p:txBody>
+      </p:sp>
+      <p:sp>
+        <p:nvSpPr>
+          <p:cNvPr id="12" name="Flèche droite 11"/>
+          <p:cNvSpPr/>
+          <p:nvPr/>
+        </p:nvSpPr>
+        <p:spPr>
+          <a:xfrm>
+            <a:off x="1670760" y="1936008"/>
+            <a:ext cx="720080" cy="189334"/>
+          </a:xfrm>
+          <a:prstGeom prst="rightArrow">
+            <a:avLst/>
+          </a:prstGeom>
+          <a:solidFill>
+            <a:schemeClr val="bg1"/>
+          </a:solidFill>
+          <a:ln>
+            <a:solidFill>
+              <a:schemeClr val="tx1"/>
+            </a:solidFill>
+          </a:ln>
+        </p:spPr>
+        <p:style>
+          <a:lnRef idx="2">
+            <a:schemeClr val="accent1">
+              <a:shade val="50000"/>
+            </a:schemeClr>
+          </a:lnRef>
+          <a:fillRef idx="1">
+            <a:schemeClr val="accent1"/>
+          </a:fillRef>
+          <a:effectRef idx="0">
+            <a:schemeClr val="accent1"/>
+          </a:effectRef>
+          <a:fontRef idx="minor">
+            <a:schemeClr val="lt1"/>
+          </a:fontRef>
+        </p:style>
+        <p:txBody>
+          <a:bodyPr rtlCol="0" anchor="ctr"/>
+          <a:lstStyle/>
+          <a:p>
+            <a:pPr algn="ctr"/>
+            <a:endParaRPr lang="fr-FR"/>
+          </a:p>
+        </p:txBody>
+      </p:sp>
+      <p:sp>
+        <p:nvSpPr>
+          <p:cNvPr id="13" name="Flèche droite 12"/>
+          <p:cNvSpPr/>
+          <p:nvPr/>
+        </p:nvSpPr>
+        <p:spPr>
+          <a:xfrm>
+            <a:off x="5148064" y="1953560"/>
+            <a:ext cx="720080" cy="189334"/>
+          </a:xfrm>
+          <a:prstGeom prst="rightArrow">
+            <a:avLst/>
+          </a:prstGeom>
+          <a:solidFill>
+            <a:schemeClr val="bg1"/>
+          </a:solidFill>
+          <a:ln>
+            <a:solidFill>
+              <a:schemeClr val="tx1"/>
+            </a:solidFill>
+          </a:ln>
+        </p:spPr>
+        <p:style>
+          <a:lnRef idx="2">
+            <a:schemeClr val="accent1">
+              <a:shade val="50000"/>
+            </a:schemeClr>
+          </a:lnRef>
+          <a:fillRef idx="1">
+            <a:schemeClr val="accent1"/>
+          </a:fillRef>
+          <a:effectRef idx="0">
+            <a:schemeClr val="accent1"/>
+          </a:effectRef>
+          <a:fontRef idx="minor">
+            <a:schemeClr val="lt1"/>
+          </a:fontRef>
+        </p:style>
+        <p:txBody>
+          <a:bodyPr rtlCol="0" anchor="ctr"/>
+          <a:lstStyle/>
+          <a:p>
+            <a:pPr algn="ctr"/>
+            <a:endParaRPr lang="fr-FR"/>
+          </a:p>
+        </p:txBody>
+      </p:sp>
+      <p:pic>
+        <p:nvPicPr>
+          <p:cNvPr id="1031" name="Picture 7"/>
+          <p:cNvPicPr>
+            <a:picLocks noChangeAspect="1" noChangeArrowheads="1"/>
+          </p:cNvPicPr>
+          <p:nvPr/>
+        </p:nvPicPr>
+        <p:blipFill>
+          <a:blip r:embed="rId2">
+            <a:extLst>
+              <a:ext uri="{28A0092B-C50C-407E-A947-70E740481C1C}">
+                <a14:useLocalDpi xmlns:a14="http://schemas.microsoft.com/office/drawing/2010/main" val="0"/>
+              </a:ext>
+            </a:extLst>
+          </a:blip>
+          <a:srcRect/>
+          <a:stretch>
+            <a:fillRect/>
+          </a:stretch>
+        </p:blipFill>
+        <p:spPr bwMode="auto">
+          <a:xfrm>
+            <a:off x="4523000" y="1561888"/>
+            <a:ext cx="447675" cy="800100"/>
+          </a:xfrm>
+          <a:prstGeom prst="rect">
+            <a:avLst/>
+          </a:prstGeom>
+          <a:noFill/>
+          <a:ln>
+            <a:noFill/>
+          </a:ln>
+          <a:effectLst/>
+          <a:extLst>
+            <a:ext uri="{909E8E84-426E-40DD-AFC4-6F175D3DCCD1}">
+              <a14:hiddenFill xmlns:a14="http://schemas.microsoft.com/office/drawing/2010/main">
+                <a:solidFill>
+                  <a:schemeClr val="accent1"/>
+                </a:solidFill>
+              </a14:hiddenFill>
+            </a:ext>
+            <a:ext uri="{91240B29-F687-4F45-9708-019B960494DF}">
+              <a14:hiddenLine xmlns:a14="http://schemas.microsoft.com/office/drawing/2010/main" w="9525">
+                <a:solidFill>
+                  <a:schemeClr val="tx1"/>
+                </a:solidFill>
+                <a:miter lim="800000"/>
+                <a:headEnd/>
+                <a:tailEnd/>
+              </a14:hiddenLine>
+            </a:ext>
+            <a:ext uri="{AF507438-7753-43E0-B8FC-AC1667EBCBE1}">
+              <a14:hiddenEffects xmlns:a14="http://schemas.microsoft.com/office/drawing/2010/main">
+                <a:effectLst>
+                  <a:outerShdw dist="35921" dir="2700000" algn="ctr" rotWithShape="0">
+                    <a:schemeClr val="bg2"/>
+                  </a:outerShdw>
+                </a:effectLst>
+              </a14:hiddenEffects>
+            </a:ext>
+          </a:extLst>
+        </p:spPr>
+      </p:pic>
+      <p:sp>
+        <p:nvSpPr>
+          <p:cNvPr id="15" name="Rectangle 14"/>
+          <p:cNvSpPr/>
+          <p:nvPr/>
+        </p:nvSpPr>
+        <p:spPr>
+          <a:xfrm>
+            <a:off x="3995512" y="1118753"/>
+            <a:ext cx="864097" cy="323209"/>
+          </a:xfrm>
+          <a:prstGeom prst="rect">
+            <a:avLst/>
+          </a:prstGeom>
+          <a:solidFill>
+            <a:schemeClr val="bg1"/>
+          </a:solidFill>
+          <a:ln>
+            <a:solidFill>
+              <a:schemeClr val="tx1"/>
+            </a:solidFill>
+          </a:ln>
+        </p:spPr>
+        <p:style>
+          <a:lnRef idx="2">
+            <a:schemeClr val="accent1">
+              <a:shade val="50000"/>
+            </a:schemeClr>
+          </a:lnRef>
+          <a:fillRef idx="1">
+            <a:schemeClr val="accent1"/>
+          </a:fillRef>
+          <a:effectRef idx="0">
+            <a:schemeClr val="accent1"/>
+          </a:effectRef>
+          <a:fontRef idx="minor">
+            <a:schemeClr val="lt1"/>
+          </a:fontRef>
+        </p:style>
+        <p:txBody>
+          <a:bodyPr rtlCol="0" anchor="ctr"/>
+          <a:lstStyle/>
+          <a:p>
+            <a:pPr algn="ctr"/>
+            <a:r>
+              <a:rPr lang="fr-FR" sz="1100" b="1" dirty="0" err="1" smtClean="0">
+                <a:solidFill>
+                  <a:schemeClr val="tx1"/>
+                </a:solidFill>
+              </a:rPr>
+              <a:t>FlashMUTT</a:t>
+            </a:r>
+            <a:endParaRPr lang="fr-FR" sz="800" b="1" dirty="0">
+              <a:solidFill>
+                <a:schemeClr val="tx1"/>
+              </a:solidFill>
+            </a:endParaRPr>
+          </a:p>
+        </p:txBody>
+      </p:sp>
+      <p:pic>
+        <p:nvPicPr>
+          <p:cNvPr id="16" name="Picture 2" descr="C:\Users\Jeremie\Desktop\SNAG-0000.png"/>
+          <p:cNvPicPr>
+            <a:picLocks noChangeAspect="1" noChangeArrowheads="1"/>
+          </p:cNvPicPr>
+          <p:nvPr/>
+        </p:nvPicPr>
+        <p:blipFill rotWithShape="1">
+          <a:blip r:embed="rId6" cstate="print">
+            <a:extLst>
+              <a:ext uri="{28A0092B-C50C-407E-A947-70E740481C1C}">
+                <a14:useLocalDpi xmlns:a14="http://schemas.microsoft.com/office/drawing/2010/main" val="0"/>
+              </a:ext>
+            </a:extLst>
+          </a:blip>
+          <a:srcRect l="30142" t="26487" r="20282" b="13091"/>
+          <a:stretch/>
+        </p:blipFill>
+        <p:spPr bwMode="auto">
+          <a:xfrm rot="5400000">
+            <a:off x="3838092" y="4106539"/>
+            <a:ext cx="1303764" cy="757992"/>
+          </a:xfrm>
+          <a:prstGeom prst="rect">
+            <a:avLst/>
+          </a:prstGeom>
+          <a:noFill/>
+          <a:extLst>
+            <a:ext uri="{909E8E84-426E-40DD-AFC4-6F175D3DCCD1}">
+              <a14:hiddenFill xmlns:a14="http://schemas.microsoft.com/office/drawing/2010/main">
+                <a:solidFill>
+                  <a:srgbClr val="FFFFFF"/>
+                </a:solidFill>
+              </a14:hiddenFill>
+            </a:ext>
+          </a:extLst>
+        </p:spPr>
+      </p:pic>
+      <p:pic>
+        <p:nvPicPr>
+          <p:cNvPr id="18" name="Picture 2" descr="C:\Users\Jeremie\Desktop\SNAG-0000.png"/>
+          <p:cNvPicPr>
+            <a:picLocks noChangeAspect="1" noChangeArrowheads="1"/>
+          </p:cNvPicPr>
+          <p:nvPr/>
+        </p:nvPicPr>
+        <p:blipFill rotWithShape="1">
+          <a:blip r:embed="rId6" cstate="print">
+            <a:extLst>
+              <a:ext uri="{28A0092B-C50C-407E-A947-70E740481C1C}">
+                <a14:useLocalDpi xmlns:a14="http://schemas.microsoft.com/office/drawing/2010/main" val="0"/>
+              </a:ext>
+            </a:extLst>
+          </a:blip>
+          <a:srcRect l="30142" t="26487" r="20282" b="13091"/>
+          <a:stretch/>
+        </p:blipFill>
+        <p:spPr bwMode="auto">
+          <a:xfrm rot="5400000">
+            <a:off x="3788129" y="4106539"/>
+            <a:ext cx="1303764" cy="757992"/>
+          </a:xfrm>
+          <a:prstGeom prst="rect">
+            <a:avLst/>
+          </a:prstGeom>
+          <a:noFill/>
+          <a:extLst>
+            <a:ext uri="{909E8E84-426E-40DD-AFC4-6F175D3DCCD1}">
+              <a14:hiddenFill xmlns:a14="http://schemas.microsoft.com/office/drawing/2010/main">
+                <a:solidFill>
+                  <a:srgbClr val="FFFFFF"/>
+                </a:solidFill>
+              </a14:hiddenFill>
+            </a:ext>
+          </a:extLst>
+        </p:spPr>
+      </p:pic>
+      <p:pic>
+        <p:nvPicPr>
+          <p:cNvPr id="19" name="Picture 7"/>
+          <p:cNvPicPr>
+            <a:picLocks noChangeAspect="1" noChangeArrowheads="1"/>
+          </p:cNvPicPr>
+          <p:nvPr/>
+        </p:nvPicPr>
+        <p:blipFill>
+          <a:blip r:embed="rId2">
+            <a:extLst>
+              <a:ext uri="{28A0092B-C50C-407E-A947-70E740481C1C}">
+                <a14:useLocalDpi xmlns:a14="http://schemas.microsoft.com/office/drawing/2010/main" val="0"/>
+              </a:ext>
+            </a:extLst>
+          </a:blip>
+          <a:srcRect/>
+          <a:stretch>
+            <a:fillRect/>
+          </a:stretch>
+        </p:blipFill>
+        <p:spPr bwMode="auto">
+          <a:xfrm>
+            <a:off x="5868144" y="976918"/>
+            <a:ext cx="1224136" cy="2187818"/>
+          </a:xfrm>
+          <a:prstGeom prst="rect">
+            <a:avLst/>
+          </a:prstGeom>
+          <a:noFill/>
+          <a:ln>
+            <a:noFill/>
+          </a:ln>
+          <a:effectLst/>
+          <a:extLst>
+            <a:ext uri="{909E8E84-426E-40DD-AFC4-6F175D3DCCD1}">
+              <a14:hiddenFill xmlns:a14="http://schemas.microsoft.com/office/drawing/2010/main">
+                <a:solidFill>
+                  <a:schemeClr val="accent1"/>
+                </a:solidFill>
+              </a14:hiddenFill>
+            </a:ext>
+            <a:ext uri="{91240B29-F687-4F45-9708-019B960494DF}">
+              <a14:hiddenLine xmlns:a14="http://schemas.microsoft.com/office/drawing/2010/main" w="9525">
+                <a:solidFill>
+                  <a:schemeClr val="tx1"/>
+                </a:solidFill>
+                <a:miter lim="800000"/>
+                <a:headEnd/>
+                <a:tailEnd/>
+              </a14:hiddenLine>
+            </a:ext>
+            <a:ext uri="{AF507438-7753-43E0-B8FC-AC1667EBCBE1}">
+              <a14:hiddenEffects xmlns:a14="http://schemas.microsoft.com/office/drawing/2010/main">
+                <a:effectLst>
+                  <a:outerShdw dist="35921" dir="2700000" algn="ctr" rotWithShape="0">
+                    <a:schemeClr val="bg2"/>
+                  </a:outerShdw>
+                </a:effectLst>
+              </a14:hiddenEffects>
+            </a:ext>
+          </a:extLst>
+        </p:spPr>
+      </p:pic>
+      <p:pic>
+        <p:nvPicPr>
+          <p:cNvPr id="20" name="Picture 5"/>
+          <p:cNvPicPr>
+            <a:picLocks noChangeAspect="1" noChangeArrowheads="1"/>
+          </p:cNvPicPr>
+          <p:nvPr/>
+        </p:nvPicPr>
+        <p:blipFill>
+          <a:blip r:embed="rId4">
+            <a:extLst>
+              <a:ext uri="{28A0092B-C50C-407E-A947-70E740481C1C}">
+                <a14:useLocalDpi xmlns:a14="http://schemas.microsoft.com/office/drawing/2010/main" val="0"/>
+              </a:ext>
+            </a:extLst>
+          </a:blip>
+          <a:srcRect/>
+          <a:stretch>
+            <a:fillRect/>
+          </a:stretch>
+        </p:blipFill>
+        <p:spPr bwMode="auto">
+          <a:xfrm>
+            <a:off x="6579111" y="1746399"/>
+            <a:ext cx="253081" cy="213712"/>
+          </a:xfrm>
+          <a:prstGeom prst="rect">
+            <a:avLst/>
+          </a:prstGeom>
+          <a:noFill/>
+          <a:ln>
+            <a:noFill/>
+          </a:ln>
+          <a:effectLst/>
+          <a:extLst>
+            <a:ext uri="{909E8E84-426E-40DD-AFC4-6F175D3DCCD1}">
+              <a14:hiddenFill xmlns:a14="http://schemas.microsoft.com/office/drawing/2010/main">
+                <a:solidFill>
+                  <a:schemeClr val="accent1"/>
+                </a:solidFill>
+              </a14:hiddenFill>
+            </a:ext>
+            <a:ext uri="{91240B29-F687-4F45-9708-019B960494DF}">
+              <a14:hiddenLine xmlns:a14="http://schemas.microsoft.com/office/drawing/2010/main" w="9525">
+                <a:solidFill>
+                  <a:schemeClr val="tx1"/>
+                </a:solidFill>
+                <a:miter lim="800000"/>
+                <a:headEnd/>
+                <a:tailEnd/>
+              </a14:hiddenLine>
+            </a:ext>
+            <a:ext uri="{AF507438-7753-43E0-B8FC-AC1667EBCBE1}">
+              <a14:hiddenEffects xmlns:a14="http://schemas.microsoft.com/office/drawing/2010/main">
+                <a:effectLst>
+                  <a:outerShdw dist="35921" dir="2700000" algn="ctr" rotWithShape="0">
+                    <a:schemeClr val="bg2"/>
+                  </a:outerShdw>
+                </a:effectLst>
+              </a14:hiddenEffects>
+            </a:ext>
+          </a:extLst>
+        </p:spPr>
+      </p:pic>
+      <p:pic>
+        <p:nvPicPr>
+          <p:cNvPr id="1032" name="Picture 8" descr="C:\Users\jaafar\Downloads\aiga-escalator-up.png"/>
+          <p:cNvPicPr>
+            <a:picLocks noChangeAspect="1" noChangeArrowheads="1"/>
+          </p:cNvPicPr>
+          <p:nvPr/>
+        </p:nvPicPr>
+        <p:blipFill>
+          <a:blip r:embed="rId7" cstate="print">
+            <a:extLst>
+              <a:ext uri="{28A0092B-C50C-407E-A947-70E740481C1C}">
+                <a14:useLocalDpi xmlns:a14="http://schemas.microsoft.com/office/drawing/2010/main" val="0"/>
+              </a:ext>
+            </a:extLst>
+          </a:blip>
+          <a:srcRect/>
+          <a:stretch>
+            <a:fillRect/>
+          </a:stretch>
+        </p:blipFill>
+        <p:spPr bwMode="auto">
+          <a:xfrm>
+            <a:off x="6196061" y="1705986"/>
+            <a:ext cx="295401" cy="229837"/>
+          </a:xfrm>
+          <a:prstGeom prst="rect">
+            <a:avLst/>
+          </a:prstGeom>
+          <a:noFill/>
+          <a:extLst>
+            <a:ext uri="{909E8E84-426E-40DD-AFC4-6F175D3DCCD1}">
+              <a14:hiddenFill xmlns:a14="http://schemas.microsoft.com/office/drawing/2010/main">
+                <a:solidFill>
+                  <a:srgbClr val="FFFFFF"/>
+                </a:solidFill>
+              </a14:hiddenFill>
+            </a:ext>
+          </a:extLst>
+        </p:spPr>
+      </p:pic>
+      <p:pic>
+        <p:nvPicPr>
+          <p:cNvPr id="1033" name="Picture 9" descr="C:\Users\jaafar\Downloads\pictographs-barbershop-inv-t.png"/>
+          <p:cNvPicPr>
+            <a:picLocks noChangeAspect="1" noChangeArrowheads="1"/>
+          </p:cNvPicPr>
+          <p:nvPr/>
+        </p:nvPicPr>
+        <p:blipFill>
+          <a:blip r:embed="rId8" cstate="print">
+            <a:extLst>
+              <a:ext uri="{28A0092B-C50C-407E-A947-70E740481C1C}">
+                <a14:useLocalDpi xmlns:a14="http://schemas.microsoft.com/office/drawing/2010/main" val="0"/>
+              </a:ext>
+            </a:extLst>
+          </a:blip>
+          <a:srcRect/>
+          <a:stretch>
+            <a:fillRect/>
+          </a:stretch>
+        </p:blipFill>
+        <p:spPr bwMode="auto">
+          <a:xfrm>
+            <a:off x="6200807" y="2165494"/>
+            <a:ext cx="290655" cy="290655"/>
+          </a:xfrm>
+          <a:prstGeom prst="rect">
+            <a:avLst/>
+          </a:prstGeom>
+          <a:noFill/>
+          <a:extLst>
+            <a:ext uri="{909E8E84-426E-40DD-AFC4-6F175D3DCCD1}">
+              <a14:hiddenFill xmlns:a14="http://schemas.microsoft.com/office/drawing/2010/main">
+                <a:solidFill>
+                  <a:srgbClr val="FFFFFF"/>
+                </a:solidFill>
+              </a14:hiddenFill>
+            </a:ext>
+          </a:extLst>
+        </p:spPr>
+      </p:pic>
+      <p:pic>
+        <p:nvPicPr>
+          <p:cNvPr id="24" name="Picture 11" descr="http://static1.puretrend.com/articles/6/62/48/6/@/669528-iggy-pop-collabore-de-nouveau-avec-637x0-2.jpg"/>
+          <p:cNvPicPr>
+            <a:picLocks noChangeAspect="1" noChangeArrowheads="1"/>
+          </p:cNvPicPr>
+          <p:nvPr/>
+        </p:nvPicPr>
+        <p:blipFill>
+          <a:blip r:embed="rId9" cstate="print">
+            <a:extLst>
+              <a:ext uri="{28A0092B-C50C-407E-A947-70E740481C1C}">
+                <a14:useLocalDpi xmlns:a14="http://schemas.microsoft.com/office/drawing/2010/main" val="0"/>
+              </a:ext>
+            </a:extLst>
+          </a:blip>
+          <a:srcRect/>
+          <a:stretch>
+            <a:fillRect/>
+          </a:stretch>
+        </p:blipFill>
+        <p:spPr bwMode="auto">
+          <a:xfrm>
+            <a:off x="6526758" y="2157116"/>
+            <a:ext cx="357785" cy="261928"/>
+          </a:xfrm>
+          <a:prstGeom prst="rect">
+            <a:avLst/>
+          </a:prstGeom>
+          <a:noFill/>
+          <a:extLst>
+            <a:ext uri="{909E8E84-426E-40DD-AFC4-6F175D3DCCD1}">
+              <a14:hiddenFill xmlns:a14="http://schemas.microsoft.com/office/drawing/2010/main">
+                <a:solidFill>
+                  <a:srgbClr val="FFFFFF"/>
+                </a:solidFill>
+              </a14:hiddenFill>
+            </a:ext>
+          </a:extLst>
+        </p:spPr>
+      </p:pic>
+      <p:pic>
+        <p:nvPicPr>
+          <p:cNvPr id="25" name="Picture 7"/>
+          <p:cNvPicPr>
+            <a:picLocks noChangeAspect="1" noChangeArrowheads="1"/>
+          </p:cNvPicPr>
+          <p:nvPr/>
+        </p:nvPicPr>
+        <p:blipFill>
+          <a:blip r:embed="rId2">
+            <a:extLst>
+              <a:ext uri="{28A0092B-C50C-407E-A947-70E740481C1C}">
+                <a14:useLocalDpi xmlns:a14="http://schemas.microsoft.com/office/drawing/2010/main" val="0"/>
+              </a:ext>
+            </a:extLst>
+          </a:blip>
+          <a:srcRect/>
+          <a:stretch>
+            <a:fillRect/>
+          </a:stretch>
+        </p:blipFill>
+        <p:spPr bwMode="auto">
+          <a:xfrm>
+            <a:off x="107504" y="3458394"/>
+            <a:ext cx="1224136" cy="2187818"/>
+          </a:xfrm>
+          <a:prstGeom prst="rect">
+            <a:avLst/>
+          </a:prstGeom>
+          <a:noFill/>
+          <a:ln>
+            <a:noFill/>
+          </a:ln>
+          <a:effectLst/>
+          <a:extLst>
+            <a:ext uri="{909E8E84-426E-40DD-AFC4-6F175D3DCCD1}">
+              <a14:hiddenFill xmlns:a14="http://schemas.microsoft.com/office/drawing/2010/main">
+                <a:solidFill>
+                  <a:schemeClr val="accent1"/>
+                </a:solidFill>
+              </a14:hiddenFill>
+            </a:ext>
+            <a:ext uri="{91240B29-F687-4F45-9708-019B960494DF}">
+              <a14:hiddenLine xmlns:a14="http://schemas.microsoft.com/office/drawing/2010/main" w="9525">
+                <a:solidFill>
+                  <a:schemeClr val="tx1"/>
+                </a:solidFill>
+                <a:miter lim="800000"/>
+                <a:headEnd/>
+                <a:tailEnd/>
+              </a14:hiddenLine>
+            </a:ext>
+            <a:ext uri="{AF507438-7753-43E0-B8FC-AC1667EBCBE1}">
+              <a14:hiddenEffects xmlns:a14="http://schemas.microsoft.com/office/drawing/2010/main">
+                <a:effectLst>
+                  <a:outerShdw dist="35921" dir="2700000" algn="ctr" rotWithShape="0">
+                    <a:schemeClr val="bg2"/>
+                  </a:outerShdw>
+                </a:effectLst>
+              </a14:hiddenEffects>
+            </a:ext>
+          </a:extLst>
+        </p:spPr>
+      </p:pic>
+      <p:pic>
+        <p:nvPicPr>
+          <p:cNvPr id="26" name="Picture 5"/>
+          <p:cNvPicPr>
+            <a:picLocks noChangeAspect="1" noChangeArrowheads="1"/>
+          </p:cNvPicPr>
+          <p:nvPr/>
+        </p:nvPicPr>
+        <p:blipFill>
+          <a:blip r:embed="rId4">
+            <a:extLst>
+              <a:ext uri="{28A0092B-C50C-407E-A947-70E740481C1C}">
+                <a14:useLocalDpi xmlns:a14="http://schemas.microsoft.com/office/drawing/2010/main" val="0"/>
+              </a:ext>
+            </a:extLst>
+          </a:blip>
+          <a:srcRect/>
+          <a:stretch>
+            <a:fillRect/>
+          </a:stretch>
+        </p:blipFill>
+        <p:spPr bwMode="auto">
+          <a:xfrm>
+            <a:off x="619182" y="4014163"/>
+            <a:ext cx="253081" cy="213712"/>
+          </a:xfrm>
+          <a:prstGeom prst="rect">
+            <a:avLst/>
+          </a:prstGeom>
+          <a:noFill/>
+          <a:ln>
+            <a:noFill/>
+          </a:ln>
+          <a:effectLst/>
+          <a:extLst>
+            <a:ext uri="{909E8E84-426E-40DD-AFC4-6F175D3DCCD1}">
+              <a14:hiddenFill xmlns:a14="http://schemas.microsoft.com/office/drawing/2010/main">
+                <a:solidFill>
+                  <a:schemeClr val="accent1"/>
+                </a:solidFill>
+              </a14:hiddenFill>
+            </a:ext>
+            <a:ext uri="{91240B29-F687-4F45-9708-019B960494DF}">
+              <a14:hiddenLine xmlns:a14="http://schemas.microsoft.com/office/drawing/2010/main" w="9525">
+                <a:solidFill>
+                  <a:schemeClr val="tx1"/>
+                </a:solidFill>
+                <a:miter lim="800000"/>
+                <a:headEnd/>
+                <a:tailEnd/>
+              </a14:hiddenLine>
+            </a:ext>
+            <a:ext uri="{AF507438-7753-43E0-B8FC-AC1667EBCBE1}">
+              <a14:hiddenEffects xmlns:a14="http://schemas.microsoft.com/office/drawing/2010/main">
+                <a:effectLst>
+                  <a:outerShdw dist="35921" dir="2700000" algn="ctr" rotWithShape="0">
+                    <a:schemeClr val="bg2"/>
+                  </a:outerShdw>
+                </a:effectLst>
+              </a14:hiddenEffects>
+            </a:ext>
+          </a:extLst>
+        </p:spPr>
+      </p:pic>
+      <p:sp>
+        <p:nvSpPr>
+          <p:cNvPr id="30" name="Flèche droite 29"/>
+          <p:cNvSpPr/>
+          <p:nvPr/>
+        </p:nvSpPr>
+        <p:spPr>
+          <a:xfrm>
+            <a:off x="1468980" y="4489502"/>
+            <a:ext cx="524976" cy="189334"/>
+          </a:xfrm>
+          <a:prstGeom prst="rightArrow">
+            <a:avLst/>
+          </a:prstGeom>
+          <a:solidFill>
+            <a:schemeClr val="bg1"/>
+          </a:solidFill>
+          <a:ln>
+            <a:solidFill>
+              <a:schemeClr val="tx1"/>
+            </a:solidFill>
+          </a:ln>
+        </p:spPr>
+        <p:style>
+          <a:lnRef idx="2">
+            <a:schemeClr val="accent1">
+              <a:shade val="50000"/>
+            </a:schemeClr>
+          </a:lnRef>
+          <a:fillRef idx="1">
+            <a:schemeClr val="accent1"/>
+          </a:fillRef>
+          <a:effectRef idx="0">
+            <a:schemeClr val="accent1"/>
+          </a:effectRef>
+          <a:fontRef idx="minor">
+            <a:schemeClr val="lt1"/>
+          </a:fontRef>
+        </p:style>
+        <p:txBody>
+          <a:bodyPr rtlCol="0" anchor="ctr"/>
+          <a:lstStyle/>
+          <a:p>
+            <a:pPr algn="ctr"/>
+            <a:endParaRPr lang="fr-FR"/>
+          </a:p>
+        </p:txBody>
+      </p:sp>
+      <p:sp>
+        <p:nvSpPr>
+          <p:cNvPr id="31" name="Flèche droite 30"/>
+          <p:cNvSpPr/>
+          <p:nvPr/>
+        </p:nvSpPr>
+        <p:spPr>
+          <a:xfrm>
+            <a:off x="3230764" y="4489502"/>
+            <a:ext cx="524976" cy="189334"/>
+          </a:xfrm>
+          <a:prstGeom prst="rightArrow">
+            <a:avLst/>
+          </a:prstGeom>
+          <a:solidFill>
+            <a:schemeClr val="bg1"/>
+          </a:solidFill>
+          <a:ln>
+            <a:solidFill>
+              <a:schemeClr val="tx1"/>
+            </a:solidFill>
+          </a:ln>
+        </p:spPr>
+        <p:style>
+          <a:lnRef idx="2">
+            <a:schemeClr val="accent1">
+              <a:shade val="50000"/>
+            </a:schemeClr>
+          </a:lnRef>
+          <a:fillRef idx="1">
+            <a:schemeClr val="accent1"/>
+          </a:fillRef>
+          <a:effectRef idx="0">
+            <a:schemeClr val="accent1"/>
+          </a:effectRef>
+          <a:fontRef idx="minor">
+            <a:schemeClr val="lt1"/>
+          </a:fontRef>
+        </p:style>
+        <p:txBody>
+          <a:bodyPr rtlCol="0" anchor="ctr"/>
+          <a:lstStyle/>
+          <a:p>
+            <a:pPr algn="ctr"/>
+            <a:endParaRPr lang="fr-FR"/>
+          </a:p>
+        </p:txBody>
+      </p:sp>
+      <p:pic>
+        <p:nvPicPr>
+          <p:cNvPr id="33" name="Picture 7"/>
+          <p:cNvPicPr>
+            <a:picLocks noChangeAspect="1" noChangeArrowheads="1"/>
+          </p:cNvPicPr>
+          <p:nvPr/>
+        </p:nvPicPr>
+        <p:blipFill>
+          <a:blip r:embed="rId2">
+            <a:extLst>
+              <a:ext uri="{28A0092B-C50C-407E-A947-70E740481C1C}">
+                <a14:useLocalDpi xmlns:a14="http://schemas.microsoft.com/office/drawing/2010/main" val="0"/>
+              </a:ext>
+            </a:extLst>
+          </a:blip>
+          <a:srcRect/>
+          <a:stretch>
+            <a:fillRect/>
+          </a:stretch>
+        </p:blipFill>
+        <p:spPr bwMode="auto">
+          <a:xfrm>
+            <a:off x="1999596" y="3395343"/>
+            <a:ext cx="1224136" cy="2187818"/>
+          </a:xfrm>
+          <a:prstGeom prst="rect">
+            <a:avLst/>
+          </a:prstGeom>
+          <a:noFill/>
+          <a:ln>
+            <a:noFill/>
+          </a:ln>
+          <a:effectLst/>
+          <a:extLst>
+            <a:ext uri="{909E8E84-426E-40DD-AFC4-6F175D3DCCD1}">
+              <a14:hiddenFill xmlns:a14="http://schemas.microsoft.com/office/drawing/2010/main">
+                <a:solidFill>
+                  <a:schemeClr val="accent1"/>
+                </a:solidFill>
+              </a14:hiddenFill>
+            </a:ext>
+            <a:ext uri="{91240B29-F687-4F45-9708-019B960494DF}">
+              <a14:hiddenLine xmlns:a14="http://schemas.microsoft.com/office/drawing/2010/main" w="9525">
+                <a:solidFill>
+                  <a:schemeClr val="tx1"/>
+                </a:solidFill>
+                <a:miter lim="800000"/>
+                <a:headEnd/>
+                <a:tailEnd/>
+              </a14:hiddenLine>
+            </a:ext>
+            <a:ext uri="{AF507438-7753-43E0-B8FC-AC1667EBCBE1}">
+              <a14:hiddenEffects xmlns:a14="http://schemas.microsoft.com/office/drawing/2010/main">
+                <a:effectLst>
+                  <a:outerShdw dist="35921" dir="2700000" algn="ctr" rotWithShape="0">
+                    <a:schemeClr val="bg2"/>
+                  </a:outerShdw>
+                </a:effectLst>
+              </a14:hiddenEffects>
+            </a:ext>
+          </a:extLst>
+        </p:spPr>
+      </p:pic>
+      <p:sp>
+        <p:nvSpPr>
+          <p:cNvPr id="7" name="Rectangle à coins arrondis 6"/>
+          <p:cNvSpPr/>
+          <p:nvPr/>
+        </p:nvSpPr>
+        <p:spPr>
+          <a:xfrm>
+            <a:off x="395536" y="4379587"/>
+            <a:ext cx="738416" cy="148164"/>
+          </a:xfrm>
+          <a:prstGeom prst="roundRect">
+            <a:avLst/>
+          </a:prstGeom>
+          <a:solidFill>
+            <a:schemeClr val="bg1"/>
+          </a:solidFill>
+          <a:ln>
+            <a:solidFill>
+              <a:schemeClr val="tx1"/>
+            </a:solidFill>
+          </a:ln>
+        </p:spPr>
+        <p:style>
+          <a:lnRef idx="2">
+            <a:schemeClr val="accent1">
+              <a:shade val="50000"/>
+            </a:schemeClr>
+          </a:lnRef>
+          <a:fillRef idx="1">
+            <a:schemeClr val="accent1"/>
+          </a:fillRef>
+          <a:effectRef idx="0">
+            <a:schemeClr val="accent1"/>
+          </a:effectRef>
+          <a:fontRef idx="minor">
+            <a:schemeClr val="lt1"/>
+          </a:fontRef>
+        </p:style>
+        <p:txBody>
+          <a:bodyPr rtlCol="0" anchor="ctr"/>
+          <a:lstStyle/>
+          <a:p>
+            <a:r>
+              <a:rPr lang="fr-FR" sz="600" b="1" dirty="0" smtClean="0">
+                <a:solidFill>
+                  <a:schemeClr val="tx1"/>
+                </a:solidFill>
+              </a:rPr>
+              <a:t>La petite cantine</a:t>
+            </a:r>
+            <a:endParaRPr lang="fr-FR" sz="600" b="1" dirty="0">
+              <a:solidFill>
+                <a:schemeClr val="tx1"/>
+              </a:solidFill>
+            </a:endParaRPr>
+          </a:p>
+        </p:txBody>
+      </p:sp>
+      <p:sp>
+        <p:nvSpPr>
+          <p:cNvPr id="41" name="Rectangle à coins arrondis 40"/>
+          <p:cNvSpPr/>
+          <p:nvPr/>
+        </p:nvSpPr>
+        <p:spPr>
+          <a:xfrm>
+            <a:off x="386684" y="4648242"/>
+            <a:ext cx="738416" cy="148164"/>
+          </a:xfrm>
+          <a:prstGeom prst="roundRect">
+            <a:avLst/>
+          </a:prstGeom>
+          <a:solidFill>
+            <a:schemeClr val="bg1"/>
+          </a:solidFill>
+          <a:ln>
+            <a:solidFill>
+              <a:schemeClr val="tx1"/>
+            </a:solidFill>
+          </a:ln>
+        </p:spPr>
+        <p:style>
+          <a:lnRef idx="2">
+            <a:schemeClr val="accent1">
+              <a:shade val="50000"/>
+            </a:schemeClr>
+          </a:lnRef>
+          <a:fillRef idx="1">
+            <a:schemeClr val="accent1"/>
+          </a:fillRef>
+          <a:effectRef idx="0">
+            <a:schemeClr val="accent1"/>
+          </a:effectRef>
+          <a:fontRef idx="minor">
+            <a:schemeClr val="lt1"/>
+          </a:fontRef>
+        </p:style>
+        <p:txBody>
+          <a:bodyPr rtlCol="0" anchor="ctr"/>
+          <a:lstStyle/>
+          <a:p>
+            <a:r>
+              <a:rPr lang="fr-FR" sz="500" b="1" dirty="0" smtClean="0">
+                <a:solidFill>
+                  <a:schemeClr val="tx1"/>
+                </a:solidFill>
+              </a:rPr>
+              <a:t>Mc. </a:t>
+            </a:r>
+            <a:r>
+              <a:rPr lang="fr-FR" sz="500" b="1" dirty="0" err="1" smtClean="0">
+                <a:solidFill>
+                  <a:schemeClr val="tx1"/>
+                </a:solidFill>
+              </a:rPr>
+              <a:t>Donalds</a:t>
+            </a:r>
+            <a:r>
+              <a:rPr lang="fr-FR" sz="500" b="1" dirty="0" smtClean="0">
+                <a:solidFill>
+                  <a:schemeClr val="tx1"/>
+                </a:solidFill>
+              </a:rPr>
+              <a:t> – Ros</a:t>
+            </a:r>
+            <a:endParaRPr lang="fr-FR" sz="500" b="1" dirty="0">
+              <a:solidFill>
+                <a:schemeClr val="tx1"/>
+              </a:solidFill>
+            </a:endParaRPr>
+          </a:p>
+        </p:txBody>
+      </p:sp>
+      <p:sp>
+        <p:nvSpPr>
+          <p:cNvPr id="42" name="Rectangle à coins arrondis 41"/>
+          <p:cNvSpPr/>
+          <p:nvPr/>
+        </p:nvSpPr>
+        <p:spPr>
+          <a:xfrm>
+            <a:off x="386684" y="4915755"/>
+            <a:ext cx="738416" cy="148164"/>
+          </a:xfrm>
+          <a:prstGeom prst="roundRect">
+            <a:avLst/>
+          </a:prstGeom>
+          <a:solidFill>
+            <a:schemeClr val="bg1"/>
+          </a:solidFill>
+          <a:ln>
+            <a:solidFill>
+              <a:schemeClr val="tx1"/>
+            </a:solidFill>
+          </a:ln>
+        </p:spPr>
+        <p:style>
+          <a:lnRef idx="2">
+            <a:schemeClr val="accent1">
+              <a:shade val="50000"/>
+            </a:schemeClr>
+          </a:lnRef>
+          <a:fillRef idx="1">
+            <a:schemeClr val="accent1"/>
+          </a:fillRef>
+          <a:effectRef idx="0">
+            <a:schemeClr val="accent1"/>
+          </a:effectRef>
+          <a:fontRef idx="minor">
+            <a:schemeClr val="lt1"/>
+          </a:fontRef>
+        </p:style>
+        <p:txBody>
+          <a:bodyPr rtlCol="0" anchor="ctr"/>
+          <a:lstStyle/>
+          <a:p>
+            <a:r>
+              <a:rPr lang="fr-FR" sz="600" b="1" dirty="0" smtClean="0">
+                <a:solidFill>
+                  <a:schemeClr val="tx1"/>
+                </a:solidFill>
+              </a:rPr>
+              <a:t>Restau. du coin</a:t>
+            </a:r>
+            <a:endParaRPr lang="fr-FR" sz="600" b="1" dirty="0">
+              <a:solidFill>
+                <a:schemeClr val="tx1"/>
+              </a:solidFill>
+            </a:endParaRPr>
+          </a:p>
+        </p:txBody>
+      </p:sp>
+      <p:sp>
+        <p:nvSpPr>
+          <p:cNvPr id="44" name="Rectangle à coins arrondis 43"/>
+          <p:cNvSpPr/>
+          <p:nvPr/>
+        </p:nvSpPr>
+        <p:spPr>
+          <a:xfrm>
+            <a:off x="2280389" y="3972855"/>
+            <a:ext cx="738416" cy="148164"/>
+          </a:xfrm>
+          <a:prstGeom prst="roundRect">
+            <a:avLst/>
+          </a:prstGeom>
+          <a:solidFill>
+            <a:schemeClr val="bg1"/>
+          </a:solidFill>
+          <a:ln>
+            <a:solidFill>
+              <a:schemeClr val="tx1"/>
+            </a:solidFill>
+          </a:ln>
+        </p:spPr>
+        <p:style>
+          <a:lnRef idx="2">
+            <a:schemeClr val="accent1">
+              <a:shade val="50000"/>
+            </a:schemeClr>
+          </a:lnRef>
+          <a:fillRef idx="1">
+            <a:schemeClr val="accent1"/>
+          </a:fillRef>
+          <a:effectRef idx="0">
+            <a:schemeClr val="accent1"/>
+          </a:effectRef>
+          <a:fontRef idx="minor">
+            <a:schemeClr val="lt1"/>
+          </a:fontRef>
+        </p:style>
+        <p:txBody>
+          <a:bodyPr rtlCol="0" anchor="ctr"/>
+          <a:lstStyle/>
+          <a:p>
+            <a:r>
+              <a:rPr lang="fr-FR" sz="600" b="1" dirty="0" smtClean="0">
+                <a:solidFill>
+                  <a:schemeClr val="tx1"/>
+                </a:solidFill>
+              </a:rPr>
+              <a:t>La petite cantine</a:t>
+            </a:r>
+            <a:endParaRPr lang="fr-FR" sz="600" b="1" dirty="0">
+              <a:solidFill>
+                <a:schemeClr val="tx1"/>
+              </a:solidFill>
+            </a:endParaRPr>
+          </a:p>
+        </p:txBody>
+      </p:sp>
+      <p:sp>
+        <p:nvSpPr>
+          <p:cNvPr id="8" name="Rectangle 7"/>
+          <p:cNvSpPr/>
+          <p:nvPr/>
+        </p:nvSpPr>
+        <p:spPr>
+          <a:xfrm>
+            <a:off x="2374916" y="4819110"/>
+            <a:ext cx="1202072" cy="200055"/>
+          </a:xfrm>
+          <a:prstGeom prst="rect">
+            <a:avLst/>
+          </a:prstGeom>
+        </p:spPr>
+        <p:txBody>
+          <a:bodyPr wrap="square">
+            <a:spAutoFit/>
+          </a:bodyPr>
+          <a:lstStyle/>
+          <a:p>
+            <a:r>
+              <a:rPr lang="fr-FR" sz="700" b="1" u="sng" dirty="0">
+                <a:effectLst>
+                  <a:outerShdw blurRad="38100" dist="38100" dir="2700000" algn="tl">
+                    <a:srgbClr val="000000">
+                      <a:alpha val="43137"/>
+                    </a:srgbClr>
+                  </a:outerShdw>
+                </a:effectLst>
+              </a:rPr>
+              <a:t>M’y rendre</a:t>
+            </a:r>
+            <a:r>
+              <a:rPr lang="fr-FR" sz="700" u="sng" dirty="0">
+                <a:effectLst>
+                  <a:outerShdw blurRad="38100" dist="38100" dir="2700000" algn="tl">
+                    <a:srgbClr val="000000">
+                      <a:alpha val="43137"/>
+                    </a:srgbClr>
+                  </a:outerShdw>
+                </a:effectLst>
+              </a:rPr>
+              <a:t>.</a:t>
+            </a:r>
+          </a:p>
+        </p:txBody>
+      </p:sp>
+    </p:spTree>
+    <p:extLst>
+      <p:ext uri="{BB962C8B-B14F-4D97-AF65-F5344CB8AC3E}">
+        <p14:creationId xmlns:p14="http://schemas.microsoft.com/office/powerpoint/2010/main" val="4273158477"/>
+      </p:ext>
+    </p:extLst>
+  </p:cSld>
+  <p:clrMapOvr>
+    <a:masterClrMapping/>
+  </p:clrMapOvr>
+  <p:timing>
+    <p:tnLst>
+      <p:par>
+        <p:cTn id="1" dur="indefinite" restart="never" nodeType="tmRoot"/>
+      </p:par>
+    </p:tnLst>
+  </p:timing>
 </p:sld>
 </file>
 

</xml_diff>

<commit_message>
Mise à jour du scénario : Récupérer Infos Commerce
</commit_message>
<xml_diff>
--- a/Diagrammes/Scenarios - Schemas.pptx
+++ b/Diagrammes/Scenarios - Schemas.pptx
@@ -4151,6 +4151,13 @@
   <p:clrMapOvr>
     <a:masterClrMapping/>
   </p:clrMapOvr>
+  <p:timing>
+    <p:tnLst>
+      <p:par>
+        <p:cTn id="1" dur="indefinite" restart="never" nodeType="tmRoot"/>
+      </p:par>
+    </p:tnLst>
+  </p:timing>
 </p:sld>
 </file>
 
@@ -5507,7 +5514,7 @@
       </p:pic>
       <p:pic>
         <p:nvPicPr>
-          <p:cNvPr id="1031" name="Picture 7" descr="C:\Users\Jeremie\Documents\Etudes\2011-2013 - UTT\Semestre 5\IF11\Projet\Maquettes\Flashage_QR_Code.png"/>
+          <p:cNvPr id="1029" name="Picture 5" descr="C:\Users\Jeremie\Downloads\1369879765_Android-QR-Code.png"/>
           <p:cNvPicPr>
             <a:picLocks noChangeAspect="1" noChangeArrowheads="1"/>
           </p:cNvPicPr>
@@ -5527,9 +5534,9 @@
           </a:stretch>
         </p:blipFill>
         <p:spPr bwMode="auto">
-          <a:xfrm>
-            <a:off x="3189318" y="2347130"/>
-            <a:ext cx="657666" cy="1189104"/>
+          <a:xfrm rot="18900000">
+            <a:off x="4443582" y="2523054"/>
+            <a:ext cx="962176" cy="962176"/>
           </a:xfrm>
           <a:prstGeom prst="rect">
             <a:avLst/>
@@ -5546,9 +5553,95 @@
           </a:extLst>
         </p:spPr>
       </p:pic>
+      <p:sp>
+        <p:nvSpPr>
+          <p:cNvPr id="4" name="Ellipse 3"/>
+          <p:cNvSpPr/>
+          <p:nvPr/>
+        </p:nvSpPr>
+        <p:spPr>
+          <a:xfrm>
+            <a:off x="3986436" y="4781229"/>
+            <a:ext cx="1218056" cy="1218056"/>
+          </a:xfrm>
+          <a:prstGeom prst="ellipse">
+            <a:avLst/>
+          </a:prstGeom>
+          <a:noFill/>
+          <a:ln w="76200">
+            <a:solidFill>
+              <a:schemeClr val="tx1"/>
+            </a:solidFill>
+          </a:ln>
+        </p:spPr>
+        <p:style>
+          <a:lnRef idx="1">
+            <a:schemeClr val="dk1"/>
+          </a:lnRef>
+          <a:fillRef idx="2">
+            <a:schemeClr val="dk1"/>
+          </a:fillRef>
+          <a:effectRef idx="1">
+            <a:schemeClr val="dk1"/>
+          </a:effectRef>
+          <a:fontRef idx="minor">
+            <a:schemeClr val="dk1"/>
+          </a:fontRef>
+        </p:style>
+        <p:txBody>
+          <a:bodyPr rtlCol="0" anchor="ctr"/>
+          <a:lstStyle/>
+          <a:p>
+            <a:pPr algn="ctr"/>
+            <a:r>
+              <a:rPr lang="fr-FR" sz="9600" b="1" dirty="0" smtClean="0"/>
+              <a:t>1</a:t>
+            </a:r>
+            <a:endParaRPr lang="fr-FR" sz="9600" b="1" dirty="0"/>
+          </a:p>
+        </p:txBody>
+      </p:sp>
+      <p:sp>
+        <p:nvSpPr>
+          <p:cNvPr id="2" name="Flèche droite 1"/>
+          <p:cNvSpPr/>
+          <p:nvPr/>
+        </p:nvSpPr>
+        <p:spPr>
+          <a:xfrm>
+            <a:off x="3948980" y="2760075"/>
+            <a:ext cx="720080" cy="488133"/>
+          </a:xfrm>
+          <a:prstGeom prst="rightArrow">
+            <a:avLst/>
+          </a:prstGeom>
+        </p:spPr>
+        <p:style>
+          <a:lnRef idx="3">
+            <a:schemeClr val="lt1"/>
+          </a:lnRef>
+          <a:fillRef idx="1">
+            <a:schemeClr val="accent2"/>
+          </a:fillRef>
+          <a:effectRef idx="1">
+            <a:schemeClr val="accent2"/>
+          </a:effectRef>
+          <a:fontRef idx="minor">
+            <a:schemeClr val="lt1"/>
+          </a:fontRef>
+        </p:style>
+        <p:txBody>
+          <a:bodyPr rtlCol="0" anchor="ctr"/>
+          <a:lstStyle/>
+          <a:p>
+            <a:pPr algn="ctr"/>
+            <a:endParaRPr lang="fr-FR"/>
+          </a:p>
+        </p:txBody>
+      </p:sp>
       <p:pic>
         <p:nvPicPr>
-          <p:cNvPr id="1029" name="Picture 5" descr="C:\Users\Jeremie\Downloads\1369879765_Android-QR-Code.png"/>
+          <p:cNvPr id="3" name="Picture 2" descr="C:\Users\Jeremie\Documents\Etudes\2011-2013 - UTT\Semestre 5\IF11\Projet\Maquettes\Prototype\scan_qrcode.png"/>
           <p:cNvPicPr>
             <a:picLocks noChangeAspect="1" noChangeArrowheads="1"/>
           </p:cNvPicPr>
@@ -5568,9 +5661,9 @@
           </a:stretch>
         </p:blipFill>
         <p:spPr bwMode="auto">
-          <a:xfrm rot="18900000">
-            <a:off x="4443582" y="2523054"/>
-            <a:ext cx="962176" cy="962176"/>
+          <a:xfrm>
+            <a:off x="3128673" y="2350279"/>
+            <a:ext cx="727050" cy="1307724"/>
           </a:xfrm>
           <a:prstGeom prst="rect">
             <a:avLst/>
@@ -5587,92 +5680,6 @@
           </a:extLst>
         </p:spPr>
       </p:pic>
-      <p:sp>
-        <p:nvSpPr>
-          <p:cNvPr id="4" name="Ellipse 3"/>
-          <p:cNvSpPr/>
-          <p:nvPr/>
-        </p:nvSpPr>
-        <p:spPr>
-          <a:xfrm>
-            <a:off x="3986436" y="4781229"/>
-            <a:ext cx="1218056" cy="1218056"/>
-          </a:xfrm>
-          <a:prstGeom prst="ellipse">
-            <a:avLst/>
-          </a:prstGeom>
-          <a:noFill/>
-          <a:ln w="76200">
-            <a:solidFill>
-              <a:schemeClr val="tx1"/>
-            </a:solidFill>
-          </a:ln>
-        </p:spPr>
-        <p:style>
-          <a:lnRef idx="1">
-            <a:schemeClr val="dk1"/>
-          </a:lnRef>
-          <a:fillRef idx="2">
-            <a:schemeClr val="dk1"/>
-          </a:fillRef>
-          <a:effectRef idx="1">
-            <a:schemeClr val="dk1"/>
-          </a:effectRef>
-          <a:fontRef idx="minor">
-            <a:schemeClr val="dk1"/>
-          </a:fontRef>
-        </p:style>
-        <p:txBody>
-          <a:bodyPr rtlCol="0" anchor="ctr"/>
-          <a:lstStyle/>
-          <a:p>
-            <a:pPr algn="ctr"/>
-            <a:r>
-              <a:rPr lang="fr-FR" sz="9600" b="1" dirty="0" smtClean="0"/>
-              <a:t>1</a:t>
-            </a:r>
-            <a:endParaRPr lang="fr-FR" sz="9600" b="1" dirty="0"/>
-          </a:p>
-        </p:txBody>
-      </p:sp>
-      <p:sp>
-        <p:nvSpPr>
-          <p:cNvPr id="2" name="Flèche droite 1"/>
-          <p:cNvSpPr/>
-          <p:nvPr/>
-        </p:nvSpPr>
-        <p:spPr>
-          <a:xfrm>
-            <a:off x="3948980" y="2760075"/>
-            <a:ext cx="720080" cy="488133"/>
-          </a:xfrm>
-          <a:prstGeom prst="rightArrow">
-            <a:avLst/>
-          </a:prstGeom>
-        </p:spPr>
-        <p:style>
-          <a:lnRef idx="3">
-            <a:schemeClr val="lt1"/>
-          </a:lnRef>
-          <a:fillRef idx="1">
-            <a:schemeClr val="accent2"/>
-          </a:fillRef>
-          <a:effectRef idx="1">
-            <a:schemeClr val="accent2"/>
-          </a:effectRef>
-          <a:fontRef idx="minor">
-            <a:schemeClr val="lt1"/>
-          </a:fontRef>
-        </p:style>
-        <p:txBody>
-          <a:bodyPr rtlCol="0" anchor="ctr"/>
-          <a:lstStyle/>
-          <a:p>
-            <a:pPr algn="ctr"/>
-            <a:endParaRPr lang="fr-FR"/>
-          </a:p>
-        </p:txBody>
-      </p:sp>
     </p:spTree>
     <p:extLst>
       <p:ext uri="{BB962C8B-B14F-4D97-AF65-F5344CB8AC3E}">
@@ -5683,6 +5690,13 @@
   <p:clrMapOvr>
     <a:masterClrMapping/>
   </p:clrMapOvr>
+  <p:timing>
+    <p:tnLst>
+      <p:par>
+        <p:cTn id="1" dur="indefinite" restart="never" nodeType="tmRoot"/>
+      </p:par>
+    </p:tnLst>
+  </p:timing>
 </p:sld>
 </file>
 
@@ -5703,9 +5717,52 @@
           <a:chExt cx="0" cy="0"/>
         </a:xfrm>
       </p:grpSpPr>
+      <p:sp>
+        <p:nvSpPr>
+          <p:cNvPr id="5" name="Ellipse 4"/>
+          <p:cNvSpPr/>
+          <p:nvPr/>
+        </p:nvSpPr>
+        <p:spPr>
+          <a:xfrm>
+            <a:off x="3986436" y="4781229"/>
+            <a:ext cx="1218056" cy="1218056"/>
+          </a:xfrm>
+          <a:prstGeom prst="ellipse">
+            <a:avLst/>
+          </a:prstGeom>
+          <a:noFill/>
+          <a:ln w="76200"/>
+        </p:spPr>
+        <p:style>
+          <a:lnRef idx="1">
+            <a:schemeClr val="dk1"/>
+          </a:lnRef>
+          <a:fillRef idx="2">
+            <a:schemeClr val="dk1"/>
+          </a:fillRef>
+          <a:effectRef idx="1">
+            <a:schemeClr val="dk1"/>
+          </a:effectRef>
+          <a:fontRef idx="minor">
+            <a:schemeClr val="dk1"/>
+          </a:fontRef>
+        </p:style>
+        <p:txBody>
+          <a:bodyPr rtlCol="0" anchor="ctr"/>
+          <a:lstStyle/>
+          <a:p>
+            <a:pPr algn="ctr"/>
+            <a:r>
+              <a:rPr lang="fr-FR" sz="9600" b="1" dirty="0"/>
+              <a:t>2</a:t>
+            </a:r>
+          </a:p>
+        </p:txBody>
+      </p:sp>
       <p:pic>
         <p:nvPicPr>
-          <p:cNvPr id="2050" name="Picture 2" descr="C:\Users\Jeremie\Documents\Etudes\2011-2013 - UTT\Semestre 5\IF11\Projet\Maquettes\Affichage_Menu_Restaurant.png"/>
+          <p:cNvPr id="2" name="Picture 2" descr="C:\Users\Jeremie\Documents\Etudes\2011-2013 - UTT\Semestre 5\IF11\Projet\Maquettes\Prototype\realite_augmentee.png"/>
           <p:cNvPicPr>
             <a:picLocks noChangeAspect="1" noChangeArrowheads="1"/>
           </p:cNvPicPr>
@@ -5726,8 +5783,8 @@
         </p:blipFill>
         <p:spPr bwMode="auto">
           <a:xfrm>
-            <a:off x="2606326" y="2132855"/>
-            <a:ext cx="3978275" cy="2263775"/>
+            <a:off x="3602692" y="692696"/>
+            <a:ext cx="1985543" cy="3825520"/>
           </a:xfrm>
           <a:prstGeom prst="rect">
             <a:avLst/>
@@ -5744,49 +5801,6 @@
           </a:extLst>
         </p:spPr>
       </p:pic>
-      <p:sp>
-        <p:nvSpPr>
-          <p:cNvPr id="5" name="Ellipse 4"/>
-          <p:cNvSpPr/>
-          <p:nvPr/>
-        </p:nvSpPr>
-        <p:spPr>
-          <a:xfrm>
-            <a:off x="3986436" y="4781229"/>
-            <a:ext cx="1218056" cy="1218056"/>
-          </a:xfrm>
-          <a:prstGeom prst="ellipse">
-            <a:avLst/>
-          </a:prstGeom>
-          <a:noFill/>
-          <a:ln w="76200"/>
-        </p:spPr>
-        <p:style>
-          <a:lnRef idx="1">
-            <a:schemeClr val="dk1"/>
-          </a:lnRef>
-          <a:fillRef idx="2">
-            <a:schemeClr val="dk1"/>
-          </a:fillRef>
-          <a:effectRef idx="1">
-            <a:schemeClr val="dk1"/>
-          </a:effectRef>
-          <a:fontRef idx="minor">
-            <a:schemeClr val="dk1"/>
-          </a:fontRef>
-        </p:style>
-        <p:txBody>
-          <a:bodyPr rtlCol="0" anchor="ctr"/>
-          <a:lstStyle/>
-          <a:p>
-            <a:pPr algn="ctr"/>
-            <a:r>
-              <a:rPr lang="fr-FR" sz="9600" b="1" dirty="0"/>
-              <a:t>2</a:t>
-            </a:r>
-          </a:p>
-        </p:txBody>
-      </p:sp>
     </p:spTree>
     <p:extLst>
       <p:ext uri="{BB962C8B-B14F-4D97-AF65-F5344CB8AC3E}">
@@ -5797,6 +5811,13 @@
   <p:clrMapOvr>
     <a:masterClrMapping/>
   </p:clrMapOvr>
+  <p:timing>
+    <p:tnLst>
+      <p:par>
+        <p:cTn id="1" dur="indefinite" restart="never" nodeType="tmRoot"/>
+      </p:par>
+    </p:tnLst>
+  </p:timing>
 </p:sld>
 </file>
 

</xml_diff>

<commit_message>
Mise à jour des maquettes et du scénario "Récupérer Infos Commerce"
</commit_message>
<xml_diff>
--- a/Diagrammes/Scenarios - Schemas.pptx
+++ b/Diagrammes/Scenarios - Schemas.pptx
@@ -199,7 +199,7 @@
           <a:p>
             <a:fld id="{9DC360AA-BC29-41D1-BC41-D450D544EA21}" type="datetimeFigureOut">
               <a:rPr lang="fr-FR" smtClean="0"/>
-              <a:t>04/06/2013</a:t>
+              <a:t>05/06/2013</a:t>
             </a:fld>
             <a:endParaRPr lang="fr-FR"/>
           </a:p>
@@ -1294,7 +1294,7 @@
           <a:p>
             <a:fld id="{ADD8993A-F23A-49CB-BEF1-B5681606AAB7}" type="datetimeFigureOut">
               <a:rPr lang="fr-FR" smtClean="0"/>
-              <a:t>04/06/2013</a:t>
+              <a:t>05/06/2013</a:t>
             </a:fld>
             <a:endParaRPr lang="fr-FR"/>
           </a:p>
@@ -1464,7 +1464,7 @@
           <a:p>
             <a:fld id="{ADD8993A-F23A-49CB-BEF1-B5681606AAB7}" type="datetimeFigureOut">
               <a:rPr lang="fr-FR" smtClean="0"/>
-              <a:t>04/06/2013</a:t>
+              <a:t>05/06/2013</a:t>
             </a:fld>
             <a:endParaRPr lang="fr-FR"/>
           </a:p>
@@ -1644,7 +1644,7 @@
           <a:p>
             <a:fld id="{ADD8993A-F23A-49CB-BEF1-B5681606AAB7}" type="datetimeFigureOut">
               <a:rPr lang="fr-FR" smtClean="0"/>
-              <a:t>04/06/2013</a:t>
+              <a:t>05/06/2013</a:t>
             </a:fld>
             <a:endParaRPr lang="fr-FR"/>
           </a:p>
@@ -1814,7 +1814,7 @@
           <a:p>
             <a:fld id="{ADD8993A-F23A-49CB-BEF1-B5681606AAB7}" type="datetimeFigureOut">
               <a:rPr lang="fr-FR" smtClean="0"/>
-              <a:t>04/06/2013</a:t>
+              <a:t>05/06/2013</a:t>
             </a:fld>
             <a:endParaRPr lang="fr-FR"/>
           </a:p>
@@ -2060,7 +2060,7 @@
           <a:p>
             <a:fld id="{ADD8993A-F23A-49CB-BEF1-B5681606AAB7}" type="datetimeFigureOut">
               <a:rPr lang="fr-FR" smtClean="0"/>
-              <a:t>04/06/2013</a:t>
+              <a:t>05/06/2013</a:t>
             </a:fld>
             <a:endParaRPr lang="fr-FR"/>
           </a:p>
@@ -2348,7 +2348,7 @@
           <a:p>
             <a:fld id="{ADD8993A-F23A-49CB-BEF1-B5681606AAB7}" type="datetimeFigureOut">
               <a:rPr lang="fr-FR" smtClean="0"/>
-              <a:t>04/06/2013</a:t>
+              <a:t>05/06/2013</a:t>
             </a:fld>
             <a:endParaRPr lang="fr-FR"/>
           </a:p>
@@ -2770,7 +2770,7 @@
           <a:p>
             <a:fld id="{ADD8993A-F23A-49CB-BEF1-B5681606AAB7}" type="datetimeFigureOut">
               <a:rPr lang="fr-FR" smtClean="0"/>
-              <a:t>04/06/2013</a:t>
+              <a:t>05/06/2013</a:t>
             </a:fld>
             <a:endParaRPr lang="fr-FR"/>
           </a:p>
@@ -2888,7 +2888,7 @@
           <a:p>
             <a:fld id="{ADD8993A-F23A-49CB-BEF1-B5681606AAB7}" type="datetimeFigureOut">
               <a:rPr lang="fr-FR" smtClean="0"/>
-              <a:t>04/06/2013</a:t>
+              <a:t>05/06/2013</a:t>
             </a:fld>
             <a:endParaRPr lang="fr-FR"/>
           </a:p>
@@ -2983,7 +2983,7 @@
           <a:p>
             <a:fld id="{ADD8993A-F23A-49CB-BEF1-B5681606AAB7}" type="datetimeFigureOut">
               <a:rPr lang="fr-FR" smtClean="0"/>
-              <a:t>04/06/2013</a:t>
+              <a:t>05/06/2013</a:t>
             </a:fld>
             <a:endParaRPr lang="fr-FR"/>
           </a:p>
@@ -3260,7 +3260,7 @@
           <a:p>
             <a:fld id="{ADD8993A-F23A-49CB-BEF1-B5681606AAB7}" type="datetimeFigureOut">
               <a:rPr lang="fr-FR" smtClean="0"/>
-              <a:t>04/06/2013</a:t>
+              <a:t>05/06/2013</a:t>
             </a:fld>
             <a:endParaRPr lang="fr-FR"/>
           </a:p>
@@ -3513,7 +3513,7 @@
           <a:p>
             <a:fld id="{ADD8993A-F23A-49CB-BEF1-B5681606AAB7}" type="datetimeFigureOut">
               <a:rPr lang="fr-FR" smtClean="0"/>
-              <a:t>04/06/2013</a:t>
+              <a:t>05/06/2013</a:t>
             </a:fld>
             <a:endParaRPr lang="fr-FR"/>
           </a:p>
@@ -3726,7 +3726,7 @@
           <a:p>
             <a:fld id="{ADD8993A-F23A-49CB-BEF1-B5681606AAB7}" type="datetimeFigureOut">
               <a:rPr lang="fr-FR" smtClean="0"/>
-              <a:t>04/06/2013</a:t>
+              <a:t>05/06/2013</a:t>
             </a:fld>
             <a:endParaRPr lang="fr-FR"/>
           </a:p>
@@ -5762,7 +5762,7 @@
       </p:sp>
       <p:pic>
         <p:nvPicPr>
-          <p:cNvPr id="2" name="Picture 2" descr="C:\Users\Jeremie\Documents\Etudes\2011-2013 - UTT\Semestre 5\IF11\Projet\Maquettes\Prototype\realite_augmentee.png"/>
+          <p:cNvPr id="1026" name="Picture 2" descr="C:\Users\Jeremie\Documents\Etudes\2011-2013 - UTT\Semestre 5\IF11\Projet\Maquettes\Prototype\realitee_augmentee_2.png"/>
           <p:cNvPicPr>
             <a:picLocks noChangeAspect="1" noChangeArrowheads="1"/>
           </p:cNvPicPr>
@@ -5783,8 +5783,8 @@
         </p:blipFill>
         <p:spPr bwMode="auto">
           <a:xfrm>
-            <a:off x="3602692" y="692696"/>
-            <a:ext cx="1985543" cy="3825520"/>
+            <a:off x="2179289" y="1628800"/>
+            <a:ext cx="4832350" cy="2508250"/>
           </a:xfrm>
           <a:prstGeom prst="rect">
             <a:avLst/>

</xml_diff>

<commit_message>
Mise à jour de scénarios
</commit_message>
<xml_diff>
--- a/Diagrammes/Scenarios - Schemas.pptx
+++ b/Diagrammes/Scenarios - Schemas.pptx
@@ -5,7 +5,7 @@
     <p:sldMasterId id="2147483648" r:id="rId1"/>
   </p:sldMasterIdLst>
   <p:notesMasterIdLst>
-    <p:notesMasterId r:id="rId10"/>
+    <p:notesMasterId r:id="rId11"/>
   </p:notesMasterIdLst>
   <p:sldIdLst>
     <p:sldId id="256" r:id="rId2"/>
@@ -13,9 +13,10 @@
     <p:sldId id="260" r:id="rId4"/>
     <p:sldId id="261" r:id="rId5"/>
     <p:sldId id="262" r:id="rId6"/>
-    <p:sldId id="258" r:id="rId7"/>
-    <p:sldId id="257" r:id="rId8"/>
-    <p:sldId id="263" r:id="rId9"/>
+    <p:sldId id="264" r:id="rId7"/>
+    <p:sldId id="265" r:id="rId8"/>
+    <p:sldId id="258" r:id="rId9"/>
+    <p:sldId id="257" r:id="rId10"/>
   </p:sldIdLst>
   <p:sldSz cx="9144000" cy="6858000" type="screen4x3"/>
   <p:notesSz cx="6858000" cy="9144000"/>
@@ -968,8 +969,13 @@
           <a:p>
             <a:r>
               <a:rPr lang="fr-FR" dirty="0" smtClean="0"/>
-              <a:t>Récupérer des informations sur un commerce (1/2)</a:t>
-            </a:r>
+              <a:t>Rechercher</a:t>
+            </a:r>
+            <a:r>
+              <a:rPr lang="fr-FR" baseline="0" dirty="0" smtClean="0"/>
+              <a:t> un commerce (2)</a:t>
+            </a:r>
+            <a:endParaRPr lang="fr-FR" dirty="0" smtClean="0"/>
           </a:p>
         </p:txBody>
       </p:sp>
@@ -1053,6 +1059,185 @@
           <a:bodyPr/>
           <a:lstStyle/>
           <a:p>
+            <a:r>
+              <a:rPr lang="fr-FR" dirty="0" smtClean="0"/>
+              <a:t>Rechercher</a:t>
+            </a:r>
+            <a:r>
+              <a:rPr lang="fr-FR" baseline="0" dirty="0" smtClean="0"/>
+              <a:t> un commerce (2)</a:t>
+            </a:r>
+            <a:endParaRPr lang="fr-FR" dirty="0" smtClean="0"/>
+          </a:p>
+        </p:txBody>
+      </p:sp>
+      <p:sp>
+        <p:nvSpPr>
+          <p:cNvPr id="4" name="Espace réservé du numéro de diapositive 3"/>
+          <p:cNvSpPr>
+            <a:spLocks noGrp="1"/>
+          </p:cNvSpPr>
+          <p:nvPr>
+            <p:ph type="sldNum" sz="quarter" idx="10"/>
+          </p:nvPr>
+        </p:nvSpPr>
+        <p:spPr/>
+        <p:txBody>
+          <a:bodyPr/>
+          <a:lstStyle/>
+          <a:p>
+            <a:fld id="{70C5B279-D8FA-4EB8-A0B5-CACAE048C97A}" type="slidenum">
+              <a:rPr lang="fr-FR" smtClean="0"/>
+              <a:t>7</a:t>
+            </a:fld>
+            <a:endParaRPr lang="fr-FR"/>
+          </a:p>
+        </p:txBody>
+      </p:sp>
+    </p:spTree>
+    <p:extLst>
+      <p:ext uri="{BB962C8B-B14F-4D97-AF65-F5344CB8AC3E}">
+        <p14:creationId xmlns:p14="http://schemas.microsoft.com/office/powerpoint/2010/main" val="2110943"/>
+      </p:ext>
+    </p:extLst>
+  </p:cSld>
+  <p:clrMapOvr>
+    <a:masterClrMapping/>
+  </p:clrMapOvr>
+</p:notes>
+</file>
+
+<file path=ppt/notesSlides/notesSlide8.xml><?xml version="1.0" encoding="utf-8"?>
+<p:notes xmlns:a="http://schemas.openxmlformats.org/drawingml/2006/main" xmlns:r="http://schemas.openxmlformats.org/officeDocument/2006/relationships" xmlns:p="http://schemas.openxmlformats.org/presentationml/2006/main">
+  <p:cSld>
+    <p:spTree>
+      <p:nvGrpSpPr>
+        <p:cNvPr id="1" name=""/>
+        <p:cNvGrpSpPr/>
+        <p:nvPr/>
+      </p:nvGrpSpPr>
+      <p:grpSpPr>
+        <a:xfrm>
+          <a:off x="0" y="0"/>
+          <a:ext cx="0" cy="0"/>
+          <a:chOff x="0" y="0"/>
+          <a:chExt cx="0" cy="0"/>
+        </a:xfrm>
+      </p:grpSpPr>
+      <p:sp>
+        <p:nvSpPr>
+          <p:cNvPr id="2" name="Espace réservé de l'image des diapositives 1"/>
+          <p:cNvSpPr>
+            <a:spLocks noGrp="1" noRot="1" noChangeAspect="1"/>
+          </p:cNvSpPr>
+          <p:nvPr>
+            <p:ph type="sldImg"/>
+          </p:nvPr>
+        </p:nvSpPr>
+        <p:spPr/>
+      </p:sp>
+      <p:sp>
+        <p:nvSpPr>
+          <p:cNvPr id="3" name="Espace réservé des commentaires 2"/>
+          <p:cNvSpPr>
+            <a:spLocks noGrp="1"/>
+          </p:cNvSpPr>
+          <p:nvPr>
+            <p:ph type="body" idx="1"/>
+          </p:nvPr>
+        </p:nvSpPr>
+        <p:spPr/>
+        <p:txBody>
+          <a:bodyPr/>
+          <a:lstStyle/>
+          <a:p>
+            <a:r>
+              <a:rPr lang="fr-FR" dirty="0" smtClean="0"/>
+              <a:t>Récupérer des informations sur un commerce (1/2)</a:t>
+            </a:r>
+          </a:p>
+        </p:txBody>
+      </p:sp>
+      <p:sp>
+        <p:nvSpPr>
+          <p:cNvPr id="4" name="Espace réservé du numéro de diapositive 3"/>
+          <p:cNvSpPr>
+            <a:spLocks noGrp="1"/>
+          </p:cNvSpPr>
+          <p:nvPr>
+            <p:ph type="sldNum" sz="quarter" idx="10"/>
+          </p:nvPr>
+        </p:nvSpPr>
+        <p:spPr/>
+        <p:txBody>
+          <a:bodyPr/>
+          <a:lstStyle/>
+          <a:p>
+            <a:fld id="{70C5B279-D8FA-4EB8-A0B5-CACAE048C97A}" type="slidenum">
+              <a:rPr lang="fr-FR" smtClean="0"/>
+              <a:t>8</a:t>
+            </a:fld>
+            <a:endParaRPr lang="fr-FR"/>
+          </a:p>
+        </p:txBody>
+      </p:sp>
+    </p:spTree>
+    <p:extLst>
+      <p:ext uri="{BB962C8B-B14F-4D97-AF65-F5344CB8AC3E}">
+        <p14:creationId xmlns:p14="http://schemas.microsoft.com/office/powerpoint/2010/main" val="2110943"/>
+      </p:ext>
+    </p:extLst>
+  </p:cSld>
+  <p:clrMapOvr>
+    <a:masterClrMapping/>
+  </p:clrMapOvr>
+</p:notes>
+</file>
+
+<file path=ppt/notesSlides/notesSlide9.xml><?xml version="1.0" encoding="utf-8"?>
+<p:notes xmlns:a="http://schemas.openxmlformats.org/drawingml/2006/main" xmlns:r="http://schemas.openxmlformats.org/officeDocument/2006/relationships" xmlns:p="http://schemas.openxmlformats.org/presentationml/2006/main">
+  <p:cSld>
+    <p:spTree>
+      <p:nvGrpSpPr>
+        <p:cNvPr id="1" name=""/>
+        <p:cNvGrpSpPr/>
+        <p:nvPr/>
+      </p:nvGrpSpPr>
+      <p:grpSpPr>
+        <a:xfrm>
+          <a:off x="0" y="0"/>
+          <a:ext cx="0" cy="0"/>
+          <a:chOff x="0" y="0"/>
+          <a:chExt cx="0" cy="0"/>
+        </a:xfrm>
+      </p:grpSpPr>
+      <p:sp>
+        <p:nvSpPr>
+          <p:cNvPr id="2" name="Espace réservé de l'image des diapositives 1"/>
+          <p:cNvSpPr>
+            <a:spLocks noGrp="1" noRot="1" noChangeAspect="1"/>
+          </p:cNvSpPr>
+          <p:nvPr>
+            <p:ph type="sldImg"/>
+          </p:nvPr>
+        </p:nvSpPr>
+        <p:spPr/>
+      </p:sp>
+      <p:sp>
+        <p:nvSpPr>
+          <p:cNvPr id="3" name="Espace réservé des commentaires 2"/>
+          <p:cNvSpPr>
+            <a:spLocks noGrp="1"/>
+          </p:cNvSpPr>
+          <p:nvPr>
+            <p:ph type="body" idx="1"/>
+          </p:nvPr>
+        </p:nvSpPr>
+        <p:spPr/>
+        <p:txBody>
+          <a:bodyPr/>
+          <a:lstStyle/>
+          <a:p>
             <a:pPr marL="0" marR="0" indent="0" algn="l" defTabSz="914400" rtl="0" eaLnBrk="1" fontAlgn="auto" latinLnBrk="0" hangingPunct="1">
               <a:lnSpc>
                 <a:spcPct val="100000"/>
@@ -1094,7 +1279,7 @@
           <a:p>
             <a:fld id="{70C5B279-D8FA-4EB8-A0B5-CACAE048C97A}" type="slidenum">
               <a:rPr lang="fr-FR" smtClean="0"/>
-              <a:t>7</a:t>
+              <a:t>9</a:t>
             </a:fld>
             <a:endParaRPr lang="fr-FR"/>
           </a:p>
@@ -4109,7 +4294,127 @@
         </p:nvSpPr>
         <p:spPr>
           <a:xfrm>
-            <a:off x="3275856" y="2420888"/>
+            <a:off x="971600" y="908721"/>
+            <a:ext cx="1375951" cy="1152128"/>
+          </a:xfrm>
+          <a:prstGeom prst="rightArrow">
+            <a:avLst/>
+          </a:prstGeom>
+          <a:noFill/>
+          <a:ln w="76200"/>
+        </p:spPr>
+        <p:style>
+          <a:lnRef idx="1">
+            <a:schemeClr val="dk1"/>
+          </a:lnRef>
+          <a:fillRef idx="2">
+            <a:schemeClr val="dk1"/>
+          </a:fillRef>
+          <a:effectRef idx="1">
+            <a:schemeClr val="dk1"/>
+          </a:effectRef>
+          <a:fontRef idx="minor">
+            <a:schemeClr val="dk1"/>
+          </a:fontRef>
+        </p:style>
+        <p:txBody>
+          <a:bodyPr rtlCol="0" anchor="ctr"/>
+          <a:lstStyle/>
+          <a:p>
+            <a:pPr algn="ctr"/>
+            <a:endParaRPr lang="fr-FR"/>
+          </a:p>
+        </p:txBody>
+      </p:sp>
+      <p:sp>
+        <p:nvSpPr>
+          <p:cNvPr id="3" name="Flèche droite 2"/>
+          <p:cNvSpPr/>
+          <p:nvPr/>
+        </p:nvSpPr>
+        <p:spPr>
+          <a:xfrm rot="16200000">
+            <a:off x="1029231" y="4077072"/>
+            <a:ext cx="2296591" cy="1923009"/>
+          </a:xfrm>
+          <a:prstGeom prst="rightArrow">
+            <a:avLst/>
+          </a:prstGeom>
+          <a:noFill/>
+          <a:ln w="76200"/>
+        </p:spPr>
+        <p:style>
+          <a:lnRef idx="1">
+            <a:schemeClr val="dk1"/>
+          </a:lnRef>
+          <a:fillRef idx="2">
+            <a:schemeClr val="dk1"/>
+          </a:fillRef>
+          <a:effectRef idx="1">
+            <a:schemeClr val="dk1"/>
+          </a:effectRef>
+          <a:fontRef idx="minor">
+            <a:schemeClr val="dk1"/>
+          </a:fontRef>
+        </p:style>
+        <p:txBody>
+          <a:bodyPr rtlCol="0" anchor="ctr"/>
+          <a:lstStyle/>
+          <a:p>
+            <a:pPr algn="ctr"/>
+            <a:endParaRPr lang="fr-FR"/>
+          </a:p>
+        </p:txBody>
+      </p:sp>
+      <p:sp>
+        <p:nvSpPr>
+          <p:cNvPr id="4" name="Flèche droite 3"/>
+          <p:cNvSpPr/>
+          <p:nvPr/>
+        </p:nvSpPr>
+        <p:spPr>
+          <a:xfrm rot="5400000">
+            <a:off x="4499992" y="1196752"/>
+            <a:ext cx="2296591" cy="1923009"/>
+          </a:xfrm>
+          <a:prstGeom prst="rightArrow">
+            <a:avLst/>
+          </a:prstGeom>
+          <a:noFill/>
+          <a:ln w="76200"/>
+        </p:spPr>
+        <p:style>
+          <a:lnRef idx="1">
+            <a:schemeClr val="dk1"/>
+          </a:lnRef>
+          <a:fillRef idx="2">
+            <a:schemeClr val="dk1"/>
+          </a:fillRef>
+          <a:effectRef idx="1">
+            <a:schemeClr val="dk1"/>
+          </a:effectRef>
+          <a:fontRef idx="minor">
+            <a:schemeClr val="dk1"/>
+          </a:fontRef>
+        </p:style>
+        <p:txBody>
+          <a:bodyPr rtlCol="0" anchor="ctr"/>
+          <a:lstStyle/>
+          <a:p>
+            <a:pPr algn="ctr"/>
+            <a:endParaRPr lang="fr-FR"/>
+          </a:p>
+        </p:txBody>
+      </p:sp>
+      <p:sp>
+        <p:nvSpPr>
+          <p:cNvPr id="5" name="Flèche droite 4"/>
+          <p:cNvSpPr/>
+          <p:nvPr/>
+        </p:nvSpPr>
+        <p:spPr>
+          <a:xfrm rot="10800000">
+            <a:off x="4686783" y="4263863"/>
             <a:ext cx="2296591" cy="1923009"/>
           </a:xfrm>
           <a:prstGeom prst="rightArrow">
@@ -4516,7 +4821,7 @@
         <p:spPr>
           <a:xfrm>
             <a:off x="3263316" y="1008956"/>
-            <a:ext cx="2664296" cy="720080"/>
+            <a:ext cx="2964868" cy="720080"/>
           </a:xfrm>
           <a:prstGeom prst="roundRect">
             <a:avLst/>
@@ -4545,7 +4850,7 @@
             <a:pPr algn="ctr"/>
             <a:r>
               <a:rPr lang="fr-FR" sz="4400" b="1" dirty="0" err="1" smtClean="0"/>
-              <a:t>Flashmutt</a:t>
+              <a:t>FlashmUTT</a:t>
             </a:r>
             <a:endParaRPr lang="fr-FR" sz="4400" b="1" dirty="0"/>
           </a:p>
@@ -4906,14 +5211,14 @@
       </p:sp>
       <p:pic>
         <p:nvPicPr>
-          <p:cNvPr id="2050" name="Picture 2" descr="C:\Users\Jeremie\Downloads\phone.png"/>
+          <p:cNvPr id="1026" name="Picture 2" descr="C:\Users\Jeremie\Documents\Etudes\2011-2013 - UTT\Semestre 5\IF11\Projet\Maquettes\Prototype\categorie_2.png"/>
           <p:cNvPicPr>
             <a:picLocks noChangeAspect="1" noChangeArrowheads="1"/>
           </p:cNvPicPr>
           <p:nvPr/>
         </p:nvPicPr>
         <p:blipFill>
-          <a:blip r:embed="rId3" cstate="print">
+          <a:blip r:embed="rId3">
             <a:extLst>
               <a:ext uri="{28A0092B-C50C-407E-A947-70E740481C1C}">
                 <a14:useLocalDpi xmlns:a14="http://schemas.microsoft.com/office/drawing/2010/main" val="0"/>
@@ -4927,172 +5232,8 @@
         </p:blipFill>
         <p:spPr bwMode="auto">
           <a:xfrm>
-            <a:off x="3587352" y="764704"/>
-            <a:ext cx="2016224" cy="3645286"/>
-          </a:xfrm>
-          <a:prstGeom prst="rect">
-            <a:avLst/>
-          </a:prstGeom>
-          <a:noFill/>
-          <a:extLst>
-            <a:ext uri="{909E8E84-426E-40DD-AFC4-6F175D3DCCD1}">
-              <a14:hiddenFill xmlns:a14="http://schemas.microsoft.com/office/drawing/2010/main">
-                <a:solidFill>
-                  <a:srgbClr val="FFFFFF"/>
-                </a:solidFill>
-              </a14:hiddenFill>
-            </a:ext>
-          </a:extLst>
-        </p:spPr>
-      </p:pic>
-      <p:pic>
-        <p:nvPicPr>
-          <p:cNvPr id="5" name="Picture 3" descr="C:\Users\Jeremie\Documents\Etudes\2011-2013 - UTT\Semestre 5\IF11\Projet\Maquettes\1369915707_fast-food.png"/>
-          <p:cNvPicPr>
-            <a:picLocks noChangeAspect="1" noChangeArrowheads="1"/>
-          </p:cNvPicPr>
-          <p:nvPr/>
-        </p:nvPicPr>
-        <p:blipFill>
-          <a:blip r:embed="rId4" cstate="print">
-            <a:extLst>
-              <a:ext uri="{28A0092B-C50C-407E-A947-70E740481C1C}">
-                <a14:useLocalDpi xmlns:a14="http://schemas.microsoft.com/office/drawing/2010/main" val="0"/>
-              </a:ext>
-            </a:extLst>
-          </a:blip>
-          <a:srcRect/>
-          <a:stretch>
-            <a:fillRect/>
-          </a:stretch>
-        </p:blipFill>
-        <p:spPr bwMode="auto">
-          <a:xfrm>
-            <a:off x="3936308" y="1625810"/>
-            <a:ext cx="610469" cy="610469"/>
-          </a:xfrm>
-          <a:prstGeom prst="rect">
-            <a:avLst/>
-          </a:prstGeom>
-          <a:noFill/>
-          <a:extLst>
-            <a:ext uri="{909E8E84-426E-40DD-AFC4-6F175D3DCCD1}">
-              <a14:hiddenFill xmlns:a14="http://schemas.microsoft.com/office/drawing/2010/main">
-                <a:solidFill>
-                  <a:srgbClr val="FFFFFF"/>
-                </a:solidFill>
-              </a14:hiddenFill>
-            </a:ext>
-          </a:extLst>
-        </p:spPr>
-      </p:pic>
-      <p:pic>
-        <p:nvPicPr>
-          <p:cNvPr id="1028" name="Picture 4" descr="C:\Users\Jeremie\Documents\Etudes\2011-2013 - UTT\Semestre 5\IF11\Projet\Maquettes\1369915737_t-shirt.png"/>
-          <p:cNvPicPr>
-            <a:picLocks noChangeAspect="1" noChangeArrowheads="1"/>
-          </p:cNvPicPr>
-          <p:nvPr/>
-        </p:nvPicPr>
-        <p:blipFill>
-          <a:blip r:embed="rId5" cstate="print">
-            <a:extLst>
-              <a:ext uri="{28A0092B-C50C-407E-A947-70E740481C1C}">
-                <a14:useLocalDpi xmlns:a14="http://schemas.microsoft.com/office/drawing/2010/main" val="0"/>
-              </a:ext>
-            </a:extLst>
-          </a:blip>
-          <a:srcRect/>
-          <a:stretch>
-            <a:fillRect/>
-          </a:stretch>
-        </p:blipFill>
-        <p:spPr bwMode="auto">
-          <a:xfrm>
-            <a:off x="4759880" y="1713885"/>
-            <a:ext cx="434318" cy="434318"/>
-          </a:xfrm>
-          <a:prstGeom prst="rect">
-            <a:avLst/>
-          </a:prstGeom>
-          <a:noFill/>
-          <a:extLst>
-            <a:ext uri="{909E8E84-426E-40DD-AFC4-6F175D3DCCD1}">
-              <a14:hiddenFill xmlns:a14="http://schemas.microsoft.com/office/drawing/2010/main">
-                <a:solidFill>
-                  <a:srgbClr val="FFFFFF"/>
-                </a:solidFill>
-              </a14:hiddenFill>
-            </a:ext>
-          </a:extLst>
-        </p:spPr>
-      </p:pic>
-      <p:pic>
-        <p:nvPicPr>
-          <p:cNvPr id="1029" name="Picture 5" descr="C:\Users\Jeremie\Documents\Etudes\2011-2013 - UTT\Semestre 5\IF11\Projet\Maquettes\iconmonstr-home-6-icon.png"/>
-          <p:cNvPicPr>
-            <a:picLocks noChangeAspect="1" noChangeArrowheads="1"/>
-          </p:cNvPicPr>
-          <p:nvPr/>
-        </p:nvPicPr>
-        <p:blipFill>
-          <a:blip r:embed="rId6" cstate="print">
-            <a:extLst>
-              <a:ext uri="{28A0092B-C50C-407E-A947-70E740481C1C}">
-                <a14:useLocalDpi xmlns:a14="http://schemas.microsoft.com/office/drawing/2010/main" val="0"/>
-              </a:ext>
-            </a:extLst>
-          </a:blip>
-          <a:srcRect/>
-          <a:stretch>
-            <a:fillRect/>
-          </a:stretch>
-        </p:blipFill>
-        <p:spPr bwMode="auto">
-          <a:xfrm>
-            <a:off x="3914288" y="2249528"/>
-            <a:ext cx="654511" cy="654511"/>
-          </a:xfrm>
-          <a:prstGeom prst="rect">
-            <a:avLst/>
-          </a:prstGeom>
-          <a:noFill/>
-          <a:extLst>
-            <a:ext uri="{909E8E84-426E-40DD-AFC4-6F175D3DCCD1}">
-              <a14:hiddenFill xmlns:a14="http://schemas.microsoft.com/office/drawing/2010/main">
-                <a:solidFill>
-                  <a:srgbClr val="FFFFFF"/>
-                </a:solidFill>
-              </a14:hiddenFill>
-            </a:ext>
-          </a:extLst>
-        </p:spPr>
-      </p:pic>
-      <p:pic>
-        <p:nvPicPr>
-          <p:cNvPr id="1030" name="Picture 6" descr="C:\Users\Jeremie\Documents\Etudes\2011-2013 - UTT\Semestre 5\IF11\Projet\Maquettes\1369915694_cafe_coffee.png"/>
-          <p:cNvPicPr>
-            <a:picLocks noChangeAspect="1" noChangeArrowheads="1"/>
-          </p:cNvPicPr>
-          <p:nvPr/>
-        </p:nvPicPr>
-        <p:blipFill>
-          <a:blip r:embed="rId7" cstate="print">
-            <a:extLst>
-              <a:ext uri="{28A0092B-C50C-407E-A947-70E740481C1C}">
-                <a14:useLocalDpi xmlns:a14="http://schemas.microsoft.com/office/drawing/2010/main" val="0"/>
-              </a:ext>
-            </a:extLst>
-          </a:blip>
-          <a:srcRect/>
-          <a:stretch>
-            <a:fillRect/>
-          </a:stretch>
-        </p:blipFill>
-        <p:spPr bwMode="auto">
-          <a:xfrm>
-            <a:off x="4726536" y="2358862"/>
-            <a:ext cx="501005" cy="501005"/>
+            <a:off x="3594726" y="836712"/>
+            <a:ext cx="2001476" cy="3600000"/>
           </a:xfrm>
           <a:prstGeom prst="rect">
             <a:avLst/>
@@ -5188,14 +5329,14 @@
       </p:sp>
       <p:pic>
         <p:nvPicPr>
-          <p:cNvPr id="2050" name="Picture 2" descr="C:\Users\Jeremie\Downloads\phone.png"/>
+          <p:cNvPr id="2" name="Picture 2" descr="C:\Users\Jeremie\Documents\Etudes\2011-2013 - UTT\Semestre 5\IF11\Projet\Maquettes\Prototype\liste_pizzeria_2.png"/>
           <p:cNvPicPr>
             <a:picLocks noChangeAspect="1" noChangeArrowheads="1"/>
           </p:cNvPicPr>
           <p:nvPr/>
         </p:nvPicPr>
         <p:blipFill>
-          <a:blip r:embed="rId3" cstate="print">
+          <a:blip r:embed="rId3">
             <a:extLst>
               <a:ext uri="{28A0092B-C50C-407E-A947-70E740481C1C}">
                 <a14:useLocalDpi xmlns:a14="http://schemas.microsoft.com/office/drawing/2010/main" val="0"/>
@@ -5209,8 +5350,8 @@
         </p:blipFill>
         <p:spPr bwMode="auto">
           <a:xfrm>
-            <a:off x="3587352" y="764704"/>
-            <a:ext cx="2016224" cy="3645286"/>
+            <a:off x="3594726" y="835576"/>
+            <a:ext cx="2001476" cy="3600000"/>
           </a:xfrm>
           <a:prstGeom prst="rect">
             <a:avLst/>
@@ -5227,16 +5368,94 @@
           </a:extLst>
         </p:spPr>
       </p:pic>
+    </p:spTree>
+    <p:extLst>
+      <p:ext uri="{BB962C8B-B14F-4D97-AF65-F5344CB8AC3E}">
+        <p14:creationId xmlns:p14="http://schemas.microsoft.com/office/powerpoint/2010/main" val="3857384284"/>
+      </p:ext>
+    </p:extLst>
+  </p:cSld>
+  <p:clrMapOvr>
+    <a:masterClrMapping/>
+  </p:clrMapOvr>
+</p:sld>
+</file>
+
+<file path=ppt/slides/slide6.xml><?xml version="1.0" encoding="utf-8"?>
+<p:sld xmlns:a="http://schemas.openxmlformats.org/drawingml/2006/main" xmlns:r="http://schemas.openxmlformats.org/officeDocument/2006/relationships" xmlns:p="http://schemas.openxmlformats.org/presentationml/2006/main">
+  <p:cSld>
+    <p:spTree>
+      <p:nvGrpSpPr>
+        <p:cNvPr id="1" name=""/>
+        <p:cNvGrpSpPr/>
+        <p:nvPr/>
+      </p:nvGrpSpPr>
+      <p:grpSpPr>
+        <a:xfrm>
+          <a:off x="0" y="0"/>
+          <a:ext cx="0" cy="0"/>
+          <a:chOff x="0" y="0"/>
+          <a:chExt cx="0" cy="0"/>
+        </a:xfrm>
+      </p:grpSpPr>
+      <p:sp>
+        <p:nvSpPr>
+          <p:cNvPr id="4" name="Ellipse 3"/>
+          <p:cNvSpPr/>
+          <p:nvPr/>
+        </p:nvSpPr>
+        <p:spPr>
+          <a:xfrm>
+            <a:off x="3986436" y="4781229"/>
+            <a:ext cx="1218056" cy="1218056"/>
+          </a:xfrm>
+          <a:prstGeom prst="ellipse">
+            <a:avLst/>
+          </a:prstGeom>
+          <a:noFill/>
+          <a:ln w="76200">
+            <a:solidFill>
+              <a:schemeClr val="tx1"/>
+            </a:solidFill>
+          </a:ln>
+        </p:spPr>
+        <p:style>
+          <a:lnRef idx="1">
+            <a:schemeClr val="dk1"/>
+          </a:lnRef>
+          <a:fillRef idx="2">
+            <a:schemeClr val="dk1"/>
+          </a:fillRef>
+          <a:effectRef idx="1">
+            <a:schemeClr val="dk1"/>
+          </a:effectRef>
+          <a:fontRef idx="minor">
+            <a:schemeClr val="dk1"/>
+          </a:fontRef>
+        </p:style>
+        <p:txBody>
+          <a:bodyPr rtlCol="0" anchor="ctr"/>
+          <a:lstStyle/>
+          <a:p>
+            <a:pPr algn="ctr"/>
+            <a:r>
+              <a:rPr lang="fr-FR" sz="9600" b="1" dirty="0"/>
+              <a:t>5</a:t>
+            </a:r>
+            <a:endParaRPr lang="fr-FR" sz="9600" b="1" dirty="0"/>
+          </a:p>
+        </p:txBody>
+      </p:sp>
       <p:pic>
         <p:nvPicPr>
-          <p:cNvPr id="5" name="Picture 3" descr="C:\Users\Jeremie\Documents\Etudes\2011-2013 - UTT\Semestre 5\IF11\Projet\Maquettes\1369915707_fast-food.png"/>
+          <p:cNvPr id="3074" name="Picture 2" descr="C:\Users\Jeremie\Documents\Etudes\2011-2013 - UTT\Semestre 5\IF11\Projet\Maquettes\Prototype\selection_pizzeria.png"/>
           <p:cNvPicPr>
             <a:picLocks noChangeAspect="1" noChangeArrowheads="1"/>
           </p:cNvPicPr>
           <p:nvPr/>
         </p:nvPicPr>
         <p:blipFill>
-          <a:blip r:embed="rId4" cstate="print">
+          <a:blip r:embed="rId3">
             <a:extLst>
               <a:ext uri="{28A0092B-C50C-407E-A947-70E740481C1C}">
                 <a14:useLocalDpi xmlns:a14="http://schemas.microsoft.com/office/drawing/2010/main" val="0"/>
@@ -5250,8 +5469,8 @@
         </p:blipFill>
         <p:spPr bwMode="auto">
           <a:xfrm>
-            <a:off x="4290229" y="1604229"/>
-            <a:ext cx="610469" cy="610469"/>
+            <a:off x="3697499" y="940728"/>
+            <a:ext cx="1795929" cy="3384000"/>
           </a:xfrm>
           <a:prstGeom prst="rect">
             <a:avLst/>
@@ -5268,142 +5487,10 @@
           </a:extLst>
         </p:spPr>
       </p:pic>
-      <p:sp>
-        <p:nvSpPr>
-          <p:cNvPr id="8" name="Rectangle à coins arrondis 7"/>
-          <p:cNvSpPr/>
-          <p:nvPr/>
-        </p:nvSpPr>
-        <p:spPr>
-          <a:xfrm>
-            <a:off x="3839380" y="2214697"/>
-            <a:ext cx="1512167" cy="372649"/>
-          </a:xfrm>
-          <a:prstGeom prst="roundRect">
-            <a:avLst/>
-          </a:prstGeom>
-          <a:noFill/>
-          <a:ln w="28575"/>
-        </p:spPr>
-        <p:style>
-          <a:lnRef idx="1">
-            <a:schemeClr val="dk1"/>
-          </a:lnRef>
-          <a:fillRef idx="2">
-            <a:schemeClr val="dk1"/>
-          </a:fillRef>
-          <a:effectRef idx="1">
-            <a:schemeClr val="dk1"/>
-          </a:effectRef>
-          <a:fontRef idx="minor">
-            <a:schemeClr val="dk1"/>
-          </a:fontRef>
-        </p:style>
-        <p:txBody>
-          <a:bodyPr rtlCol="0" anchor="ctr"/>
-          <a:lstStyle/>
-          <a:p>
-            <a:pPr algn="ctr"/>
-            <a:r>
-              <a:rPr lang="fr-FR" sz="1400" b="1" dirty="0" smtClean="0"/>
-              <a:t>L’antre au goût</a:t>
-            </a:r>
-            <a:endParaRPr lang="fr-FR" sz="1400" b="1" dirty="0"/>
-          </a:p>
-        </p:txBody>
-      </p:sp>
-      <p:sp>
-        <p:nvSpPr>
-          <p:cNvPr id="9" name="Rectangle à coins arrondis 8"/>
-          <p:cNvSpPr/>
-          <p:nvPr/>
-        </p:nvSpPr>
-        <p:spPr>
-          <a:xfrm>
-            <a:off x="3839380" y="2725594"/>
-            <a:ext cx="1512167" cy="372649"/>
-          </a:xfrm>
-          <a:prstGeom prst="roundRect">
-            <a:avLst/>
-          </a:prstGeom>
-          <a:noFill/>
-          <a:ln w="28575"/>
-        </p:spPr>
-        <p:style>
-          <a:lnRef idx="1">
-            <a:schemeClr val="dk1"/>
-          </a:lnRef>
-          <a:fillRef idx="2">
-            <a:schemeClr val="dk1"/>
-          </a:fillRef>
-          <a:effectRef idx="1">
-            <a:schemeClr val="dk1"/>
-          </a:effectRef>
-          <a:fontRef idx="minor">
-            <a:schemeClr val="dk1"/>
-          </a:fontRef>
-        </p:style>
-        <p:txBody>
-          <a:bodyPr rtlCol="0" anchor="ctr"/>
-          <a:lstStyle/>
-          <a:p>
-            <a:pPr algn="ctr"/>
-            <a:r>
-              <a:rPr lang="fr-FR" sz="1400" b="1" dirty="0" err="1" smtClean="0"/>
-              <a:t>Pulp</a:t>
-            </a:r>
-            <a:endParaRPr lang="fr-FR" sz="1400" b="1" dirty="0"/>
-          </a:p>
-        </p:txBody>
-      </p:sp>
-      <p:sp>
-        <p:nvSpPr>
-          <p:cNvPr id="10" name="Rectangle à coins arrondis 9"/>
-          <p:cNvSpPr/>
-          <p:nvPr/>
-        </p:nvSpPr>
-        <p:spPr>
-          <a:xfrm>
-            <a:off x="3839380" y="3216026"/>
-            <a:ext cx="1512167" cy="372649"/>
-          </a:xfrm>
-          <a:prstGeom prst="roundRect">
-            <a:avLst/>
-          </a:prstGeom>
-          <a:noFill/>
-          <a:ln w="28575"/>
-        </p:spPr>
-        <p:style>
-          <a:lnRef idx="1">
-            <a:schemeClr val="dk1"/>
-          </a:lnRef>
-          <a:fillRef idx="2">
-            <a:schemeClr val="dk1"/>
-          </a:fillRef>
-          <a:effectRef idx="1">
-            <a:schemeClr val="dk1"/>
-          </a:effectRef>
-          <a:fontRef idx="minor">
-            <a:schemeClr val="dk1"/>
-          </a:fontRef>
-        </p:style>
-        <p:txBody>
-          <a:bodyPr rtlCol="0" anchor="ctr"/>
-          <a:lstStyle/>
-          <a:p>
-            <a:pPr algn="ctr"/>
-            <a:r>
-              <a:rPr lang="fr-FR" sz="1400" b="1" dirty="0" smtClean="0"/>
-              <a:t>La petite cantine</a:t>
-            </a:r>
-            <a:endParaRPr lang="fr-FR" sz="1400" b="1" dirty="0"/>
-          </a:p>
-        </p:txBody>
-      </p:sp>
     </p:spTree>
     <p:extLst>
       <p:ext uri="{BB962C8B-B14F-4D97-AF65-F5344CB8AC3E}">
-        <p14:creationId xmlns:p14="http://schemas.microsoft.com/office/powerpoint/2010/main" val="3857384284"/>
+        <p14:creationId xmlns:p14="http://schemas.microsoft.com/office/powerpoint/2010/main" val="1039710271"/>
       </p:ext>
     </p:extLst>
   </p:cSld>
@@ -5413,7 +5500,125 @@
 </p:sld>
 </file>
 
-<file path=ppt/slides/slide6.xml><?xml version="1.0" encoding="utf-8"?>
+<file path=ppt/slides/slide7.xml><?xml version="1.0" encoding="utf-8"?>
+<p:sld xmlns:a="http://schemas.openxmlformats.org/drawingml/2006/main" xmlns:r="http://schemas.openxmlformats.org/officeDocument/2006/relationships" xmlns:p="http://schemas.openxmlformats.org/presentationml/2006/main">
+  <p:cSld>
+    <p:spTree>
+      <p:nvGrpSpPr>
+        <p:cNvPr id="1" name=""/>
+        <p:cNvGrpSpPr/>
+        <p:nvPr/>
+      </p:nvGrpSpPr>
+      <p:grpSpPr>
+        <a:xfrm>
+          <a:off x="0" y="0"/>
+          <a:ext cx="0" cy="0"/>
+          <a:chOff x="0" y="0"/>
+          <a:chExt cx="0" cy="0"/>
+        </a:xfrm>
+      </p:grpSpPr>
+      <p:sp>
+        <p:nvSpPr>
+          <p:cNvPr id="4" name="Ellipse 3"/>
+          <p:cNvSpPr/>
+          <p:nvPr/>
+        </p:nvSpPr>
+        <p:spPr>
+          <a:xfrm>
+            <a:off x="3986436" y="4781229"/>
+            <a:ext cx="1218056" cy="1218056"/>
+          </a:xfrm>
+          <a:prstGeom prst="ellipse">
+            <a:avLst/>
+          </a:prstGeom>
+          <a:noFill/>
+          <a:ln w="76200">
+            <a:solidFill>
+              <a:schemeClr val="tx1"/>
+            </a:solidFill>
+          </a:ln>
+        </p:spPr>
+        <p:style>
+          <a:lnRef idx="1">
+            <a:schemeClr val="dk1"/>
+          </a:lnRef>
+          <a:fillRef idx="2">
+            <a:schemeClr val="dk1"/>
+          </a:fillRef>
+          <a:effectRef idx="1">
+            <a:schemeClr val="dk1"/>
+          </a:effectRef>
+          <a:fontRef idx="minor">
+            <a:schemeClr val="dk1"/>
+          </a:fontRef>
+        </p:style>
+        <p:txBody>
+          <a:bodyPr rtlCol="0" anchor="ctr"/>
+          <a:lstStyle/>
+          <a:p>
+            <a:pPr algn="ctr"/>
+            <a:r>
+              <a:rPr lang="fr-FR" sz="9600" b="1" dirty="0"/>
+              <a:t>6</a:t>
+            </a:r>
+          </a:p>
+        </p:txBody>
+      </p:sp>
+      <p:pic>
+        <p:nvPicPr>
+          <p:cNvPr id="4098" name="Picture 2" descr="C:\Users\Jeremie\Documents\Etudes\2011-2013 - UTT\Semestre 5\IF11\Projet\Maquettes\Prototype\calcul_itineraire_modifiee.png"/>
+          <p:cNvPicPr>
+            <a:picLocks noChangeAspect="1" noChangeArrowheads="1"/>
+          </p:cNvPicPr>
+          <p:nvPr/>
+        </p:nvPicPr>
+        <p:blipFill>
+          <a:blip r:embed="rId3">
+            <a:extLst>
+              <a:ext uri="{28A0092B-C50C-407E-A947-70E740481C1C}">
+                <a14:useLocalDpi xmlns:a14="http://schemas.microsoft.com/office/drawing/2010/main" val="0"/>
+              </a:ext>
+            </a:extLst>
+          </a:blip>
+          <a:srcRect/>
+          <a:stretch>
+            <a:fillRect/>
+          </a:stretch>
+        </p:blipFill>
+        <p:spPr bwMode="auto">
+          <a:xfrm>
+            <a:off x="3594726" y="830048"/>
+            <a:ext cx="2001476" cy="3600000"/>
+          </a:xfrm>
+          <a:prstGeom prst="rect">
+            <a:avLst/>
+          </a:prstGeom>
+          <a:noFill/>
+          <a:extLst>
+            <a:ext uri="{909E8E84-426E-40DD-AFC4-6F175D3DCCD1}">
+              <a14:hiddenFill xmlns:a14="http://schemas.microsoft.com/office/drawing/2010/main">
+                <a:solidFill>
+                  <a:srgbClr val="FFFFFF"/>
+                </a:solidFill>
+              </a14:hiddenFill>
+            </a:ext>
+          </a:extLst>
+        </p:spPr>
+      </p:pic>
+    </p:spTree>
+    <p:extLst>
+      <p:ext uri="{BB962C8B-B14F-4D97-AF65-F5344CB8AC3E}">
+        <p14:creationId xmlns:p14="http://schemas.microsoft.com/office/powerpoint/2010/main" val="3900161436"/>
+      </p:ext>
+    </p:extLst>
+  </p:cSld>
+  <p:clrMapOvr>
+    <a:masterClrMapping/>
+  </p:clrMapOvr>
+</p:sld>
+</file>
+
+<file path=ppt/slides/slide8.xml><?xml version="1.0" encoding="utf-8"?>
 <p:sld xmlns:a="http://schemas.openxmlformats.org/drawingml/2006/main" xmlns:r="http://schemas.openxmlformats.org/officeDocument/2006/relationships" xmlns:p="http://schemas.openxmlformats.org/presentationml/2006/main">
   <p:cSld>
     <p:spTree>
@@ -5700,7 +5905,7 @@
 </p:sld>
 </file>
 
-<file path=ppt/slides/slide7.xml><?xml version="1.0" encoding="utf-8"?>
+<file path=ppt/slides/slide9.xml><?xml version="1.0" encoding="utf-8"?>
 <p:sld xmlns:a="http://schemas.openxmlformats.org/drawingml/2006/main" xmlns:r="http://schemas.openxmlformats.org/officeDocument/2006/relationships" xmlns:p="http://schemas.openxmlformats.org/presentationml/2006/main">
   <p:cSld>
     <p:spTree>
@@ -5805,1596 +6010,6 @@
     <p:extLst>
       <p:ext uri="{BB962C8B-B14F-4D97-AF65-F5344CB8AC3E}">
         <p14:creationId xmlns:p14="http://schemas.microsoft.com/office/powerpoint/2010/main" val="3409763043"/>
-      </p:ext>
-    </p:extLst>
-  </p:cSld>
-  <p:clrMapOvr>
-    <a:masterClrMapping/>
-  </p:clrMapOvr>
-  <p:timing>
-    <p:tnLst>
-      <p:par>
-        <p:cTn id="1" dur="indefinite" restart="never" nodeType="tmRoot"/>
-      </p:par>
-    </p:tnLst>
-  </p:timing>
-</p:sld>
-</file>
-
-<file path=ppt/slides/slide8.xml><?xml version="1.0" encoding="utf-8"?>
-<p:sld xmlns:a="http://schemas.openxmlformats.org/drawingml/2006/main" xmlns:r="http://schemas.openxmlformats.org/officeDocument/2006/relationships" xmlns:p="http://schemas.openxmlformats.org/presentationml/2006/main">
-  <p:cSld>
-    <p:spTree>
-      <p:nvGrpSpPr>
-        <p:cNvPr id="1" name=""/>
-        <p:cNvGrpSpPr/>
-        <p:nvPr/>
-      </p:nvGrpSpPr>
-      <p:grpSpPr>
-        <a:xfrm>
-          <a:off x="0" y="0"/>
-          <a:ext cx="0" cy="0"/>
-          <a:chOff x="0" y="0"/>
-          <a:chExt cx="0" cy="0"/>
-        </a:xfrm>
-      </p:grpSpPr>
-      <p:pic>
-        <p:nvPicPr>
-          <p:cNvPr id="17" name="Picture 7"/>
-          <p:cNvPicPr>
-            <a:picLocks noChangeAspect="1" noChangeArrowheads="1"/>
-          </p:cNvPicPr>
-          <p:nvPr/>
-        </p:nvPicPr>
-        <p:blipFill>
-          <a:blip r:embed="rId2">
-            <a:extLst>
-              <a:ext uri="{28A0092B-C50C-407E-A947-70E740481C1C}">
-                <a14:useLocalDpi xmlns:a14="http://schemas.microsoft.com/office/drawing/2010/main" val="0"/>
-              </a:ext>
-            </a:extLst>
-          </a:blip>
-          <a:srcRect/>
-          <a:stretch>
-            <a:fillRect/>
-          </a:stretch>
-        </p:blipFill>
-        <p:spPr bwMode="auto">
-          <a:xfrm>
-            <a:off x="3827943" y="3359760"/>
-            <a:ext cx="1224136" cy="2187818"/>
-          </a:xfrm>
-          <a:prstGeom prst="rect">
-            <a:avLst/>
-          </a:prstGeom>
-          <a:noFill/>
-          <a:ln>
-            <a:noFill/>
-          </a:ln>
-          <a:effectLst/>
-          <a:extLst>
-            <a:ext uri="{909E8E84-426E-40DD-AFC4-6F175D3DCCD1}">
-              <a14:hiddenFill xmlns:a14="http://schemas.microsoft.com/office/drawing/2010/main">
-                <a:solidFill>
-                  <a:schemeClr val="accent1"/>
-                </a:solidFill>
-              </a14:hiddenFill>
-            </a:ext>
-            <a:ext uri="{91240B29-F687-4F45-9708-019B960494DF}">
-              <a14:hiddenLine xmlns:a14="http://schemas.microsoft.com/office/drawing/2010/main" w="9525">
-                <a:solidFill>
-                  <a:schemeClr val="tx1"/>
-                </a:solidFill>
-                <a:miter lim="800000"/>
-                <a:headEnd/>
-                <a:tailEnd/>
-              </a14:hiddenLine>
-            </a:ext>
-            <a:ext uri="{AF507438-7753-43E0-B8FC-AC1667EBCBE1}">
-              <a14:hiddenEffects xmlns:a14="http://schemas.microsoft.com/office/drawing/2010/main">
-                <a:effectLst>
-                  <a:outerShdw dist="35921" dir="2700000" algn="ctr" rotWithShape="0">
-                    <a:schemeClr val="bg2"/>
-                  </a:outerShdw>
-                </a:effectLst>
-              </a14:hiddenEffects>
-            </a:ext>
-          </a:extLst>
-        </p:spPr>
-      </p:pic>
-      <p:pic>
-        <p:nvPicPr>
-          <p:cNvPr id="1027" name="Picture 3"/>
-          <p:cNvPicPr>
-            <a:picLocks noChangeAspect="1" noChangeArrowheads="1"/>
-          </p:cNvPicPr>
-          <p:nvPr/>
-        </p:nvPicPr>
-        <p:blipFill>
-          <a:blip r:embed="rId3">
-            <a:extLst>
-              <a:ext uri="{28A0092B-C50C-407E-A947-70E740481C1C}">
-                <a14:useLocalDpi xmlns:a14="http://schemas.microsoft.com/office/drawing/2010/main" val="0"/>
-              </a:ext>
-            </a:extLst>
-          </a:blip>
-          <a:srcRect/>
-          <a:stretch>
-            <a:fillRect/>
-          </a:stretch>
-        </p:blipFill>
-        <p:spPr bwMode="auto">
-          <a:xfrm>
-            <a:off x="2377953" y="1385982"/>
-            <a:ext cx="666750" cy="1466850"/>
-          </a:xfrm>
-          <a:prstGeom prst="rect">
-            <a:avLst/>
-          </a:prstGeom>
-          <a:noFill/>
-          <a:ln>
-            <a:noFill/>
-          </a:ln>
-          <a:effectLst/>
-          <a:extLst>
-            <a:ext uri="{909E8E84-426E-40DD-AFC4-6F175D3DCCD1}">
-              <a14:hiddenFill xmlns:a14="http://schemas.microsoft.com/office/drawing/2010/main">
-                <a:solidFill>
-                  <a:schemeClr val="accent1"/>
-                </a:solidFill>
-              </a14:hiddenFill>
-            </a:ext>
-            <a:ext uri="{91240B29-F687-4F45-9708-019B960494DF}">
-              <a14:hiddenLine xmlns:a14="http://schemas.microsoft.com/office/drawing/2010/main" w="9525">
-                <a:solidFill>
-                  <a:schemeClr val="tx1"/>
-                </a:solidFill>
-                <a:miter lim="800000"/>
-                <a:headEnd/>
-                <a:tailEnd/>
-              </a14:hiddenLine>
-            </a:ext>
-            <a:ext uri="{AF507438-7753-43E0-B8FC-AC1667EBCBE1}">
-              <a14:hiddenEffects xmlns:a14="http://schemas.microsoft.com/office/drawing/2010/main">
-                <a:effectLst>
-                  <a:outerShdw dist="35921" dir="2700000" algn="ctr" rotWithShape="0">
-                    <a:schemeClr val="bg2"/>
-                  </a:outerShdw>
-                </a:effectLst>
-              </a14:hiddenEffects>
-            </a:ext>
-          </a:extLst>
-        </p:spPr>
-      </p:pic>
-      <p:sp>
-        <p:nvSpPr>
-          <p:cNvPr id="4" name="Rectangle à coins arrondis 3"/>
-          <p:cNvSpPr/>
-          <p:nvPr/>
-        </p:nvSpPr>
-        <p:spPr>
-          <a:xfrm>
-            <a:off x="2854463" y="993969"/>
-            <a:ext cx="409817" cy="318585"/>
-          </a:xfrm>
-          <a:prstGeom prst="wedgeRoundRectCallout">
-            <a:avLst>
-              <a:gd name="adj1" fmla="val -45163"/>
-              <a:gd name="adj2" fmla="val 120545"/>
-              <a:gd name="adj3" fmla="val 16667"/>
-            </a:avLst>
-          </a:prstGeom>
-          <a:solidFill>
-            <a:schemeClr val="bg1"/>
-          </a:solidFill>
-          <a:ln>
-            <a:solidFill>
-              <a:schemeClr val="tx1"/>
-            </a:solidFill>
-          </a:ln>
-        </p:spPr>
-        <p:style>
-          <a:lnRef idx="2">
-            <a:schemeClr val="accent1">
-              <a:shade val="50000"/>
-            </a:schemeClr>
-          </a:lnRef>
-          <a:fillRef idx="1">
-            <a:schemeClr val="accent1"/>
-          </a:fillRef>
-          <a:effectRef idx="0">
-            <a:schemeClr val="accent1"/>
-          </a:effectRef>
-          <a:fontRef idx="minor">
-            <a:schemeClr val="lt1"/>
-          </a:fontRef>
-        </p:style>
-        <p:txBody>
-          <a:bodyPr rtlCol="0" anchor="ctr"/>
-          <a:lstStyle/>
-          <a:p>
-            <a:pPr algn="ctr"/>
-            <a:endParaRPr lang="fr-FR"/>
-          </a:p>
-        </p:txBody>
-      </p:sp>
-      <p:pic>
-        <p:nvPicPr>
-          <p:cNvPr id="1029" name="Picture 5"/>
-          <p:cNvPicPr>
-            <a:picLocks noChangeAspect="1" noChangeArrowheads="1"/>
-          </p:cNvPicPr>
-          <p:nvPr/>
-        </p:nvPicPr>
-        <p:blipFill>
-          <a:blip r:embed="rId4">
-            <a:extLst>
-              <a:ext uri="{28A0092B-C50C-407E-A947-70E740481C1C}">
-                <a14:useLocalDpi xmlns:a14="http://schemas.microsoft.com/office/drawing/2010/main" val="0"/>
-              </a:ext>
-            </a:extLst>
-          </a:blip>
-          <a:srcRect/>
-          <a:stretch>
-            <a:fillRect/>
-          </a:stretch>
-        </p:blipFill>
-        <p:spPr bwMode="auto">
-          <a:xfrm>
-            <a:off x="2937546" y="1062773"/>
-            <a:ext cx="214313" cy="180975"/>
-          </a:xfrm>
-          <a:prstGeom prst="rect">
-            <a:avLst/>
-          </a:prstGeom>
-          <a:noFill/>
-          <a:ln>
-            <a:noFill/>
-          </a:ln>
-          <a:effectLst/>
-          <a:extLst>
-            <a:ext uri="{909E8E84-426E-40DD-AFC4-6F175D3DCCD1}">
-              <a14:hiddenFill xmlns:a14="http://schemas.microsoft.com/office/drawing/2010/main">
-                <a:solidFill>
-                  <a:schemeClr val="accent1"/>
-                </a:solidFill>
-              </a14:hiddenFill>
-            </a:ext>
-            <a:ext uri="{91240B29-F687-4F45-9708-019B960494DF}">
-              <a14:hiddenLine xmlns:a14="http://schemas.microsoft.com/office/drawing/2010/main" w="9525">
-                <a:solidFill>
-                  <a:schemeClr val="tx1"/>
-                </a:solidFill>
-                <a:miter lim="800000"/>
-                <a:headEnd/>
-                <a:tailEnd/>
-              </a14:hiddenLine>
-            </a:ext>
-            <a:ext uri="{AF507438-7753-43E0-B8FC-AC1667EBCBE1}">
-              <a14:hiddenEffects xmlns:a14="http://schemas.microsoft.com/office/drawing/2010/main">
-                <a:effectLst>
-                  <a:outerShdw dist="35921" dir="2700000" algn="ctr" rotWithShape="0">
-                    <a:schemeClr val="bg2"/>
-                  </a:outerShdw>
-                </a:effectLst>
-              </a14:hiddenEffects>
-            </a:ext>
-          </a:extLst>
-        </p:spPr>
-      </p:pic>
-      <p:pic>
-        <p:nvPicPr>
-          <p:cNvPr id="1030" name="Picture 6"/>
-          <p:cNvPicPr>
-            <a:picLocks noChangeAspect="1" noChangeArrowheads="1"/>
-          </p:cNvPicPr>
-          <p:nvPr/>
-        </p:nvPicPr>
-        <p:blipFill>
-          <a:blip r:embed="rId5">
-            <a:extLst>
-              <a:ext uri="{28A0092B-C50C-407E-A947-70E740481C1C}">
-                <a14:useLocalDpi xmlns:a14="http://schemas.microsoft.com/office/drawing/2010/main" val="0"/>
-              </a:ext>
-            </a:extLst>
-          </a:blip>
-          <a:srcRect/>
-          <a:stretch>
-            <a:fillRect/>
-          </a:stretch>
-        </p:blipFill>
-        <p:spPr bwMode="auto">
-          <a:xfrm>
-            <a:off x="3868511" y="1251677"/>
-            <a:ext cx="1143000" cy="1638300"/>
-          </a:xfrm>
-          <a:prstGeom prst="rect">
-            <a:avLst/>
-          </a:prstGeom>
-          <a:noFill/>
-          <a:ln>
-            <a:noFill/>
-          </a:ln>
-          <a:effectLst/>
-          <a:extLst>
-            <a:ext uri="{909E8E84-426E-40DD-AFC4-6F175D3DCCD1}">
-              <a14:hiddenFill xmlns:a14="http://schemas.microsoft.com/office/drawing/2010/main">
-                <a:solidFill>
-                  <a:schemeClr val="accent1"/>
-                </a:solidFill>
-              </a14:hiddenFill>
-            </a:ext>
-            <a:ext uri="{91240B29-F687-4F45-9708-019B960494DF}">
-              <a14:hiddenLine xmlns:a14="http://schemas.microsoft.com/office/drawing/2010/main" w="9525">
-                <a:solidFill>
-                  <a:schemeClr val="tx1"/>
-                </a:solidFill>
-                <a:miter lim="800000"/>
-                <a:headEnd/>
-                <a:tailEnd/>
-              </a14:hiddenLine>
-            </a:ext>
-            <a:ext uri="{AF507438-7753-43E0-B8FC-AC1667EBCBE1}">
-              <a14:hiddenEffects xmlns:a14="http://schemas.microsoft.com/office/drawing/2010/main">
-                <a:effectLst>
-                  <a:outerShdw dist="35921" dir="2700000" algn="ctr" rotWithShape="0">
-                    <a:schemeClr val="bg2"/>
-                  </a:outerShdw>
-                </a:effectLst>
-              </a14:hiddenEffects>
-            </a:ext>
-          </a:extLst>
-        </p:spPr>
-      </p:pic>
-      <p:sp>
-        <p:nvSpPr>
-          <p:cNvPr id="5" name="Flèche droite 4"/>
-          <p:cNvSpPr/>
-          <p:nvPr/>
-        </p:nvSpPr>
-        <p:spPr>
-          <a:xfrm>
-            <a:off x="3151859" y="1936008"/>
-            <a:ext cx="720080" cy="189334"/>
-          </a:xfrm>
-          <a:prstGeom prst="rightArrow">
-            <a:avLst/>
-          </a:prstGeom>
-          <a:solidFill>
-            <a:schemeClr val="bg1"/>
-          </a:solidFill>
-          <a:ln>
-            <a:solidFill>
-              <a:schemeClr val="tx1"/>
-            </a:solidFill>
-          </a:ln>
-        </p:spPr>
-        <p:style>
-          <a:lnRef idx="2">
-            <a:schemeClr val="accent1">
-              <a:shade val="50000"/>
-            </a:schemeClr>
-          </a:lnRef>
-          <a:fillRef idx="1">
-            <a:schemeClr val="accent1"/>
-          </a:fillRef>
-          <a:effectRef idx="0">
-            <a:schemeClr val="accent1"/>
-          </a:effectRef>
-          <a:fontRef idx="minor">
-            <a:schemeClr val="lt1"/>
-          </a:fontRef>
-        </p:style>
-        <p:txBody>
-          <a:bodyPr rtlCol="0" anchor="ctr"/>
-          <a:lstStyle/>
-          <a:p>
-            <a:pPr algn="ctr"/>
-            <a:endParaRPr lang="fr-FR"/>
-          </a:p>
-        </p:txBody>
-      </p:sp>
-      <p:sp>
-        <p:nvSpPr>
-          <p:cNvPr id="6" name="Rectangle 5"/>
-          <p:cNvSpPr/>
-          <p:nvPr/>
-        </p:nvSpPr>
-        <p:spPr>
-          <a:xfrm>
-            <a:off x="251520" y="1710787"/>
-            <a:ext cx="1224136" cy="720080"/>
-          </a:xfrm>
-          <a:prstGeom prst="rect">
-            <a:avLst/>
-          </a:prstGeom>
-          <a:solidFill>
-            <a:schemeClr val="bg1"/>
-          </a:solidFill>
-          <a:ln>
-            <a:solidFill>
-              <a:schemeClr val="tx1"/>
-            </a:solidFill>
-          </a:ln>
-        </p:spPr>
-        <p:style>
-          <a:lnRef idx="2">
-            <a:schemeClr val="accent1">
-              <a:shade val="50000"/>
-            </a:schemeClr>
-          </a:lnRef>
-          <a:fillRef idx="1">
-            <a:schemeClr val="accent1"/>
-          </a:fillRef>
-          <a:effectRef idx="0">
-            <a:schemeClr val="accent1"/>
-          </a:effectRef>
-          <a:fontRef idx="minor">
-            <a:schemeClr val="lt1"/>
-          </a:fontRef>
-        </p:style>
-        <p:txBody>
-          <a:bodyPr rtlCol="0" anchor="ctr"/>
-          <a:lstStyle/>
-          <a:p>
-            <a:pPr algn="ctr"/>
-            <a:r>
-              <a:rPr lang="fr-FR" sz="3200" b="1" dirty="0" smtClean="0">
-                <a:solidFill>
-                  <a:schemeClr val="tx1"/>
-                </a:solidFill>
-              </a:rPr>
-              <a:t>12:00</a:t>
-            </a:r>
-            <a:endParaRPr lang="fr-FR" b="1" dirty="0">
-              <a:solidFill>
-                <a:schemeClr val="tx1"/>
-              </a:solidFill>
-            </a:endParaRPr>
-          </a:p>
-        </p:txBody>
-      </p:sp>
-      <p:sp>
-        <p:nvSpPr>
-          <p:cNvPr id="12" name="Flèche droite 11"/>
-          <p:cNvSpPr/>
-          <p:nvPr/>
-        </p:nvSpPr>
-        <p:spPr>
-          <a:xfrm>
-            <a:off x="1670760" y="1936008"/>
-            <a:ext cx="720080" cy="189334"/>
-          </a:xfrm>
-          <a:prstGeom prst="rightArrow">
-            <a:avLst/>
-          </a:prstGeom>
-          <a:solidFill>
-            <a:schemeClr val="bg1"/>
-          </a:solidFill>
-          <a:ln>
-            <a:solidFill>
-              <a:schemeClr val="tx1"/>
-            </a:solidFill>
-          </a:ln>
-        </p:spPr>
-        <p:style>
-          <a:lnRef idx="2">
-            <a:schemeClr val="accent1">
-              <a:shade val="50000"/>
-            </a:schemeClr>
-          </a:lnRef>
-          <a:fillRef idx="1">
-            <a:schemeClr val="accent1"/>
-          </a:fillRef>
-          <a:effectRef idx="0">
-            <a:schemeClr val="accent1"/>
-          </a:effectRef>
-          <a:fontRef idx="minor">
-            <a:schemeClr val="lt1"/>
-          </a:fontRef>
-        </p:style>
-        <p:txBody>
-          <a:bodyPr rtlCol="0" anchor="ctr"/>
-          <a:lstStyle/>
-          <a:p>
-            <a:pPr algn="ctr"/>
-            <a:endParaRPr lang="fr-FR"/>
-          </a:p>
-        </p:txBody>
-      </p:sp>
-      <p:sp>
-        <p:nvSpPr>
-          <p:cNvPr id="13" name="Flèche droite 12"/>
-          <p:cNvSpPr/>
-          <p:nvPr/>
-        </p:nvSpPr>
-        <p:spPr>
-          <a:xfrm>
-            <a:off x="5148064" y="1953560"/>
-            <a:ext cx="720080" cy="189334"/>
-          </a:xfrm>
-          <a:prstGeom prst="rightArrow">
-            <a:avLst/>
-          </a:prstGeom>
-          <a:solidFill>
-            <a:schemeClr val="bg1"/>
-          </a:solidFill>
-          <a:ln>
-            <a:solidFill>
-              <a:schemeClr val="tx1"/>
-            </a:solidFill>
-          </a:ln>
-        </p:spPr>
-        <p:style>
-          <a:lnRef idx="2">
-            <a:schemeClr val="accent1">
-              <a:shade val="50000"/>
-            </a:schemeClr>
-          </a:lnRef>
-          <a:fillRef idx="1">
-            <a:schemeClr val="accent1"/>
-          </a:fillRef>
-          <a:effectRef idx="0">
-            <a:schemeClr val="accent1"/>
-          </a:effectRef>
-          <a:fontRef idx="minor">
-            <a:schemeClr val="lt1"/>
-          </a:fontRef>
-        </p:style>
-        <p:txBody>
-          <a:bodyPr rtlCol="0" anchor="ctr"/>
-          <a:lstStyle/>
-          <a:p>
-            <a:pPr algn="ctr"/>
-            <a:endParaRPr lang="fr-FR"/>
-          </a:p>
-        </p:txBody>
-      </p:sp>
-      <p:pic>
-        <p:nvPicPr>
-          <p:cNvPr id="1031" name="Picture 7"/>
-          <p:cNvPicPr>
-            <a:picLocks noChangeAspect="1" noChangeArrowheads="1"/>
-          </p:cNvPicPr>
-          <p:nvPr/>
-        </p:nvPicPr>
-        <p:blipFill>
-          <a:blip r:embed="rId2">
-            <a:extLst>
-              <a:ext uri="{28A0092B-C50C-407E-A947-70E740481C1C}">
-                <a14:useLocalDpi xmlns:a14="http://schemas.microsoft.com/office/drawing/2010/main" val="0"/>
-              </a:ext>
-            </a:extLst>
-          </a:blip>
-          <a:srcRect/>
-          <a:stretch>
-            <a:fillRect/>
-          </a:stretch>
-        </p:blipFill>
-        <p:spPr bwMode="auto">
-          <a:xfrm>
-            <a:off x="4523000" y="1561888"/>
-            <a:ext cx="447675" cy="800100"/>
-          </a:xfrm>
-          <a:prstGeom prst="rect">
-            <a:avLst/>
-          </a:prstGeom>
-          <a:noFill/>
-          <a:ln>
-            <a:noFill/>
-          </a:ln>
-          <a:effectLst/>
-          <a:extLst>
-            <a:ext uri="{909E8E84-426E-40DD-AFC4-6F175D3DCCD1}">
-              <a14:hiddenFill xmlns:a14="http://schemas.microsoft.com/office/drawing/2010/main">
-                <a:solidFill>
-                  <a:schemeClr val="accent1"/>
-                </a:solidFill>
-              </a14:hiddenFill>
-            </a:ext>
-            <a:ext uri="{91240B29-F687-4F45-9708-019B960494DF}">
-              <a14:hiddenLine xmlns:a14="http://schemas.microsoft.com/office/drawing/2010/main" w="9525">
-                <a:solidFill>
-                  <a:schemeClr val="tx1"/>
-                </a:solidFill>
-                <a:miter lim="800000"/>
-                <a:headEnd/>
-                <a:tailEnd/>
-              </a14:hiddenLine>
-            </a:ext>
-            <a:ext uri="{AF507438-7753-43E0-B8FC-AC1667EBCBE1}">
-              <a14:hiddenEffects xmlns:a14="http://schemas.microsoft.com/office/drawing/2010/main">
-                <a:effectLst>
-                  <a:outerShdw dist="35921" dir="2700000" algn="ctr" rotWithShape="0">
-                    <a:schemeClr val="bg2"/>
-                  </a:outerShdw>
-                </a:effectLst>
-              </a14:hiddenEffects>
-            </a:ext>
-          </a:extLst>
-        </p:spPr>
-      </p:pic>
-      <p:sp>
-        <p:nvSpPr>
-          <p:cNvPr id="15" name="Rectangle 14"/>
-          <p:cNvSpPr/>
-          <p:nvPr/>
-        </p:nvSpPr>
-        <p:spPr>
-          <a:xfrm>
-            <a:off x="3995512" y="1118753"/>
-            <a:ext cx="864097" cy="323209"/>
-          </a:xfrm>
-          <a:prstGeom prst="rect">
-            <a:avLst/>
-          </a:prstGeom>
-          <a:solidFill>
-            <a:schemeClr val="bg1"/>
-          </a:solidFill>
-          <a:ln>
-            <a:solidFill>
-              <a:schemeClr val="tx1"/>
-            </a:solidFill>
-          </a:ln>
-        </p:spPr>
-        <p:style>
-          <a:lnRef idx="2">
-            <a:schemeClr val="accent1">
-              <a:shade val="50000"/>
-            </a:schemeClr>
-          </a:lnRef>
-          <a:fillRef idx="1">
-            <a:schemeClr val="accent1"/>
-          </a:fillRef>
-          <a:effectRef idx="0">
-            <a:schemeClr val="accent1"/>
-          </a:effectRef>
-          <a:fontRef idx="minor">
-            <a:schemeClr val="lt1"/>
-          </a:fontRef>
-        </p:style>
-        <p:txBody>
-          <a:bodyPr rtlCol="0" anchor="ctr"/>
-          <a:lstStyle/>
-          <a:p>
-            <a:pPr algn="ctr"/>
-            <a:r>
-              <a:rPr lang="fr-FR" sz="1100" b="1" dirty="0" err="1" smtClean="0">
-                <a:solidFill>
-                  <a:schemeClr val="tx1"/>
-                </a:solidFill>
-              </a:rPr>
-              <a:t>FlashMUTT</a:t>
-            </a:r>
-            <a:endParaRPr lang="fr-FR" sz="800" b="1" dirty="0">
-              <a:solidFill>
-                <a:schemeClr val="tx1"/>
-              </a:solidFill>
-            </a:endParaRPr>
-          </a:p>
-        </p:txBody>
-      </p:sp>
-      <p:pic>
-        <p:nvPicPr>
-          <p:cNvPr id="16" name="Picture 2" descr="C:\Users\Jeremie\Desktop\SNAG-0000.png"/>
-          <p:cNvPicPr>
-            <a:picLocks noChangeAspect="1" noChangeArrowheads="1"/>
-          </p:cNvPicPr>
-          <p:nvPr/>
-        </p:nvPicPr>
-        <p:blipFill rotWithShape="1">
-          <a:blip r:embed="rId6" cstate="print">
-            <a:extLst>
-              <a:ext uri="{28A0092B-C50C-407E-A947-70E740481C1C}">
-                <a14:useLocalDpi xmlns:a14="http://schemas.microsoft.com/office/drawing/2010/main" val="0"/>
-              </a:ext>
-            </a:extLst>
-          </a:blip>
-          <a:srcRect l="30142" t="26487" r="20282" b="13091"/>
-          <a:stretch/>
-        </p:blipFill>
-        <p:spPr bwMode="auto">
-          <a:xfrm rot="5400000">
-            <a:off x="3838092" y="4106539"/>
-            <a:ext cx="1303764" cy="757992"/>
-          </a:xfrm>
-          <a:prstGeom prst="rect">
-            <a:avLst/>
-          </a:prstGeom>
-          <a:noFill/>
-          <a:extLst>
-            <a:ext uri="{909E8E84-426E-40DD-AFC4-6F175D3DCCD1}">
-              <a14:hiddenFill xmlns:a14="http://schemas.microsoft.com/office/drawing/2010/main">
-                <a:solidFill>
-                  <a:srgbClr val="FFFFFF"/>
-                </a:solidFill>
-              </a14:hiddenFill>
-            </a:ext>
-          </a:extLst>
-        </p:spPr>
-      </p:pic>
-      <p:pic>
-        <p:nvPicPr>
-          <p:cNvPr id="18" name="Picture 2" descr="C:\Users\Jeremie\Desktop\SNAG-0000.png"/>
-          <p:cNvPicPr>
-            <a:picLocks noChangeAspect="1" noChangeArrowheads="1"/>
-          </p:cNvPicPr>
-          <p:nvPr/>
-        </p:nvPicPr>
-        <p:blipFill rotWithShape="1">
-          <a:blip r:embed="rId6" cstate="print">
-            <a:extLst>
-              <a:ext uri="{28A0092B-C50C-407E-A947-70E740481C1C}">
-                <a14:useLocalDpi xmlns:a14="http://schemas.microsoft.com/office/drawing/2010/main" val="0"/>
-              </a:ext>
-            </a:extLst>
-          </a:blip>
-          <a:srcRect l="30142" t="26487" r="20282" b="13091"/>
-          <a:stretch/>
-        </p:blipFill>
-        <p:spPr bwMode="auto">
-          <a:xfrm rot="5400000">
-            <a:off x="3788129" y="4106539"/>
-            <a:ext cx="1303764" cy="757992"/>
-          </a:xfrm>
-          <a:prstGeom prst="rect">
-            <a:avLst/>
-          </a:prstGeom>
-          <a:noFill/>
-          <a:extLst>
-            <a:ext uri="{909E8E84-426E-40DD-AFC4-6F175D3DCCD1}">
-              <a14:hiddenFill xmlns:a14="http://schemas.microsoft.com/office/drawing/2010/main">
-                <a:solidFill>
-                  <a:srgbClr val="FFFFFF"/>
-                </a:solidFill>
-              </a14:hiddenFill>
-            </a:ext>
-          </a:extLst>
-        </p:spPr>
-      </p:pic>
-      <p:pic>
-        <p:nvPicPr>
-          <p:cNvPr id="19" name="Picture 7"/>
-          <p:cNvPicPr>
-            <a:picLocks noChangeAspect="1" noChangeArrowheads="1"/>
-          </p:cNvPicPr>
-          <p:nvPr/>
-        </p:nvPicPr>
-        <p:blipFill>
-          <a:blip r:embed="rId2">
-            <a:extLst>
-              <a:ext uri="{28A0092B-C50C-407E-A947-70E740481C1C}">
-                <a14:useLocalDpi xmlns:a14="http://schemas.microsoft.com/office/drawing/2010/main" val="0"/>
-              </a:ext>
-            </a:extLst>
-          </a:blip>
-          <a:srcRect/>
-          <a:stretch>
-            <a:fillRect/>
-          </a:stretch>
-        </p:blipFill>
-        <p:spPr bwMode="auto">
-          <a:xfrm>
-            <a:off x="5868144" y="976918"/>
-            <a:ext cx="1224136" cy="2187818"/>
-          </a:xfrm>
-          <a:prstGeom prst="rect">
-            <a:avLst/>
-          </a:prstGeom>
-          <a:noFill/>
-          <a:ln>
-            <a:noFill/>
-          </a:ln>
-          <a:effectLst/>
-          <a:extLst>
-            <a:ext uri="{909E8E84-426E-40DD-AFC4-6F175D3DCCD1}">
-              <a14:hiddenFill xmlns:a14="http://schemas.microsoft.com/office/drawing/2010/main">
-                <a:solidFill>
-                  <a:schemeClr val="accent1"/>
-                </a:solidFill>
-              </a14:hiddenFill>
-            </a:ext>
-            <a:ext uri="{91240B29-F687-4F45-9708-019B960494DF}">
-              <a14:hiddenLine xmlns:a14="http://schemas.microsoft.com/office/drawing/2010/main" w="9525">
-                <a:solidFill>
-                  <a:schemeClr val="tx1"/>
-                </a:solidFill>
-                <a:miter lim="800000"/>
-                <a:headEnd/>
-                <a:tailEnd/>
-              </a14:hiddenLine>
-            </a:ext>
-            <a:ext uri="{AF507438-7753-43E0-B8FC-AC1667EBCBE1}">
-              <a14:hiddenEffects xmlns:a14="http://schemas.microsoft.com/office/drawing/2010/main">
-                <a:effectLst>
-                  <a:outerShdw dist="35921" dir="2700000" algn="ctr" rotWithShape="0">
-                    <a:schemeClr val="bg2"/>
-                  </a:outerShdw>
-                </a:effectLst>
-              </a14:hiddenEffects>
-            </a:ext>
-          </a:extLst>
-        </p:spPr>
-      </p:pic>
-      <p:pic>
-        <p:nvPicPr>
-          <p:cNvPr id="20" name="Picture 5"/>
-          <p:cNvPicPr>
-            <a:picLocks noChangeAspect="1" noChangeArrowheads="1"/>
-          </p:cNvPicPr>
-          <p:nvPr/>
-        </p:nvPicPr>
-        <p:blipFill>
-          <a:blip r:embed="rId4">
-            <a:extLst>
-              <a:ext uri="{28A0092B-C50C-407E-A947-70E740481C1C}">
-                <a14:useLocalDpi xmlns:a14="http://schemas.microsoft.com/office/drawing/2010/main" val="0"/>
-              </a:ext>
-            </a:extLst>
-          </a:blip>
-          <a:srcRect/>
-          <a:stretch>
-            <a:fillRect/>
-          </a:stretch>
-        </p:blipFill>
-        <p:spPr bwMode="auto">
-          <a:xfrm>
-            <a:off x="6579111" y="1746399"/>
-            <a:ext cx="253081" cy="213712"/>
-          </a:xfrm>
-          <a:prstGeom prst="rect">
-            <a:avLst/>
-          </a:prstGeom>
-          <a:noFill/>
-          <a:ln>
-            <a:noFill/>
-          </a:ln>
-          <a:effectLst/>
-          <a:extLst>
-            <a:ext uri="{909E8E84-426E-40DD-AFC4-6F175D3DCCD1}">
-              <a14:hiddenFill xmlns:a14="http://schemas.microsoft.com/office/drawing/2010/main">
-                <a:solidFill>
-                  <a:schemeClr val="accent1"/>
-                </a:solidFill>
-              </a14:hiddenFill>
-            </a:ext>
-            <a:ext uri="{91240B29-F687-4F45-9708-019B960494DF}">
-              <a14:hiddenLine xmlns:a14="http://schemas.microsoft.com/office/drawing/2010/main" w="9525">
-                <a:solidFill>
-                  <a:schemeClr val="tx1"/>
-                </a:solidFill>
-                <a:miter lim="800000"/>
-                <a:headEnd/>
-                <a:tailEnd/>
-              </a14:hiddenLine>
-            </a:ext>
-            <a:ext uri="{AF507438-7753-43E0-B8FC-AC1667EBCBE1}">
-              <a14:hiddenEffects xmlns:a14="http://schemas.microsoft.com/office/drawing/2010/main">
-                <a:effectLst>
-                  <a:outerShdw dist="35921" dir="2700000" algn="ctr" rotWithShape="0">
-                    <a:schemeClr val="bg2"/>
-                  </a:outerShdw>
-                </a:effectLst>
-              </a14:hiddenEffects>
-            </a:ext>
-          </a:extLst>
-        </p:spPr>
-      </p:pic>
-      <p:pic>
-        <p:nvPicPr>
-          <p:cNvPr id="1032" name="Picture 8" descr="C:\Users\jaafar\Downloads\aiga-escalator-up.png"/>
-          <p:cNvPicPr>
-            <a:picLocks noChangeAspect="1" noChangeArrowheads="1"/>
-          </p:cNvPicPr>
-          <p:nvPr/>
-        </p:nvPicPr>
-        <p:blipFill>
-          <a:blip r:embed="rId7" cstate="print">
-            <a:extLst>
-              <a:ext uri="{28A0092B-C50C-407E-A947-70E740481C1C}">
-                <a14:useLocalDpi xmlns:a14="http://schemas.microsoft.com/office/drawing/2010/main" val="0"/>
-              </a:ext>
-            </a:extLst>
-          </a:blip>
-          <a:srcRect/>
-          <a:stretch>
-            <a:fillRect/>
-          </a:stretch>
-        </p:blipFill>
-        <p:spPr bwMode="auto">
-          <a:xfrm>
-            <a:off x="6196061" y="1705986"/>
-            <a:ext cx="295401" cy="229837"/>
-          </a:xfrm>
-          <a:prstGeom prst="rect">
-            <a:avLst/>
-          </a:prstGeom>
-          <a:noFill/>
-          <a:extLst>
-            <a:ext uri="{909E8E84-426E-40DD-AFC4-6F175D3DCCD1}">
-              <a14:hiddenFill xmlns:a14="http://schemas.microsoft.com/office/drawing/2010/main">
-                <a:solidFill>
-                  <a:srgbClr val="FFFFFF"/>
-                </a:solidFill>
-              </a14:hiddenFill>
-            </a:ext>
-          </a:extLst>
-        </p:spPr>
-      </p:pic>
-      <p:pic>
-        <p:nvPicPr>
-          <p:cNvPr id="1033" name="Picture 9" descr="C:\Users\jaafar\Downloads\pictographs-barbershop-inv-t.png"/>
-          <p:cNvPicPr>
-            <a:picLocks noChangeAspect="1" noChangeArrowheads="1"/>
-          </p:cNvPicPr>
-          <p:nvPr/>
-        </p:nvPicPr>
-        <p:blipFill>
-          <a:blip r:embed="rId8" cstate="print">
-            <a:extLst>
-              <a:ext uri="{28A0092B-C50C-407E-A947-70E740481C1C}">
-                <a14:useLocalDpi xmlns:a14="http://schemas.microsoft.com/office/drawing/2010/main" val="0"/>
-              </a:ext>
-            </a:extLst>
-          </a:blip>
-          <a:srcRect/>
-          <a:stretch>
-            <a:fillRect/>
-          </a:stretch>
-        </p:blipFill>
-        <p:spPr bwMode="auto">
-          <a:xfrm>
-            <a:off x="6200807" y="2165494"/>
-            <a:ext cx="290655" cy="290655"/>
-          </a:xfrm>
-          <a:prstGeom prst="rect">
-            <a:avLst/>
-          </a:prstGeom>
-          <a:noFill/>
-          <a:extLst>
-            <a:ext uri="{909E8E84-426E-40DD-AFC4-6F175D3DCCD1}">
-              <a14:hiddenFill xmlns:a14="http://schemas.microsoft.com/office/drawing/2010/main">
-                <a:solidFill>
-                  <a:srgbClr val="FFFFFF"/>
-                </a:solidFill>
-              </a14:hiddenFill>
-            </a:ext>
-          </a:extLst>
-        </p:spPr>
-      </p:pic>
-      <p:pic>
-        <p:nvPicPr>
-          <p:cNvPr id="24" name="Picture 11" descr="http://static1.puretrend.com/articles/6/62/48/6/@/669528-iggy-pop-collabore-de-nouveau-avec-637x0-2.jpg"/>
-          <p:cNvPicPr>
-            <a:picLocks noChangeAspect="1" noChangeArrowheads="1"/>
-          </p:cNvPicPr>
-          <p:nvPr/>
-        </p:nvPicPr>
-        <p:blipFill>
-          <a:blip r:embed="rId9" cstate="print">
-            <a:extLst>
-              <a:ext uri="{28A0092B-C50C-407E-A947-70E740481C1C}">
-                <a14:useLocalDpi xmlns:a14="http://schemas.microsoft.com/office/drawing/2010/main" val="0"/>
-              </a:ext>
-            </a:extLst>
-          </a:blip>
-          <a:srcRect/>
-          <a:stretch>
-            <a:fillRect/>
-          </a:stretch>
-        </p:blipFill>
-        <p:spPr bwMode="auto">
-          <a:xfrm>
-            <a:off x="6526758" y="2157116"/>
-            <a:ext cx="357785" cy="261928"/>
-          </a:xfrm>
-          <a:prstGeom prst="rect">
-            <a:avLst/>
-          </a:prstGeom>
-          <a:noFill/>
-          <a:extLst>
-            <a:ext uri="{909E8E84-426E-40DD-AFC4-6F175D3DCCD1}">
-              <a14:hiddenFill xmlns:a14="http://schemas.microsoft.com/office/drawing/2010/main">
-                <a:solidFill>
-                  <a:srgbClr val="FFFFFF"/>
-                </a:solidFill>
-              </a14:hiddenFill>
-            </a:ext>
-          </a:extLst>
-        </p:spPr>
-      </p:pic>
-      <p:pic>
-        <p:nvPicPr>
-          <p:cNvPr id="25" name="Picture 7"/>
-          <p:cNvPicPr>
-            <a:picLocks noChangeAspect="1" noChangeArrowheads="1"/>
-          </p:cNvPicPr>
-          <p:nvPr/>
-        </p:nvPicPr>
-        <p:blipFill>
-          <a:blip r:embed="rId2">
-            <a:extLst>
-              <a:ext uri="{28A0092B-C50C-407E-A947-70E740481C1C}">
-                <a14:useLocalDpi xmlns:a14="http://schemas.microsoft.com/office/drawing/2010/main" val="0"/>
-              </a:ext>
-            </a:extLst>
-          </a:blip>
-          <a:srcRect/>
-          <a:stretch>
-            <a:fillRect/>
-          </a:stretch>
-        </p:blipFill>
-        <p:spPr bwMode="auto">
-          <a:xfrm>
-            <a:off x="107504" y="3458394"/>
-            <a:ext cx="1224136" cy="2187818"/>
-          </a:xfrm>
-          <a:prstGeom prst="rect">
-            <a:avLst/>
-          </a:prstGeom>
-          <a:noFill/>
-          <a:ln>
-            <a:noFill/>
-          </a:ln>
-          <a:effectLst/>
-          <a:extLst>
-            <a:ext uri="{909E8E84-426E-40DD-AFC4-6F175D3DCCD1}">
-              <a14:hiddenFill xmlns:a14="http://schemas.microsoft.com/office/drawing/2010/main">
-                <a:solidFill>
-                  <a:schemeClr val="accent1"/>
-                </a:solidFill>
-              </a14:hiddenFill>
-            </a:ext>
-            <a:ext uri="{91240B29-F687-4F45-9708-019B960494DF}">
-              <a14:hiddenLine xmlns:a14="http://schemas.microsoft.com/office/drawing/2010/main" w="9525">
-                <a:solidFill>
-                  <a:schemeClr val="tx1"/>
-                </a:solidFill>
-                <a:miter lim="800000"/>
-                <a:headEnd/>
-                <a:tailEnd/>
-              </a14:hiddenLine>
-            </a:ext>
-            <a:ext uri="{AF507438-7753-43E0-B8FC-AC1667EBCBE1}">
-              <a14:hiddenEffects xmlns:a14="http://schemas.microsoft.com/office/drawing/2010/main">
-                <a:effectLst>
-                  <a:outerShdw dist="35921" dir="2700000" algn="ctr" rotWithShape="0">
-                    <a:schemeClr val="bg2"/>
-                  </a:outerShdw>
-                </a:effectLst>
-              </a14:hiddenEffects>
-            </a:ext>
-          </a:extLst>
-        </p:spPr>
-      </p:pic>
-      <p:pic>
-        <p:nvPicPr>
-          <p:cNvPr id="26" name="Picture 5"/>
-          <p:cNvPicPr>
-            <a:picLocks noChangeAspect="1" noChangeArrowheads="1"/>
-          </p:cNvPicPr>
-          <p:nvPr/>
-        </p:nvPicPr>
-        <p:blipFill>
-          <a:blip r:embed="rId4">
-            <a:extLst>
-              <a:ext uri="{28A0092B-C50C-407E-A947-70E740481C1C}">
-                <a14:useLocalDpi xmlns:a14="http://schemas.microsoft.com/office/drawing/2010/main" val="0"/>
-              </a:ext>
-            </a:extLst>
-          </a:blip>
-          <a:srcRect/>
-          <a:stretch>
-            <a:fillRect/>
-          </a:stretch>
-        </p:blipFill>
-        <p:spPr bwMode="auto">
-          <a:xfrm>
-            <a:off x="619182" y="4014163"/>
-            <a:ext cx="253081" cy="213712"/>
-          </a:xfrm>
-          <a:prstGeom prst="rect">
-            <a:avLst/>
-          </a:prstGeom>
-          <a:noFill/>
-          <a:ln>
-            <a:noFill/>
-          </a:ln>
-          <a:effectLst/>
-          <a:extLst>
-            <a:ext uri="{909E8E84-426E-40DD-AFC4-6F175D3DCCD1}">
-              <a14:hiddenFill xmlns:a14="http://schemas.microsoft.com/office/drawing/2010/main">
-                <a:solidFill>
-                  <a:schemeClr val="accent1"/>
-                </a:solidFill>
-              </a14:hiddenFill>
-            </a:ext>
-            <a:ext uri="{91240B29-F687-4F45-9708-019B960494DF}">
-              <a14:hiddenLine xmlns:a14="http://schemas.microsoft.com/office/drawing/2010/main" w="9525">
-                <a:solidFill>
-                  <a:schemeClr val="tx1"/>
-                </a:solidFill>
-                <a:miter lim="800000"/>
-                <a:headEnd/>
-                <a:tailEnd/>
-              </a14:hiddenLine>
-            </a:ext>
-            <a:ext uri="{AF507438-7753-43E0-B8FC-AC1667EBCBE1}">
-              <a14:hiddenEffects xmlns:a14="http://schemas.microsoft.com/office/drawing/2010/main">
-                <a:effectLst>
-                  <a:outerShdw dist="35921" dir="2700000" algn="ctr" rotWithShape="0">
-                    <a:schemeClr val="bg2"/>
-                  </a:outerShdw>
-                </a:effectLst>
-              </a14:hiddenEffects>
-            </a:ext>
-          </a:extLst>
-        </p:spPr>
-      </p:pic>
-      <p:sp>
-        <p:nvSpPr>
-          <p:cNvPr id="30" name="Flèche droite 29"/>
-          <p:cNvSpPr/>
-          <p:nvPr/>
-        </p:nvSpPr>
-        <p:spPr>
-          <a:xfrm>
-            <a:off x="1468980" y="4489502"/>
-            <a:ext cx="524976" cy="189334"/>
-          </a:xfrm>
-          <a:prstGeom prst="rightArrow">
-            <a:avLst/>
-          </a:prstGeom>
-          <a:solidFill>
-            <a:schemeClr val="bg1"/>
-          </a:solidFill>
-          <a:ln>
-            <a:solidFill>
-              <a:schemeClr val="tx1"/>
-            </a:solidFill>
-          </a:ln>
-        </p:spPr>
-        <p:style>
-          <a:lnRef idx="2">
-            <a:schemeClr val="accent1">
-              <a:shade val="50000"/>
-            </a:schemeClr>
-          </a:lnRef>
-          <a:fillRef idx="1">
-            <a:schemeClr val="accent1"/>
-          </a:fillRef>
-          <a:effectRef idx="0">
-            <a:schemeClr val="accent1"/>
-          </a:effectRef>
-          <a:fontRef idx="minor">
-            <a:schemeClr val="lt1"/>
-          </a:fontRef>
-        </p:style>
-        <p:txBody>
-          <a:bodyPr rtlCol="0" anchor="ctr"/>
-          <a:lstStyle/>
-          <a:p>
-            <a:pPr algn="ctr"/>
-            <a:endParaRPr lang="fr-FR"/>
-          </a:p>
-        </p:txBody>
-      </p:sp>
-      <p:sp>
-        <p:nvSpPr>
-          <p:cNvPr id="31" name="Flèche droite 30"/>
-          <p:cNvSpPr/>
-          <p:nvPr/>
-        </p:nvSpPr>
-        <p:spPr>
-          <a:xfrm>
-            <a:off x="3230764" y="4489502"/>
-            <a:ext cx="524976" cy="189334"/>
-          </a:xfrm>
-          <a:prstGeom prst="rightArrow">
-            <a:avLst/>
-          </a:prstGeom>
-          <a:solidFill>
-            <a:schemeClr val="bg1"/>
-          </a:solidFill>
-          <a:ln>
-            <a:solidFill>
-              <a:schemeClr val="tx1"/>
-            </a:solidFill>
-          </a:ln>
-        </p:spPr>
-        <p:style>
-          <a:lnRef idx="2">
-            <a:schemeClr val="accent1">
-              <a:shade val="50000"/>
-            </a:schemeClr>
-          </a:lnRef>
-          <a:fillRef idx="1">
-            <a:schemeClr val="accent1"/>
-          </a:fillRef>
-          <a:effectRef idx="0">
-            <a:schemeClr val="accent1"/>
-          </a:effectRef>
-          <a:fontRef idx="minor">
-            <a:schemeClr val="lt1"/>
-          </a:fontRef>
-        </p:style>
-        <p:txBody>
-          <a:bodyPr rtlCol="0" anchor="ctr"/>
-          <a:lstStyle/>
-          <a:p>
-            <a:pPr algn="ctr"/>
-            <a:endParaRPr lang="fr-FR"/>
-          </a:p>
-        </p:txBody>
-      </p:sp>
-      <p:pic>
-        <p:nvPicPr>
-          <p:cNvPr id="33" name="Picture 7"/>
-          <p:cNvPicPr>
-            <a:picLocks noChangeAspect="1" noChangeArrowheads="1"/>
-          </p:cNvPicPr>
-          <p:nvPr/>
-        </p:nvPicPr>
-        <p:blipFill>
-          <a:blip r:embed="rId2">
-            <a:extLst>
-              <a:ext uri="{28A0092B-C50C-407E-A947-70E740481C1C}">
-                <a14:useLocalDpi xmlns:a14="http://schemas.microsoft.com/office/drawing/2010/main" val="0"/>
-              </a:ext>
-            </a:extLst>
-          </a:blip>
-          <a:srcRect/>
-          <a:stretch>
-            <a:fillRect/>
-          </a:stretch>
-        </p:blipFill>
-        <p:spPr bwMode="auto">
-          <a:xfrm>
-            <a:off x="1999596" y="3395343"/>
-            <a:ext cx="1224136" cy="2187818"/>
-          </a:xfrm>
-          <a:prstGeom prst="rect">
-            <a:avLst/>
-          </a:prstGeom>
-          <a:noFill/>
-          <a:ln>
-            <a:noFill/>
-          </a:ln>
-          <a:effectLst/>
-          <a:extLst>
-            <a:ext uri="{909E8E84-426E-40DD-AFC4-6F175D3DCCD1}">
-              <a14:hiddenFill xmlns:a14="http://schemas.microsoft.com/office/drawing/2010/main">
-                <a:solidFill>
-                  <a:schemeClr val="accent1"/>
-                </a:solidFill>
-              </a14:hiddenFill>
-            </a:ext>
-            <a:ext uri="{91240B29-F687-4F45-9708-019B960494DF}">
-              <a14:hiddenLine xmlns:a14="http://schemas.microsoft.com/office/drawing/2010/main" w="9525">
-                <a:solidFill>
-                  <a:schemeClr val="tx1"/>
-                </a:solidFill>
-                <a:miter lim="800000"/>
-                <a:headEnd/>
-                <a:tailEnd/>
-              </a14:hiddenLine>
-            </a:ext>
-            <a:ext uri="{AF507438-7753-43E0-B8FC-AC1667EBCBE1}">
-              <a14:hiddenEffects xmlns:a14="http://schemas.microsoft.com/office/drawing/2010/main">
-                <a:effectLst>
-                  <a:outerShdw dist="35921" dir="2700000" algn="ctr" rotWithShape="0">
-                    <a:schemeClr val="bg2"/>
-                  </a:outerShdw>
-                </a:effectLst>
-              </a14:hiddenEffects>
-            </a:ext>
-          </a:extLst>
-        </p:spPr>
-      </p:pic>
-      <p:sp>
-        <p:nvSpPr>
-          <p:cNvPr id="7" name="Rectangle à coins arrondis 6"/>
-          <p:cNvSpPr/>
-          <p:nvPr/>
-        </p:nvSpPr>
-        <p:spPr>
-          <a:xfrm>
-            <a:off x="395536" y="4379587"/>
-            <a:ext cx="738416" cy="148164"/>
-          </a:xfrm>
-          <a:prstGeom prst="roundRect">
-            <a:avLst/>
-          </a:prstGeom>
-          <a:solidFill>
-            <a:schemeClr val="bg1"/>
-          </a:solidFill>
-          <a:ln>
-            <a:solidFill>
-              <a:schemeClr val="tx1"/>
-            </a:solidFill>
-          </a:ln>
-        </p:spPr>
-        <p:style>
-          <a:lnRef idx="2">
-            <a:schemeClr val="accent1">
-              <a:shade val="50000"/>
-            </a:schemeClr>
-          </a:lnRef>
-          <a:fillRef idx="1">
-            <a:schemeClr val="accent1"/>
-          </a:fillRef>
-          <a:effectRef idx="0">
-            <a:schemeClr val="accent1"/>
-          </a:effectRef>
-          <a:fontRef idx="minor">
-            <a:schemeClr val="lt1"/>
-          </a:fontRef>
-        </p:style>
-        <p:txBody>
-          <a:bodyPr rtlCol="0" anchor="ctr"/>
-          <a:lstStyle/>
-          <a:p>
-            <a:r>
-              <a:rPr lang="fr-FR" sz="600" b="1" dirty="0" smtClean="0">
-                <a:solidFill>
-                  <a:schemeClr val="tx1"/>
-                </a:solidFill>
-              </a:rPr>
-              <a:t>La petite cantine</a:t>
-            </a:r>
-            <a:endParaRPr lang="fr-FR" sz="600" b="1" dirty="0">
-              <a:solidFill>
-                <a:schemeClr val="tx1"/>
-              </a:solidFill>
-            </a:endParaRPr>
-          </a:p>
-        </p:txBody>
-      </p:sp>
-      <p:sp>
-        <p:nvSpPr>
-          <p:cNvPr id="41" name="Rectangle à coins arrondis 40"/>
-          <p:cNvSpPr/>
-          <p:nvPr/>
-        </p:nvSpPr>
-        <p:spPr>
-          <a:xfrm>
-            <a:off x="386684" y="4648242"/>
-            <a:ext cx="738416" cy="148164"/>
-          </a:xfrm>
-          <a:prstGeom prst="roundRect">
-            <a:avLst/>
-          </a:prstGeom>
-          <a:solidFill>
-            <a:schemeClr val="bg1"/>
-          </a:solidFill>
-          <a:ln>
-            <a:solidFill>
-              <a:schemeClr val="tx1"/>
-            </a:solidFill>
-          </a:ln>
-        </p:spPr>
-        <p:style>
-          <a:lnRef idx="2">
-            <a:schemeClr val="accent1">
-              <a:shade val="50000"/>
-            </a:schemeClr>
-          </a:lnRef>
-          <a:fillRef idx="1">
-            <a:schemeClr val="accent1"/>
-          </a:fillRef>
-          <a:effectRef idx="0">
-            <a:schemeClr val="accent1"/>
-          </a:effectRef>
-          <a:fontRef idx="minor">
-            <a:schemeClr val="lt1"/>
-          </a:fontRef>
-        </p:style>
-        <p:txBody>
-          <a:bodyPr rtlCol="0" anchor="ctr"/>
-          <a:lstStyle/>
-          <a:p>
-            <a:r>
-              <a:rPr lang="fr-FR" sz="500" b="1" dirty="0" smtClean="0">
-                <a:solidFill>
-                  <a:schemeClr val="tx1"/>
-                </a:solidFill>
-              </a:rPr>
-              <a:t>Mc. </a:t>
-            </a:r>
-            <a:r>
-              <a:rPr lang="fr-FR" sz="500" b="1" dirty="0" err="1" smtClean="0">
-                <a:solidFill>
-                  <a:schemeClr val="tx1"/>
-                </a:solidFill>
-              </a:rPr>
-              <a:t>Donalds</a:t>
-            </a:r>
-            <a:r>
-              <a:rPr lang="fr-FR" sz="500" b="1" dirty="0" smtClean="0">
-                <a:solidFill>
-                  <a:schemeClr val="tx1"/>
-                </a:solidFill>
-              </a:rPr>
-              <a:t> – Ros</a:t>
-            </a:r>
-            <a:endParaRPr lang="fr-FR" sz="500" b="1" dirty="0">
-              <a:solidFill>
-                <a:schemeClr val="tx1"/>
-              </a:solidFill>
-            </a:endParaRPr>
-          </a:p>
-        </p:txBody>
-      </p:sp>
-      <p:sp>
-        <p:nvSpPr>
-          <p:cNvPr id="42" name="Rectangle à coins arrondis 41"/>
-          <p:cNvSpPr/>
-          <p:nvPr/>
-        </p:nvSpPr>
-        <p:spPr>
-          <a:xfrm>
-            <a:off x="386684" y="4915755"/>
-            <a:ext cx="738416" cy="148164"/>
-          </a:xfrm>
-          <a:prstGeom prst="roundRect">
-            <a:avLst/>
-          </a:prstGeom>
-          <a:solidFill>
-            <a:schemeClr val="bg1"/>
-          </a:solidFill>
-          <a:ln>
-            <a:solidFill>
-              <a:schemeClr val="tx1"/>
-            </a:solidFill>
-          </a:ln>
-        </p:spPr>
-        <p:style>
-          <a:lnRef idx="2">
-            <a:schemeClr val="accent1">
-              <a:shade val="50000"/>
-            </a:schemeClr>
-          </a:lnRef>
-          <a:fillRef idx="1">
-            <a:schemeClr val="accent1"/>
-          </a:fillRef>
-          <a:effectRef idx="0">
-            <a:schemeClr val="accent1"/>
-          </a:effectRef>
-          <a:fontRef idx="minor">
-            <a:schemeClr val="lt1"/>
-          </a:fontRef>
-        </p:style>
-        <p:txBody>
-          <a:bodyPr rtlCol="0" anchor="ctr"/>
-          <a:lstStyle/>
-          <a:p>
-            <a:r>
-              <a:rPr lang="fr-FR" sz="600" b="1" dirty="0" smtClean="0">
-                <a:solidFill>
-                  <a:schemeClr val="tx1"/>
-                </a:solidFill>
-              </a:rPr>
-              <a:t>Restau. du coin</a:t>
-            </a:r>
-            <a:endParaRPr lang="fr-FR" sz="600" b="1" dirty="0">
-              <a:solidFill>
-                <a:schemeClr val="tx1"/>
-              </a:solidFill>
-            </a:endParaRPr>
-          </a:p>
-        </p:txBody>
-      </p:sp>
-      <p:sp>
-        <p:nvSpPr>
-          <p:cNvPr id="44" name="Rectangle à coins arrondis 43"/>
-          <p:cNvSpPr/>
-          <p:nvPr/>
-        </p:nvSpPr>
-        <p:spPr>
-          <a:xfrm>
-            <a:off x="2280389" y="3972855"/>
-            <a:ext cx="738416" cy="148164"/>
-          </a:xfrm>
-          <a:prstGeom prst="roundRect">
-            <a:avLst/>
-          </a:prstGeom>
-          <a:solidFill>
-            <a:schemeClr val="bg1"/>
-          </a:solidFill>
-          <a:ln>
-            <a:solidFill>
-              <a:schemeClr val="tx1"/>
-            </a:solidFill>
-          </a:ln>
-        </p:spPr>
-        <p:style>
-          <a:lnRef idx="2">
-            <a:schemeClr val="accent1">
-              <a:shade val="50000"/>
-            </a:schemeClr>
-          </a:lnRef>
-          <a:fillRef idx="1">
-            <a:schemeClr val="accent1"/>
-          </a:fillRef>
-          <a:effectRef idx="0">
-            <a:schemeClr val="accent1"/>
-          </a:effectRef>
-          <a:fontRef idx="minor">
-            <a:schemeClr val="lt1"/>
-          </a:fontRef>
-        </p:style>
-        <p:txBody>
-          <a:bodyPr rtlCol="0" anchor="ctr"/>
-          <a:lstStyle/>
-          <a:p>
-            <a:r>
-              <a:rPr lang="fr-FR" sz="600" b="1" dirty="0" smtClean="0">
-                <a:solidFill>
-                  <a:schemeClr val="tx1"/>
-                </a:solidFill>
-              </a:rPr>
-              <a:t>La petite cantine</a:t>
-            </a:r>
-            <a:endParaRPr lang="fr-FR" sz="600" b="1" dirty="0">
-              <a:solidFill>
-                <a:schemeClr val="tx1"/>
-              </a:solidFill>
-            </a:endParaRPr>
-          </a:p>
-        </p:txBody>
-      </p:sp>
-      <p:sp>
-        <p:nvSpPr>
-          <p:cNvPr id="8" name="Rectangle 7"/>
-          <p:cNvSpPr/>
-          <p:nvPr/>
-        </p:nvSpPr>
-        <p:spPr>
-          <a:xfrm>
-            <a:off x="2374916" y="4819110"/>
-            <a:ext cx="1202072" cy="200055"/>
-          </a:xfrm>
-          <a:prstGeom prst="rect">
-            <a:avLst/>
-          </a:prstGeom>
-        </p:spPr>
-        <p:txBody>
-          <a:bodyPr wrap="square">
-            <a:spAutoFit/>
-          </a:bodyPr>
-          <a:lstStyle/>
-          <a:p>
-            <a:r>
-              <a:rPr lang="fr-FR" sz="700" b="1" u="sng" dirty="0">
-                <a:effectLst>
-                  <a:outerShdw blurRad="38100" dist="38100" dir="2700000" algn="tl">
-                    <a:srgbClr val="000000">
-                      <a:alpha val="43137"/>
-                    </a:srgbClr>
-                  </a:outerShdw>
-                </a:effectLst>
-              </a:rPr>
-              <a:t>M’y rendre</a:t>
-            </a:r>
-            <a:r>
-              <a:rPr lang="fr-FR" sz="700" u="sng" dirty="0">
-                <a:effectLst>
-                  <a:outerShdw blurRad="38100" dist="38100" dir="2700000" algn="tl">
-                    <a:srgbClr val="000000">
-                      <a:alpha val="43137"/>
-                    </a:srgbClr>
-                  </a:outerShdw>
-                </a:effectLst>
-              </a:rPr>
-              <a:t>.</a:t>
-            </a:r>
-          </a:p>
-        </p:txBody>
-      </p:sp>
-    </p:spTree>
-    <p:extLst>
-      <p:ext uri="{BB962C8B-B14F-4D97-AF65-F5344CB8AC3E}">
-        <p14:creationId xmlns:p14="http://schemas.microsoft.com/office/powerpoint/2010/main" val="4273158477"/>
       </p:ext>
     </p:extLst>
   </p:cSld>

</xml_diff>

<commit_message>
Création des derniers schémas pour les scénarios d'utilisation
</commit_message>
<xml_diff>
--- a/Diagrammes/Scenarios - Schemas.pptx
+++ b/Diagrammes/Scenarios - Schemas.pptx
@@ -5,7 +5,7 @@
     <p:sldMasterId id="2147483648" r:id="rId1"/>
   </p:sldMasterIdLst>
   <p:notesMasterIdLst>
-    <p:notesMasterId r:id="rId11"/>
+    <p:notesMasterId r:id="rId18"/>
   </p:notesMasterIdLst>
   <p:sldIdLst>
     <p:sldId id="256" r:id="rId2"/>
@@ -17,6 +17,13 @@
     <p:sldId id="265" r:id="rId8"/>
     <p:sldId id="258" r:id="rId9"/>
     <p:sldId id="257" r:id="rId10"/>
+    <p:sldId id="266" r:id="rId11"/>
+    <p:sldId id="267" r:id="rId12"/>
+    <p:sldId id="268" r:id="rId13"/>
+    <p:sldId id="269" r:id="rId14"/>
+    <p:sldId id="270" r:id="rId15"/>
+    <p:sldId id="271" r:id="rId16"/>
+    <p:sldId id="272" r:id="rId17"/>
   </p:sldIdLst>
   <p:sldSz cx="9144000" cy="6858000" type="screen4x3"/>
   <p:notesSz cx="6858000" cy="9144000"/>
@@ -512,10 +519,7 @@
           <a:bodyPr/>
           <a:lstStyle/>
           <a:p>
-            <a:r>
-              <a:rPr lang="fr-FR" dirty="0" smtClean="0"/>
-              <a:t>Flèche de transition (étape vers une prochaine étape)</a:t>
-            </a:r>
+            <a:endParaRPr lang="fr-FR" dirty="0" smtClean="0"/>
           </a:p>
         </p:txBody>
       </p:sp>
@@ -537,6 +541,594 @@
             <a:fld id="{70C5B279-D8FA-4EB8-A0B5-CACAE048C97A}" type="slidenum">
               <a:rPr lang="fr-FR" smtClean="0"/>
               <a:t>1</a:t>
+            </a:fld>
+            <a:endParaRPr lang="fr-FR"/>
+          </a:p>
+        </p:txBody>
+      </p:sp>
+    </p:spTree>
+    <p:extLst>
+      <p:ext uri="{BB962C8B-B14F-4D97-AF65-F5344CB8AC3E}">
+        <p14:creationId xmlns:p14="http://schemas.microsoft.com/office/powerpoint/2010/main" val="2110943"/>
+      </p:ext>
+    </p:extLst>
+  </p:cSld>
+  <p:clrMapOvr>
+    <a:masterClrMapping/>
+  </p:clrMapOvr>
+</p:notes>
+</file>
+
+<file path=ppt/notesSlides/notesSlide10.xml><?xml version="1.0" encoding="utf-8"?>
+<p:notes xmlns:a="http://schemas.openxmlformats.org/drawingml/2006/main" xmlns:r="http://schemas.openxmlformats.org/officeDocument/2006/relationships" xmlns:p="http://schemas.openxmlformats.org/presentationml/2006/main">
+  <p:cSld>
+    <p:spTree>
+      <p:nvGrpSpPr>
+        <p:cNvPr id="1" name=""/>
+        <p:cNvGrpSpPr/>
+        <p:nvPr/>
+      </p:nvGrpSpPr>
+      <p:grpSpPr>
+        <a:xfrm>
+          <a:off x="0" y="0"/>
+          <a:ext cx="0" cy="0"/>
+          <a:chOff x="0" y="0"/>
+          <a:chExt cx="0" cy="0"/>
+        </a:xfrm>
+      </p:grpSpPr>
+      <p:sp>
+        <p:nvSpPr>
+          <p:cNvPr id="2" name="Espace réservé de l'image des diapositives 1"/>
+          <p:cNvSpPr>
+            <a:spLocks noGrp="1" noRot="1" noChangeAspect="1"/>
+          </p:cNvSpPr>
+          <p:nvPr>
+            <p:ph type="sldImg"/>
+          </p:nvPr>
+        </p:nvSpPr>
+        <p:spPr/>
+      </p:sp>
+      <p:sp>
+        <p:nvSpPr>
+          <p:cNvPr id="3" name="Espace réservé des commentaires 2"/>
+          <p:cNvSpPr>
+            <a:spLocks noGrp="1"/>
+          </p:cNvSpPr>
+          <p:nvPr>
+            <p:ph type="body" idx="1"/>
+          </p:nvPr>
+        </p:nvSpPr>
+        <p:spPr/>
+        <p:txBody>
+          <a:bodyPr/>
+          <a:lstStyle/>
+          <a:p>
+            <a:endParaRPr lang="fr-FR" dirty="0" smtClean="0"/>
+          </a:p>
+        </p:txBody>
+      </p:sp>
+      <p:sp>
+        <p:nvSpPr>
+          <p:cNvPr id="4" name="Espace réservé du numéro de diapositive 3"/>
+          <p:cNvSpPr>
+            <a:spLocks noGrp="1"/>
+          </p:cNvSpPr>
+          <p:nvPr>
+            <p:ph type="sldNum" sz="quarter" idx="10"/>
+          </p:nvPr>
+        </p:nvSpPr>
+        <p:spPr/>
+        <p:txBody>
+          <a:bodyPr/>
+          <a:lstStyle/>
+          <a:p>
+            <a:fld id="{70C5B279-D8FA-4EB8-A0B5-CACAE048C97A}" type="slidenum">
+              <a:rPr lang="fr-FR" smtClean="0"/>
+              <a:t>10</a:t>
+            </a:fld>
+            <a:endParaRPr lang="fr-FR"/>
+          </a:p>
+        </p:txBody>
+      </p:sp>
+    </p:spTree>
+    <p:extLst>
+      <p:ext uri="{BB962C8B-B14F-4D97-AF65-F5344CB8AC3E}">
+        <p14:creationId xmlns:p14="http://schemas.microsoft.com/office/powerpoint/2010/main" val="2110943"/>
+      </p:ext>
+    </p:extLst>
+  </p:cSld>
+  <p:clrMapOvr>
+    <a:masterClrMapping/>
+  </p:clrMapOvr>
+</p:notes>
+</file>
+
+<file path=ppt/notesSlides/notesSlide11.xml><?xml version="1.0" encoding="utf-8"?>
+<p:notes xmlns:a="http://schemas.openxmlformats.org/drawingml/2006/main" xmlns:r="http://schemas.openxmlformats.org/officeDocument/2006/relationships" xmlns:p="http://schemas.openxmlformats.org/presentationml/2006/main">
+  <p:cSld>
+    <p:spTree>
+      <p:nvGrpSpPr>
+        <p:cNvPr id="1" name=""/>
+        <p:cNvGrpSpPr/>
+        <p:nvPr/>
+      </p:nvGrpSpPr>
+      <p:grpSpPr>
+        <a:xfrm>
+          <a:off x="0" y="0"/>
+          <a:ext cx="0" cy="0"/>
+          <a:chOff x="0" y="0"/>
+          <a:chExt cx="0" cy="0"/>
+        </a:xfrm>
+      </p:grpSpPr>
+      <p:sp>
+        <p:nvSpPr>
+          <p:cNvPr id="2" name="Espace réservé de l'image des diapositives 1"/>
+          <p:cNvSpPr>
+            <a:spLocks noGrp="1" noRot="1" noChangeAspect="1"/>
+          </p:cNvSpPr>
+          <p:nvPr>
+            <p:ph type="sldImg"/>
+          </p:nvPr>
+        </p:nvSpPr>
+        <p:spPr/>
+      </p:sp>
+      <p:sp>
+        <p:nvSpPr>
+          <p:cNvPr id="3" name="Espace réservé des commentaires 2"/>
+          <p:cNvSpPr>
+            <a:spLocks noGrp="1"/>
+          </p:cNvSpPr>
+          <p:nvPr>
+            <p:ph type="body" idx="1"/>
+          </p:nvPr>
+        </p:nvSpPr>
+        <p:spPr/>
+        <p:txBody>
+          <a:bodyPr/>
+          <a:lstStyle/>
+          <a:p>
+            <a:endParaRPr lang="fr-FR" dirty="0" smtClean="0"/>
+          </a:p>
+        </p:txBody>
+      </p:sp>
+      <p:sp>
+        <p:nvSpPr>
+          <p:cNvPr id="4" name="Espace réservé du numéro de diapositive 3"/>
+          <p:cNvSpPr>
+            <a:spLocks noGrp="1"/>
+          </p:cNvSpPr>
+          <p:nvPr>
+            <p:ph type="sldNum" sz="quarter" idx="10"/>
+          </p:nvPr>
+        </p:nvSpPr>
+        <p:spPr/>
+        <p:txBody>
+          <a:bodyPr/>
+          <a:lstStyle/>
+          <a:p>
+            <a:fld id="{70C5B279-D8FA-4EB8-A0B5-CACAE048C97A}" type="slidenum">
+              <a:rPr lang="fr-FR" smtClean="0"/>
+              <a:t>11</a:t>
+            </a:fld>
+            <a:endParaRPr lang="fr-FR"/>
+          </a:p>
+        </p:txBody>
+      </p:sp>
+    </p:spTree>
+    <p:extLst>
+      <p:ext uri="{BB962C8B-B14F-4D97-AF65-F5344CB8AC3E}">
+        <p14:creationId xmlns:p14="http://schemas.microsoft.com/office/powerpoint/2010/main" val="2110943"/>
+      </p:ext>
+    </p:extLst>
+  </p:cSld>
+  <p:clrMapOvr>
+    <a:masterClrMapping/>
+  </p:clrMapOvr>
+</p:notes>
+</file>
+
+<file path=ppt/notesSlides/notesSlide12.xml><?xml version="1.0" encoding="utf-8"?>
+<p:notes xmlns:a="http://schemas.openxmlformats.org/drawingml/2006/main" xmlns:r="http://schemas.openxmlformats.org/officeDocument/2006/relationships" xmlns:p="http://schemas.openxmlformats.org/presentationml/2006/main">
+  <p:cSld>
+    <p:spTree>
+      <p:nvGrpSpPr>
+        <p:cNvPr id="1" name=""/>
+        <p:cNvGrpSpPr/>
+        <p:nvPr/>
+      </p:nvGrpSpPr>
+      <p:grpSpPr>
+        <a:xfrm>
+          <a:off x="0" y="0"/>
+          <a:ext cx="0" cy="0"/>
+          <a:chOff x="0" y="0"/>
+          <a:chExt cx="0" cy="0"/>
+        </a:xfrm>
+      </p:grpSpPr>
+      <p:sp>
+        <p:nvSpPr>
+          <p:cNvPr id="2" name="Espace réservé de l'image des diapositives 1"/>
+          <p:cNvSpPr>
+            <a:spLocks noGrp="1" noRot="1" noChangeAspect="1"/>
+          </p:cNvSpPr>
+          <p:nvPr>
+            <p:ph type="sldImg"/>
+          </p:nvPr>
+        </p:nvSpPr>
+        <p:spPr/>
+      </p:sp>
+      <p:sp>
+        <p:nvSpPr>
+          <p:cNvPr id="3" name="Espace réservé des commentaires 2"/>
+          <p:cNvSpPr>
+            <a:spLocks noGrp="1"/>
+          </p:cNvSpPr>
+          <p:nvPr>
+            <p:ph type="body" idx="1"/>
+          </p:nvPr>
+        </p:nvSpPr>
+        <p:spPr/>
+        <p:txBody>
+          <a:bodyPr/>
+          <a:lstStyle/>
+          <a:p>
+            <a:endParaRPr lang="fr-FR" dirty="0" smtClean="0"/>
+          </a:p>
+        </p:txBody>
+      </p:sp>
+      <p:sp>
+        <p:nvSpPr>
+          <p:cNvPr id="4" name="Espace réservé du numéro de diapositive 3"/>
+          <p:cNvSpPr>
+            <a:spLocks noGrp="1"/>
+          </p:cNvSpPr>
+          <p:nvPr>
+            <p:ph type="sldNum" sz="quarter" idx="10"/>
+          </p:nvPr>
+        </p:nvSpPr>
+        <p:spPr/>
+        <p:txBody>
+          <a:bodyPr/>
+          <a:lstStyle/>
+          <a:p>
+            <a:fld id="{70C5B279-D8FA-4EB8-A0B5-CACAE048C97A}" type="slidenum">
+              <a:rPr lang="fr-FR" smtClean="0"/>
+              <a:t>12</a:t>
+            </a:fld>
+            <a:endParaRPr lang="fr-FR"/>
+          </a:p>
+        </p:txBody>
+      </p:sp>
+    </p:spTree>
+    <p:extLst>
+      <p:ext uri="{BB962C8B-B14F-4D97-AF65-F5344CB8AC3E}">
+        <p14:creationId xmlns:p14="http://schemas.microsoft.com/office/powerpoint/2010/main" val="2110943"/>
+      </p:ext>
+    </p:extLst>
+  </p:cSld>
+  <p:clrMapOvr>
+    <a:masterClrMapping/>
+  </p:clrMapOvr>
+</p:notes>
+</file>
+
+<file path=ppt/notesSlides/notesSlide13.xml><?xml version="1.0" encoding="utf-8"?>
+<p:notes xmlns:a="http://schemas.openxmlformats.org/drawingml/2006/main" xmlns:r="http://schemas.openxmlformats.org/officeDocument/2006/relationships" xmlns:p="http://schemas.openxmlformats.org/presentationml/2006/main">
+  <p:cSld>
+    <p:spTree>
+      <p:nvGrpSpPr>
+        <p:cNvPr id="1" name=""/>
+        <p:cNvGrpSpPr/>
+        <p:nvPr/>
+      </p:nvGrpSpPr>
+      <p:grpSpPr>
+        <a:xfrm>
+          <a:off x="0" y="0"/>
+          <a:ext cx="0" cy="0"/>
+          <a:chOff x="0" y="0"/>
+          <a:chExt cx="0" cy="0"/>
+        </a:xfrm>
+      </p:grpSpPr>
+      <p:sp>
+        <p:nvSpPr>
+          <p:cNvPr id="2" name="Espace réservé de l'image des diapositives 1"/>
+          <p:cNvSpPr>
+            <a:spLocks noGrp="1" noRot="1" noChangeAspect="1"/>
+          </p:cNvSpPr>
+          <p:nvPr>
+            <p:ph type="sldImg"/>
+          </p:nvPr>
+        </p:nvSpPr>
+        <p:spPr/>
+      </p:sp>
+      <p:sp>
+        <p:nvSpPr>
+          <p:cNvPr id="3" name="Espace réservé des commentaires 2"/>
+          <p:cNvSpPr>
+            <a:spLocks noGrp="1"/>
+          </p:cNvSpPr>
+          <p:nvPr>
+            <p:ph type="body" idx="1"/>
+          </p:nvPr>
+        </p:nvSpPr>
+        <p:spPr/>
+        <p:txBody>
+          <a:bodyPr/>
+          <a:lstStyle/>
+          <a:p>
+            <a:endParaRPr lang="fr-FR" dirty="0" smtClean="0"/>
+          </a:p>
+        </p:txBody>
+      </p:sp>
+      <p:sp>
+        <p:nvSpPr>
+          <p:cNvPr id="4" name="Espace réservé du numéro de diapositive 3"/>
+          <p:cNvSpPr>
+            <a:spLocks noGrp="1"/>
+          </p:cNvSpPr>
+          <p:nvPr>
+            <p:ph type="sldNum" sz="quarter" idx="10"/>
+          </p:nvPr>
+        </p:nvSpPr>
+        <p:spPr/>
+        <p:txBody>
+          <a:bodyPr/>
+          <a:lstStyle/>
+          <a:p>
+            <a:fld id="{70C5B279-D8FA-4EB8-A0B5-CACAE048C97A}" type="slidenum">
+              <a:rPr lang="fr-FR" smtClean="0"/>
+              <a:t>13</a:t>
+            </a:fld>
+            <a:endParaRPr lang="fr-FR"/>
+          </a:p>
+        </p:txBody>
+      </p:sp>
+    </p:spTree>
+    <p:extLst>
+      <p:ext uri="{BB962C8B-B14F-4D97-AF65-F5344CB8AC3E}">
+        <p14:creationId xmlns:p14="http://schemas.microsoft.com/office/powerpoint/2010/main" val="2110943"/>
+      </p:ext>
+    </p:extLst>
+  </p:cSld>
+  <p:clrMapOvr>
+    <a:masterClrMapping/>
+  </p:clrMapOvr>
+</p:notes>
+</file>
+
+<file path=ppt/notesSlides/notesSlide14.xml><?xml version="1.0" encoding="utf-8"?>
+<p:notes xmlns:a="http://schemas.openxmlformats.org/drawingml/2006/main" xmlns:r="http://schemas.openxmlformats.org/officeDocument/2006/relationships" xmlns:p="http://schemas.openxmlformats.org/presentationml/2006/main">
+  <p:cSld>
+    <p:spTree>
+      <p:nvGrpSpPr>
+        <p:cNvPr id="1" name=""/>
+        <p:cNvGrpSpPr/>
+        <p:nvPr/>
+      </p:nvGrpSpPr>
+      <p:grpSpPr>
+        <a:xfrm>
+          <a:off x="0" y="0"/>
+          <a:ext cx="0" cy="0"/>
+          <a:chOff x="0" y="0"/>
+          <a:chExt cx="0" cy="0"/>
+        </a:xfrm>
+      </p:grpSpPr>
+      <p:sp>
+        <p:nvSpPr>
+          <p:cNvPr id="2" name="Espace réservé de l'image des diapositives 1"/>
+          <p:cNvSpPr>
+            <a:spLocks noGrp="1" noRot="1" noChangeAspect="1"/>
+          </p:cNvSpPr>
+          <p:nvPr>
+            <p:ph type="sldImg"/>
+          </p:nvPr>
+        </p:nvSpPr>
+        <p:spPr/>
+      </p:sp>
+      <p:sp>
+        <p:nvSpPr>
+          <p:cNvPr id="3" name="Espace réservé des commentaires 2"/>
+          <p:cNvSpPr>
+            <a:spLocks noGrp="1"/>
+          </p:cNvSpPr>
+          <p:nvPr>
+            <p:ph type="body" idx="1"/>
+          </p:nvPr>
+        </p:nvSpPr>
+        <p:spPr/>
+        <p:txBody>
+          <a:bodyPr/>
+          <a:lstStyle/>
+          <a:p>
+            <a:endParaRPr lang="fr-FR" dirty="0" smtClean="0"/>
+          </a:p>
+        </p:txBody>
+      </p:sp>
+      <p:sp>
+        <p:nvSpPr>
+          <p:cNvPr id="4" name="Espace réservé du numéro de diapositive 3"/>
+          <p:cNvSpPr>
+            <a:spLocks noGrp="1"/>
+          </p:cNvSpPr>
+          <p:nvPr>
+            <p:ph type="sldNum" sz="quarter" idx="10"/>
+          </p:nvPr>
+        </p:nvSpPr>
+        <p:spPr/>
+        <p:txBody>
+          <a:bodyPr/>
+          <a:lstStyle/>
+          <a:p>
+            <a:fld id="{70C5B279-D8FA-4EB8-A0B5-CACAE048C97A}" type="slidenum">
+              <a:rPr lang="fr-FR" smtClean="0"/>
+              <a:t>14</a:t>
+            </a:fld>
+            <a:endParaRPr lang="fr-FR"/>
+          </a:p>
+        </p:txBody>
+      </p:sp>
+    </p:spTree>
+    <p:extLst>
+      <p:ext uri="{BB962C8B-B14F-4D97-AF65-F5344CB8AC3E}">
+        <p14:creationId xmlns:p14="http://schemas.microsoft.com/office/powerpoint/2010/main" val="2110943"/>
+      </p:ext>
+    </p:extLst>
+  </p:cSld>
+  <p:clrMapOvr>
+    <a:masterClrMapping/>
+  </p:clrMapOvr>
+</p:notes>
+</file>
+
+<file path=ppt/notesSlides/notesSlide15.xml><?xml version="1.0" encoding="utf-8"?>
+<p:notes xmlns:a="http://schemas.openxmlformats.org/drawingml/2006/main" xmlns:r="http://schemas.openxmlformats.org/officeDocument/2006/relationships" xmlns:p="http://schemas.openxmlformats.org/presentationml/2006/main">
+  <p:cSld>
+    <p:spTree>
+      <p:nvGrpSpPr>
+        <p:cNvPr id="1" name=""/>
+        <p:cNvGrpSpPr/>
+        <p:nvPr/>
+      </p:nvGrpSpPr>
+      <p:grpSpPr>
+        <a:xfrm>
+          <a:off x="0" y="0"/>
+          <a:ext cx="0" cy="0"/>
+          <a:chOff x="0" y="0"/>
+          <a:chExt cx="0" cy="0"/>
+        </a:xfrm>
+      </p:grpSpPr>
+      <p:sp>
+        <p:nvSpPr>
+          <p:cNvPr id="2" name="Espace réservé de l'image des diapositives 1"/>
+          <p:cNvSpPr>
+            <a:spLocks noGrp="1" noRot="1" noChangeAspect="1"/>
+          </p:cNvSpPr>
+          <p:nvPr>
+            <p:ph type="sldImg"/>
+          </p:nvPr>
+        </p:nvSpPr>
+        <p:spPr/>
+      </p:sp>
+      <p:sp>
+        <p:nvSpPr>
+          <p:cNvPr id="3" name="Espace réservé des commentaires 2"/>
+          <p:cNvSpPr>
+            <a:spLocks noGrp="1"/>
+          </p:cNvSpPr>
+          <p:nvPr>
+            <p:ph type="body" idx="1"/>
+          </p:nvPr>
+        </p:nvSpPr>
+        <p:spPr/>
+        <p:txBody>
+          <a:bodyPr/>
+          <a:lstStyle/>
+          <a:p>
+            <a:endParaRPr lang="fr-FR" dirty="0" smtClean="0"/>
+          </a:p>
+        </p:txBody>
+      </p:sp>
+      <p:sp>
+        <p:nvSpPr>
+          <p:cNvPr id="4" name="Espace réservé du numéro de diapositive 3"/>
+          <p:cNvSpPr>
+            <a:spLocks noGrp="1"/>
+          </p:cNvSpPr>
+          <p:nvPr>
+            <p:ph type="sldNum" sz="quarter" idx="10"/>
+          </p:nvPr>
+        </p:nvSpPr>
+        <p:spPr/>
+        <p:txBody>
+          <a:bodyPr/>
+          <a:lstStyle/>
+          <a:p>
+            <a:fld id="{70C5B279-D8FA-4EB8-A0B5-CACAE048C97A}" type="slidenum">
+              <a:rPr lang="fr-FR" smtClean="0"/>
+              <a:t>15</a:t>
+            </a:fld>
+            <a:endParaRPr lang="fr-FR"/>
+          </a:p>
+        </p:txBody>
+      </p:sp>
+    </p:spTree>
+    <p:extLst>
+      <p:ext uri="{BB962C8B-B14F-4D97-AF65-F5344CB8AC3E}">
+        <p14:creationId xmlns:p14="http://schemas.microsoft.com/office/powerpoint/2010/main" val="2110943"/>
+      </p:ext>
+    </p:extLst>
+  </p:cSld>
+  <p:clrMapOvr>
+    <a:masterClrMapping/>
+  </p:clrMapOvr>
+</p:notes>
+</file>
+
+<file path=ppt/notesSlides/notesSlide16.xml><?xml version="1.0" encoding="utf-8"?>
+<p:notes xmlns:a="http://schemas.openxmlformats.org/drawingml/2006/main" xmlns:r="http://schemas.openxmlformats.org/officeDocument/2006/relationships" xmlns:p="http://schemas.openxmlformats.org/presentationml/2006/main">
+  <p:cSld>
+    <p:spTree>
+      <p:nvGrpSpPr>
+        <p:cNvPr id="1" name=""/>
+        <p:cNvGrpSpPr/>
+        <p:nvPr/>
+      </p:nvGrpSpPr>
+      <p:grpSpPr>
+        <a:xfrm>
+          <a:off x="0" y="0"/>
+          <a:ext cx="0" cy="0"/>
+          <a:chOff x="0" y="0"/>
+          <a:chExt cx="0" cy="0"/>
+        </a:xfrm>
+      </p:grpSpPr>
+      <p:sp>
+        <p:nvSpPr>
+          <p:cNvPr id="2" name="Espace réservé de l'image des diapositives 1"/>
+          <p:cNvSpPr>
+            <a:spLocks noGrp="1" noRot="1" noChangeAspect="1"/>
+          </p:cNvSpPr>
+          <p:nvPr>
+            <p:ph type="sldImg"/>
+          </p:nvPr>
+        </p:nvSpPr>
+        <p:spPr/>
+      </p:sp>
+      <p:sp>
+        <p:nvSpPr>
+          <p:cNvPr id="3" name="Espace réservé des commentaires 2"/>
+          <p:cNvSpPr>
+            <a:spLocks noGrp="1"/>
+          </p:cNvSpPr>
+          <p:nvPr>
+            <p:ph type="body" idx="1"/>
+          </p:nvPr>
+        </p:nvSpPr>
+        <p:spPr/>
+        <p:txBody>
+          <a:bodyPr/>
+          <a:lstStyle/>
+          <a:p>
+            <a:endParaRPr lang="fr-FR" dirty="0" smtClean="0"/>
+          </a:p>
+        </p:txBody>
+      </p:sp>
+      <p:sp>
+        <p:nvSpPr>
+          <p:cNvPr id="4" name="Espace réservé du numéro de diapositive 3"/>
+          <p:cNvSpPr>
+            <a:spLocks noGrp="1"/>
+          </p:cNvSpPr>
+          <p:nvPr>
+            <p:ph type="sldNum" sz="quarter" idx="10"/>
+          </p:nvPr>
+        </p:nvSpPr>
+        <p:spPr/>
+        <p:txBody>
+          <a:bodyPr/>
+          <a:lstStyle/>
+          <a:p>
+            <a:fld id="{70C5B279-D8FA-4EB8-A0B5-CACAE048C97A}" type="slidenum">
+              <a:rPr lang="fr-FR" smtClean="0"/>
+              <a:t>16</a:t>
             </a:fld>
             <a:endParaRPr lang="fr-FR"/>
           </a:p>
@@ -599,14 +1191,6 @@
           <a:bodyPr/>
           <a:lstStyle/>
           <a:p>
-            <a:r>
-              <a:rPr lang="fr-FR" dirty="0" smtClean="0"/>
-              <a:t>Rechercher</a:t>
-            </a:r>
-            <a:r>
-              <a:rPr lang="fr-FR" baseline="0" dirty="0" smtClean="0"/>
-              <a:t> un commerce (1)</a:t>
-            </a:r>
             <a:endParaRPr lang="fr-FR" dirty="0" smtClean="0"/>
           </a:p>
         </p:txBody>
@@ -691,14 +1275,6 @@
           <a:bodyPr/>
           <a:lstStyle/>
           <a:p>
-            <a:r>
-              <a:rPr lang="fr-FR" dirty="0" smtClean="0"/>
-              <a:t>Rechercher</a:t>
-            </a:r>
-            <a:r>
-              <a:rPr lang="fr-FR" baseline="0" dirty="0" smtClean="0"/>
-              <a:t> un commerce (2)</a:t>
-            </a:r>
             <a:endParaRPr lang="fr-FR" dirty="0" smtClean="0"/>
           </a:p>
         </p:txBody>
@@ -783,14 +1359,6 @@
           <a:bodyPr/>
           <a:lstStyle/>
           <a:p>
-            <a:r>
-              <a:rPr lang="fr-FR" dirty="0" smtClean="0"/>
-              <a:t>Rechercher</a:t>
-            </a:r>
-            <a:r>
-              <a:rPr lang="fr-FR" baseline="0" dirty="0" smtClean="0"/>
-              <a:t> un commerce (2)</a:t>
-            </a:r>
             <a:endParaRPr lang="fr-FR" dirty="0" smtClean="0"/>
           </a:p>
         </p:txBody>
@@ -875,14 +1443,6 @@
           <a:bodyPr/>
           <a:lstStyle/>
           <a:p>
-            <a:r>
-              <a:rPr lang="fr-FR" dirty="0" smtClean="0"/>
-              <a:t>Rechercher</a:t>
-            </a:r>
-            <a:r>
-              <a:rPr lang="fr-FR" baseline="0" dirty="0" smtClean="0"/>
-              <a:t> un commerce (2)</a:t>
-            </a:r>
             <a:endParaRPr lang="fr-FR" dirty="0" smtClean="0"/>
           </a:p>
         </p:txBody>
@@ -967,14 +1527,6 @@
           <a:bodyPr/>
           <a:lstStyle/>
           <a:p>
-            <a:r>
-              <a:rPr lang="fr-FR" dirty="0" smtClean="0"/>
-              <a:t>Rechercher</a:t>
-            </a:r>
-            <a:r>
-              <a:rPr lang="fr-FR" baseline="0" dirty="0" smtClean="0"/>
-              <a:t> un commerce (2)</a:t>
-            </a:r>
             <a:endParaRPr lang="fr-FR" dirty="0" smtClean="0"/>
           </a:p>
         </p:txBody>
@@ -1059,14 +1611,6 @@
           <a:bodyPr/>
           <a:lstStyle/>
           <a:p>
-            <a:r>
-              <a:rPr lang="fr-FR" dirty="0" smtClean="0"/>
-              <a:t>Rechercher</a:t>
-            </a:r>
-            <a:r>
-              <a:rPr lang="fr-FR" baseline="0" dirty="0" smtClean="0"/>
-              <a:t> un commerce (2)</a:t>
-            </a:r>
             <a:endParaRPr lang="fr-FR" dirty="0" smtClean="0"/>
           </a:p>
         </p:txBody>
@@ -1151,10 +1695,7 @@
           <a:bodyPr/>
           <a:lstStyle/>
           <a:p>
-            <a:r>
-              <a:rPr lang="fr-FR" dirty="0" smtClean="0"/>
-              <a:t>Récupérer des informations sur un commerce (1/2)</a:t>
-            </a:r>
+            <a:endParaRPr lang="fr-FR" dirty="0" smtClean="0"/>
           </a:p>
         </p:txBody>
       </p:sp>
@@ -1255,10 +1796,7 @@
               <a:tabLst/>
               <a:defRPr/>
             </a:pPr>
-            <a:r>
-              <a:rPr lang="fr-FR" dirty="0" smtClean="0"/>
-              <a:t>Récupérer des informations sur un commerce (2/2)</a:t>
-            </a:r>
+            <a:endParaRPr lang="fr-FR" dirty="0" smtClean="0"/>
           </a:p>
         </p:txBody>
       </p:sp>
@@ -4294,7 +4832,7 @@
         </p:nvSpPr>
         <p:spPr>
           <a:xfrm>
-            <a:off x="971600" y="908721"/>
+            <a:off x="4283968" y="2996952"/>
             <a:ext cx="1375951" cy="1152128"/>
           </a:xfrm>
           <a:prstGeom prst="rightArrow">
@@ -4326,126 +4864,6 @@
           </a:p>
         </p:txBody>
       </p:sp>
-      <p:sp>
-        <p:nvSpPr>
-          <p:cNvPr id="3" name="Flèche droite 2"/>
-          <p:cNvSpPr/>
-          <p:nvPr/>
-        </p:nvSpPr>
-        <p:spPr>
-          <a:xfrm rot="16200000">
-            <a:off x="1029231" y="4077072"/>
-            <a:ext cx="2296591" cy="1923009"/>
-          </a:xfrm>
-          <a:prstGeom prst="rightArrow">
-            <a:avLst/>
-          </a:prstGeom>
-          <a:noFill/>
-          <a:ln w="76200"/>
-        </p:spPr>
-        <p:style>
-          <a:lnRef idx="1">
-            <a:schemeClr val="dk1"/>
-          </a:lnRef>
-          <a:fillRef idx="2">
-            <a:schemeClr val="dk1"/>
-          </a:fillRef>
-          <a:effectRef idx="1">
-            <a:schemeClr val="dk1"/>
-          </a:effectRef>
-          <a:fontRef idx="minor">
-            <a:schemeClr val="dk1"/>
-          </a:fontRef>
-        </p:style>
-        <p:txBody>
-          <a:bodyPr rtlCol="0" anchor="ctr"/>
-          <a:lstStyle/>
-          <a:p>
-            <a:pPr algn="ctr"/>
-            <a:endParaRPr lang="fr-FR"/>
-          </a:p>
-        </p:txBody>
-      </p:sp>
-      <p:sp>
-        <p:nvSpPr>
-          <p:cNvPr id="4" name="Flèche droite 3"/>
-          <p:cNvSpPr/>
-          <p:nvPr/>
-        </p:nvSpPr>
-        <p:spPr>
-          <a:xfrm rot="5400000">
-            <a:off x="4499992" y="1196752"/>
-            <a:ext cx="2296591" cy="1923009"/>
-          </a:xfrm>
-          <a:prstGeom prst="rightArrow">
-            <a:avLst/>
-          </a:prstGeom>
-          <a:noFill/>
-          <a:ln w="76200"/>
-        </p:spPr>
-        <p:style>
-          <a:lnRef idx="1">
-            <a:schemeClr val="dk1"/>
-          </a:lnRef>
-          <a:fillRef idx="2">
-            <a:schemeClr val="dk1"/>
-          </a:fillRef>
-          <a:effectRef idx="1">
-            <a:schemeClr val="dk1"/>
-          </a:effectRef>
-          <a:fontRef idx="minor">
-            <a:schemeClr val="dk1"/>
-          </a:fontRef>
-        </p:style>
-        <p:txBody>
-          <a:bodyPr rtlCol="0" anchor="ctr"/>
-          <a:lstStyle/>
-          <a:p>
-            <a:pPr algn="ctr"/>
-            <a:endParaRPr lang="fr-FR"/>
-          </a:p>
-        </p:txBody>
-      </p:sp>
-      <p:sp>
-        <p:nvSpPr>
-          <p:cNvPr id="5" name="Flèche droite 4"/>
-          <p:cNvSpPr/>
-          <p:nvPr/>
-        </p:nvSpPr>
-        <p:spPr>
-          <a:xfrm rot="10800000">
-            <a:off x="4686783" y="4263863"/>
-            <a:ext cx="2296591" cy="1923009"/>
-          </a:xfrm>
-          <a:prstGeom prst="rightArrow">
-            <a:avLst/>
-          </a:prstGeom>
-          <a:noFill/>
-          <a:ln w="76200"/>
-        </p:spPr>
-        <p:style>
-          <a:lnRef idx="1">
-            <a:schemeClr val="dk1"/>
-          </a:lnRef>
-          <a:fillRef idx="2">
-            <a:schemeClr val="dk1"/>
-          </a:fillRef>
-          <a:effectRef idx="1">
-            <a:schemeClr val="dk1"/>
-          </a:effectRef>
-          <a:fontRef idx="minor">
-            <a:schemeClr val="dk1"/>
-          </a:fontRef>
-        </p:style>
-        <p:txBody>
-          <a:bodyPr rtlCol="0" anchor="ctr"/>
-          <a:lstStyle/>
-          <a:p>
-            <a:pPr algn="ctr"/>
-            <a:endParaRPr lang="fr-FR"/>
-          </a:p>
-        </p:txBody>
-      </p:sp>
     </p:spTree>
     <p:extLst>
       <p:ext uri="{BB962C8B-B14F-4D97-AF65-F5344CB8AC3E}">
@@ -4463,6 +4881,1045 @@
       </p:par>
     </p:tnLst>
   </p:timing>
+</p:sld>
+</file>
+
+<file path=ppt/slides/slide10.xml><?xml version="1.0" encoding="utf-8"?>
+<p:sld xmlns:a="http://schemas.openxmlformats.org/drawingml/2006/main" xmlns:r="http://schemas.openxmlformats.org/officeDocument/2006/relationships" xmlns:p="http://schemas.openxmlformats.org/presentationml/2006/main">
+  <p:cSld>
+    <p:spTree>
+      <p:nvGrpSpPr>
+        <p:cNvPr id="1" name=""/>
+        <p:cNvGrpSpPr/>
+        <p:nvPr/>
+      </p:nvGrpSpPr>
+      <p:grpSpPr>
+        <a:xfrm>
+          <a:off x="0" y="0"/>
+          <a:ext cx="0" cy="0"/>
+          <a:chOff x="0" y="0"/>
+          <a:chExt cx="0" cy="0"/>
+        </a:xfrm>
+      </p:grpSpPr>
+      <p:sp>
+        <p:nvSpPr>
+          <p:cNvPr id="4" name="Ellipse 3"/>
+          <p:cNvSpPr/>
+          <p:nvPr/>
+        </p:nvSpPr>
+        <p:spPr>
+          <a:xfrm>
+            <a:off x="3986436" y="4781229"/>
+            <a:ext cx="1218056" cy="1218056"/>
+          </a:xfrm>
+          <a:prstGeom prst="ellipse">
+            <a:avLst/>
+          </a:prstGeom>
+          <a:noFill/>
+          <a:ln w="76200">
+            <a:solidFill>
+              <a:schemeClr val="tx1"/>
+            </a:solidFill>
+          </a:ln>
+        </p:spPr>
+        <p:style>
+          <a:lnRef idx="1">
+            <a:schemeClr val="dk1"/>
+          </a:lnRef>
+          <a:fillRef idx="2">
+            <a:schemeClr val="dk1"/>
+          </a:fillRef>
+          <a:effectRef idx="1">
+            <a:schemeClr val="dk1"/>
+          </a:effectRef>
+          <a:fontRef idx="minor">
+            <a:schemeClr val="dk1"/>
+          </a:fontRef>
+        </p:style>
+        <p:txBody>
+          <a:bodyPr rtlCol="0" anchor="ctr"/>
+          <a:lstStyle/>
+          <a:p>
+            <a:pPr algn="ctr"/>
+            <a:r>
+              <a:rPr lang="fr-FR" sz="9600" b="1" dirty="0"/>
+              <a:t>1</a:t>
+            </a:r>
+          </a:p>
+        </p:txBody>
+      </p:sp>
+      <p:pic>
+        <p:nvPicPr>
+          <p:cNvPr id="1027" name="Picture 3" descr="C:\Users\Jeremie\Documents\Etudes\2011-2013 - UTT\Semestre 5\IF11\Projet\Maquettes\ticket-de-caisse.png"/>
+          <p:cNvPicPr>
+            <a:picLocks noChangeAspect="1" noChangeArrowheads="1"/>
+          </p:cNvPicPr>
+          <p:nvPr/>
+        </p:nvPicPr>
+        <p:blipFill>
+          <a:blip r:embed="rId3">
+            <a:extLst>
+              <a:ext uri="{28A0092B-C50C-407E-A947-70E740481C1C}">
+                <a14:useLocalDpi xmlns:a14="http://schemas.microsoft.com/office/drawing/2010/main" val="0"/>
+              </a:ext>
+            </a:extLst>
+          </a:blip>
+          <a:srcRect/>
+          <a:stretch>
+            <a:fillRect/>
+          </a:stretch>
+        </p:blipFill>
+        <p:spPr bwMode="auto">
+          <a:xfrm>
+            <a:off x="5011729" y="1355629"/>
+            <a:ext cx="2000968" cy="2986519"/>
+          </a:xfrm>
+          <a:prstGeom prst="rect">
+            <a:avLst/>
+          </a:prstGeom>
+          <a:ln>
+            <a:noFill/>
+          </a:ln>
+          <a:effectLst>
+            <a:outerShdw blurRad="292100" dist="139700" dir="2700000" algn="tl" rotWithShape="0">
+              <a:srgbClr val="333333">
+                <a:alpha val="65000"/>
+              </a:srgbClr>
+            </a:outerShdw>
+          </a:effectLst>
+          <a:extLst>
+            <a:ext uri="{909E8E84-426E-40DD-AFC4-6F175D3DCCD1}">
+              <a14:hiddenFill xmlns:a14="http://schemas.microsoft.com/office/drawing/2010/main">
+                <a:solidFill>
+                  <a:srgbClr val="FFFFFF"/>
+                </a:solidFill>
+              </a14:hiddenFill>
+            </a:ext>
+          </a:extLst>
+        </p:spPr>
+      </p:pic>
+      <p:pic>
+        <p:nvPicPr>
+          <p:cNvPr id="6" name="Picture 3" descr="C:\Users\Jeremie\Downloads\1369879771_man_person_mens_room.png"/>
+          <p:cNvPicPr>
+            <a:picLocks noChangeAspect="1" noChangeArrowheads="1"/>
+          </p:cNvPicPr>
+          <p:nvPr/>
+        </p:nvPicPr>
+        <p:blipFill>
+          <a:blip r:embed="rId4">
+            <a:extLst>
+              <a:ext uri="{28A0092B-C50C-407E-A947-70E740481C1C}">
+                <a14:useLocalDpi xmlns:a14="http://schemas.microsoft.com/office/drawing/2010/main" val="0"/>
+              </a:ext>
+            </a:extLst>
+          </a:blip>
+          <a:srcRect/>
+          <a:stretch>
+            <a:fillRect/>
+          </a:stretch>
+        </p:blipFill>
+        <p:spPr bwMode="auto">
+          <a:xfrm>
+            <a:off x="1907704" y="1747681"/>
+            <a:ext cx="2438400" cy="2438400"/>
+          </a:xfrm>
+          <a:prstGeom prst="rect">
+            <a:avLst/>
+          </a:prstGeom>
+          <a:noFill/>
+          <a:extLst>
+            <a:ext uri="{909E8E84-426E-40DD-AFC4-6F175D3DCCD1}">
+              <a14:hiddenFill xmlns:a14="http://schemas.microsoft.com/office/drawing/2010/main">
+                <a:solidFill>
+                  <a:srgbClr val="FFFFFF"/>
+                </a:solidFill>
+              </a14:hiddenFill>
+            </a:ext>
+          </a:extLst>
+        </p:spPr>
+      </p:pic>
+      <p:pic>
+        <p:nvPicPr>
+          <p:cNvPr id="9" name="Picture 2" descr="C:\Users\Jeremie\Documents\Etudes\2011-2013 - UTT\Semestre 5\IF11\Projet\Maquettes\Prototype\scan_qrcode.png"/>
+          <p:cNvPicPr>
+            <a:picLocks noChangeAspect="1" noChangeArrowheads="1"/>
+          </p:cNvPicPr>
+          <p:nvPr/>
+        </p:nvPicPr>
+        <p:blipFill>
+          <a:blip r:embed="rId5" cstate="print">
+            <a:extLst>
+              <a:ext uri="{28A0092B-C50C-407E-A947-70E740481C1C}">
+                <a14:useLocalDpi xmlns:a14="http://schemas.microsoft.com/office/drawing/2010/main" val="0"/>
+              </a:ext>
+            </a:extLst>
+          </a:blip>
+          <a:srcRect/>
+          <a:stretch>
+            <a:fillRect/>
+          </a:stretch>
+        </p:blipFill>
+        <p:spPr bwMode="auto">
+          <a:xfrm>
+            <a:off x="3602666" y="2197051"/>
+            <a:ext cx="727050" cy="1307724"/>
+          </a:xfrm>
+          <a:prstGeom prst="rect">
+            <a:avLst/>
+          </a:prstGeom>
+          <a:noFill/>
+          <a:extLst>
+            <a:ext uri="{909E8E84-426E-40DD-AFC4-6F175D3DCCD1}">
+              <a14:hiddenFill xmlns:a14="http://schemas.microsoft.com/office/drawing/2010/main">
+                <a:solidFill>
+                  <a:srgbClr val="FFFFFF"/>
+                </a:solidFill>
+              </a14:hiddenFill>
+            </a:ext>
+          </a:extLst>
+        </p:spPr>
+      </p:pic>
+      <p:sp>
+        <p:nvSpPr>
+          <p:cNvPr id="8" name="Flèche droite 7"/>
+          <p:cNvSpPr/>
+          <p:nvPr/>
+        </p:nvSpPr>
+        <p:spPr>
+          <a:xfrm rot="1420128">
+            <a:off x="4153983" y="3153680"/>
+            <a:ext cx="1620730" cy="488133"/>
+          </a:xfrm>
+          <a:prstGeom prst="rightArrow">
+            <a:avLst/>
+          </a:prstGeom>
+        </p:spPr>
+        <p:style>
+          <a:lnRef idx="3">
+            <a:schemeClr val="lt1"/>
+          </a:lnRef>
+          <a:fillRef idx="1">
+            <a:schemeClr val="accent2"/>
+          </a:fillRef>
+          <a:effectRef idx="1">
+            <a:schemeClr val="accent2"/>
+          </a:effectRef>
+          <a:fontRef idx="minor">
+            <a:schemeClr val="lt1"/>
+          </a:fontRef>
+        </p:style>
+        <p:txBody>
+          <a:bodyPr rtlCol="0" anchor="ctr"/>
+          <a:lstStyle/>
+          <a:p>
+            <a:pPr algn="ctr"/>
+            <a:endParaRPr lang="fr-FR"/>
+          </a:p>
+        </p:txBody>
+      </p:sp>
+    </p:spTree>
+    <p:extLst>
+      <p:ext uri="{BB962C8B-B14F-4D97-AF65-F5344CB8AC3E}">
+        <p14:creationId xmlns:p14="http://schemas.microsoft.com/office/powerpoint/2010/main" val="1485216481"/>
+      </p:ext>
+    </p:extLst>
+  </p:cSld>
+  <p:clrMapOvr>
+    <a:masterClrMapping/>
+  </p:clrMapOvr>
+</p:sld>
+</file>
+
+<file path=ppt/slides/slide11.xml><?xml version="1.0" encoding="utf-8"?>
+<p:sld xmlns:a="http://schemas.openxmlformats.org/drawingml/2006/main" xmlns:r="http://schemas.openxmlformats.org/officeDocument/2006/relationships" xmlns:p="http://schemas.openxmlformats.org/presentationml/2006/main">
+  <p:cSld>
+    <p:spTree>
+      <p:nvGrpSpPr>
+        <p:cNvPr id="1" name=""/>
+        <p:cNvGrpSpPr/>
+        <p:nvPr/>
+      </p:nvGrpSpPr>
+      <p:grpSpPr>
+        <a:xfrm>
+          <a:off x="0" y="0"/>
+          <a:ext cx="0" cy="0"/>
+          <a:chOff x="0" y="0"/>
+          <a:chExt cx="0" cy="0"/>
+        </a:xfrm>
+      </p:grpSpPr>
+      <p:sp>
+        <p:nvSpPr>
+          <p:cNvPr id="4" name="Ellipse 3"/>
+          <p:cNvSpPr/>
+          <p:nvPr/>
+        </p:nvSpPr>
+        <p:spPr>
+          <a:xfrm>
+            <a:off x="3986436" y="4781229"/>
+            <a:ext cx="1218056" cy="1218056"/>
+          </a:xfrm>
+          <a:prstGeom prst="ellipse">
+            <a:avLst/>
+          </a:prstGeom>
+          <a:noFill/>
+          <a:ln w="76200">
+            <a:solidFill>
+              <a:schemeClr val="tx1"/>
+            </a:solidFill>
+          </a:ln>
+        </p:spPr>
+        <p:style>
+          <a:lnRef idx="1">
+            <a:schemeClr val="dk1"/>
+          </a:lnRef>
+          <a:fillRef idx="2">
+            <a:schemeClr val="dk1"/>
+          </a:fillRef>
+          <a:effectRef idx="1">
+            <a:schemeClr val="dk1"/>
+          </a:effectRef>
+          <a:fontRef idx="minor">
+            <a:schemeClr val="dk1"/>
+          </a:fontRef>
+        </p:style>
+        <p:txBody>
+          <a:bodyPr rtlCol="0" anchor="ctr"/>
+          <a:lstStyle/>
+          <a:p>
+            <a:pPr algn="ctr"/>
+            <a:r>
+              <a:rPr lang="fr-FR" sz="9600" b="1" dirty="0"/>
+              <a:t>2</a:t>
+            </a:r>
+          </a:p>
+        </p:txBody>
+      </p:sp>
+      <p:pic>
+        <p:nvPicPr>
+          <p:cNvPr id="2050" name="Picture 2" descr="C:\Users\Jeremie\Documents\Etudes\2011-2013 - UTT\Semestre 5\IF11\Projet\Maquettes\Prototype\noter_commerce.png"/>
+          <p:cNvPicPr>
+            <a:picLocks noChangeAspect="1" noChangeArrowheads="1"/>
+          </p:cNvPicPr>
+          <p:nvPr/>
+        </p:nvPicPr>
+        <p:blipFill>
+          <a:blip r:embed="rId3">
+            <a:extLst>
+              <a:ext uri="{28A0092B-C50C-407E-A947-70E740481C1C}">
+                <a14:useLocalDpi xmlns:a14="http://schemas.microsoft.com/office/drawing/2010/main" val="0"/>
+              </a:ext>
+            </a:extLst>
+          </a:blip>
+          <a:srcRect/>
+          <a:stretch>
+            <a:fillRect/>
+          </a:stretch>
+        </p:blipFill>
+        <p:spPr bwMode="auto">
+          <a:xfrm>
+            <a:off x="3686705" y="908720"/>
+            <a:ext cx="1817517" cy="3420000"/>
+          </a:xfrm>
+          <a:prstGeom prst="rect">
+            <a:avLst/>
+          </a:prstGeom>
+          <a:noFill/>
+          <a:extLst>
+            <a:ext uri="{909E8E84-426E-40DD-AFC4-6F175D3DCCD1}">
+              <a14:hiddenFill xmlns:a14="http://schemas.microsoft.com/office/drawing/2010/main">
+                <a:solidFill>
+                  <a:srgbClr val="FFFFFF"/>
+                </a:solidFill>
+              </a14:hiddenFill>
+            </a:ext>
+          </a:extLst>
+        </p:spPr>
+      </p:pic>
+    </p:spTree>
+    <p:extLst>
+      <p:ext uri="{BB962C8B-B14F-4D97-AF65-F5344CB8AC3E}">
+        <p14:creationId xmlns:p14="http://schemas.microsoft.com/office/powerpoint/2010/main" val="1862089437"/>
+      </p:ext>
+    </p:extLst>
+  </p:cSld>
+  <p:clrMapOvr>
+    <a:masterClrMapping/>
+  </p:clrMapOvr>
+</p:sld>
+</file>
+
+<file path=ppt/slides/slide12.xml><?xml version="1.0" encoding="utf-8"?>
+<p:sld xmlns:a="http://schemas.openxmlformats.org/drawingml/2006/main" xmlns:r="http://schemas.openxmlformats.org/officeDocument/2006/relationships" xmlns:p="http://schemas.openxmlformats.org/presentationml/2006/main">
+  <p:cSld>
+    <p:spTree>
+      <p:nvGrpSpPr>
+        <p:cNvPr id="1" name=""/>
+        <p:cNvGrpSpPr/>
+        <p:nvPr/>
+      </p:nvGrpSpPr>
+      <p:grpSpPr>
+        <a:xfrm>
+          <a:off x="0" y="0"/>
+          <a:ext cx="0" cy="0"/>
+          <a:chOff x="0" y="0"/>
+          <a:chExt cx="0" cy="0"/>
+        </a:xfrm>
+      </p:grpSpPr>
+      <p:sp>
+        <p:nvSpPr>
+          <p:cNvPr id="4" name="Ellipse 3"/>
+          <p:cNvSpPr/>
+          <p:nvPr/>
+        </p:nvSpPr>
+        <p:spPr>
+          <a:xfrm>
+            <a:off x="3986436" y="4781229"/>
+            <a:ext cx="1218056" cy="1218056"/>
+          </a:xfrm>
+          <a:prstGeom prst="ellipse">
+            <a:avLst/>
+          </a:prstGeom>
+          <a:noFill/>
+          <a:ln w="76200">
+            <a:solidFill>
+              <a:schemeClr val="tx1"/>
+            </a:solidFill>
+          </a:ln>
+        </p:spPr>
+        <p:style>
+          <a:lnRef idx="1">
+            <a:schemeClr val="dk1"/>
+          </a:lnRef>
+          <a:fillRef idx="2">
+            <a:schemeClr val="dk1"/>
+          </a:fillRef>
+          <a:effectRef idx="1">
+            <a:schemeClr val="dk1"/>
+          </a:effectRef>
+          <a:fontRef idx="minor">
+            <a:schemeClr val="dk1"/>
+          </a:fontRef>
+        </p:style>
+        <p:txBody>
+          <a:bodyPr rtlCol="0" anchor="ctr"/>
+          <a:lstStyle/>
+          <a:p>
+            <a:pPr algn="ctr"/>
+            <a:r>
+              <a:rPr lang="fr-FR" sz="9600" b="1" dirty="0"/>
+              <a:t>3</a:t>
+            </a:r>
+          </a:p>
+        </p:txBody>
+      </p:sp>
+      <p:pic>
+        <p:nvPicPr>
+          <p:cNvPr id="3074" name="Picture 2" descr="C:\Users\Jeremie\Documents\Etudes\2011-2013 - UTT\Semestre 5\IF11\Projet\Maquettes\Prototype\points_fidelite_categorie.png"/>
+          <p:cNvPicPr>
+            <a:picLocks noChangeAspect="1" noChangeArrowheads="1"/>
+          </p:cNvPicPr>
+          <p:nvPr/>
+        </p:nvPicPr>
+        <p:blipFill>
+          <a:blip r:embed="rId3">
+            <a:extLst>
+              <a:ext uri="{28A0092B-C50C-407E-A947-70E740481C1C}">
+                <a14:useLocalDpi xmlns:a14="http://schemas.microsoft.com/office/drawing/2010/main" val="0"/>
+              </a:ext>
+            </a:extLst>
+          </a:blip>
+          <a:srcRect/>
+          <a:stretch>
+            <a:fillRect/>
+          </a:stretch>
+        </p:blipFill>
+        <p:spPr bwMode="auto">
+          <a:xfrm>
+            <a:off x="3711093" y="908720"/>
+            <a:ext cx="1768741" cy="3420000"/>
+          </a:xfrm>
+          <a:prstGeom prst="rect">
+            <a:avLst/>
+          </a:prstGeom>
+          <a:noFill/>
+          <a:extLst>
+            <a:ext uri="{909E8E84-426E-40DD-AFC4-6F175D3DCCD1}">
+              <a14:hiddenFill xmlns:a14="http://schemas.microsoft.com/office/drawing/2010/main">
+                <a:solidFill>
+                  <a:srgbClr val="FFFFFF"/>
+                </a:solidFill>
+              </a14:hiddenFill>
+            </a:ext>
+          </a:extLst>
+        </p:spPr>
+      </p:pic>
+    </p:spTree>
+    <p:extLst>
+      <p:ext uri="{BB962C8B-B14F-4D97-AF65-F5344CB8AC3E}">
+        <p14:creationId xmlns:p14="http://schemas.microsoft.com/office/powerpoint/2010/main" val="678615832"/>
+      </p:ext>
+    </p:extLst>
+  </p:cSld>
+  <p:clrMapOvr>
+    <a:masterClrMapping/>
+  </p:clrMapOvr>
+</p:sld>
+</file>
+
+<file path=ppt/slides/slide13.xml><?xml version="1.0" encoding="utf-8"?>
+<p:sld xmlns:a="http://schemas.openxmlformats.org/drawingml/2006/main" xmlns:r="http://schemas.openxmlformats.org/officeDocument/2006/relationships" xmlns:p="http://schemas.openxmlformats.org/presentationml/2006/main">
+  <p:cSld>
+    <p:spTree>
+      <p:nvGrpSpPr>
+        <p:cNvPr id="1" name=""/>
+        <p:cNvGrpSpPr/>
+        <p:nvPr/>
+      </p:nvGrpSpPr>
+      <p:grpSpPr>
+        <a:xfrm>
+          <a:off x="0" y="0"/>
+          <a:ext cx="0" cy="0"/>
+          <a:chOff x="0" y="0"/>
+          <a:chExt cx="0" cy="0"/>
+        </a:xfrm>
+      </p:grpSpPr>
+      <p:sp>
+        <p:nvSpPr>
+          <p:cNvPr id="4" name="Ellipse 3"/>
+          <p:cNvSpPr/>
+          <p:nvPr/>
+        </p:nvSpPr>
+        <p:spPr>
+          <a:xfrm>
+            <a:off x="3986436" y="4781229"/>
+            <a:ext cx="1218056" cy="1218056"/>
+          </a:xfrm>
+          <a:prstGeom prst="ellipse">
+            <a:avLst/>
+          </a:prstGeom>
+          <a:noFill/>
+          <a:ln w="76200">
+            <a:solidFill>
+              <a:schemeClr val="tx1"/>
+            </a:solidFill>
+          </a:ln>
+        </p:spPr>
+        <p:style>
+          <a:lnRef idx="1">
+            <a:schemeClr val="dk1"/>
+          </a:lnRef>
+          <a:fillRef idx="2">
+            <a:schemeClr val="dk1"/>
+          </a:fillRef>
+          <a:effectRef idx="1">
+            <a:schemeClr val="dk1"/>
+          </a:effectRef>
+          <a:fontRef idx="minor">
+            <a:schemeClr val="dk1"/>
+          </a:fontRef>
+        </p:style>
+        <p:txBody>
+          <a:bodyPr rtlCol="0" anchor="ctr"/>
+          <a:lstStyle/>
+          <a:p>
+            <a:pPr algn="ctr"/>
+            <a:r>
+              <a:rPr lang="fr-FR" sz="9600" b="1" dirty="0"/>
+              <a:t>4</a:t>
+            </a:r>
+          </a:p>
+        </p:txBody>
+      </p:sp>
+      <p:pic>
+        <p:nvPicPr>
+          <p:cNvPr id="4098" name="Picture 2" descr="C:\Users\Jeremie\Documents\Etudes\2011-2013 - UTT\Semestre 5\IF11\Projet\Maquettes\Prototype\points_fidelite_sousCategorie.png"/>
+          <p:cNvPicPr>
+            <a:picLocks noChangeAspect="1" noChangeArrowheads="1"/>
+          </p:cNvPicPr>
+          <p:nvPr/>
+        </p:nvPicPr>
+        <p:blipFill>
+          <a:blip r:embed="rId3">
+            <a:extLst>
+              <a:ext uri="{28A0092B-C50C-407E-A947-70E740481C1C}">
+                <a14:useLocalDpi xmlns:a14="http://schemas.microsoft.com/office/drawing/2010/main" val="0"/>
+              </a:ext>
+            </a:extLst>
+          </a:blip>
+          <a:srcRect/>
+          <a:stretch>
+            <a:fillRect/>
+          </a:stretch>
+        </p:blipFill>
+        <p:spPr bwMode="auto">
+          <a:xfrm>
+            <a:off x="3711094" y="908720"/>
+            <a:ext cx="1768739" cy="3420000"/>
+          </a:xfrm>
+          <a:prstGeom prst="rect">
+            <a:avLst/>
+          </a:prstGeom>
+          <a:noFill/>
+          <a:extLst>
+            <a:ext uri="{909E8E84-426E-40DD-AFC4-6F175D3DCCD1}">
+              <a14:hiddenFill xmlns:a14="http://schemas.microsoft.com/office/drawing/2010/main">
+                <a:solidFill>
+                  <a:srgbClr val="FFFFFF"/>
+                </a:solidFill>
+              </a14:hiddenFill>
+            </a:ext>
+          </a:extLst>
+        </p:spPr>
+      </p:pic>
+    </p:spTree>
+    <p:extLst>
+      <p:ext uri="{BB962C8B-B14F-4D97-AF65-F5344CB8AC3E}">
+        <p14:creationId xmlns:p14="http://schemas.microsoft.com/office/powerpoint/2010/main" val="1363297084"/>
+      </p:ext>
+    </p:extLst>
+  </p:cSld>
+  <p:clrMapOvr>
+    <a:masterClrMapping/>
+  </p:clrMapOvr>
+</p:sld>
+</file>
+
+<file path=ppt/slides/slide14.xml><?xml version="1.0" encoding="utf-8"?>
+<p:sld xmlns:a="http://schemas.openxmlformats.org/drawingml/2006/main" xmlns:r="http://schemas.openxmlformats.org/officeDocument/2006/relationships" xmlns:p="http://schemas.openxmlformats.org/presentationml/2006/main">
+  <p:cSld>
+    <p:spTree>
+      <p:nvGrpSpPr>
+        <p:cNvPr id="1" name=""/>
+        <p:cNvGrpSpPr/>
+        <p:nvPr/>
+      </p:nvGrpSpPr>
+      <p:grpSpPr>
+        <a:xfrm>
+          <a:off x="0" y="0"/>
+          <a:ext cx="0" cy="0"/>
+          <a:chOff x="0" y="0"/>
+          <a:chExt cx="0" cy="0"/>
+        </a:xfrm>
+      </p:grpSpPr>
+      <p:pic>
+        <p:nvPicPr>
+          <p:cNvPr id="1026" name="Picture 2" descr="C:\Users\Jeremie\Documents\Etudes\2011-2013 - UTT\Semestre 5\IF11\Projet\Maquettes\Prototype\smartphone.png"/>
+          <p:cNvPicPr>
+            <a:picLocks noChangeAspect="1" noChangeArrowheads="1"/>
+          </p:cNvPicPr>
+          <p:nvPr/>
+        </p:nvPicPr>
+        <p:blipFill>
+          <a:blip r:embed="rId3" cstate="print">
+            <a:extLst>
+              <a:ext uri="{28A0092B-C50C-407E-A947-70E740481C1C}">
+                <a14:useLocalDpi xmlns:a14="http://schemas.microsoft.com/office/drawing/2010/main" val="0"/>
+              </a:ext>
+            </a:extLst>
+          </a:blip>
+          <a:srcRect/>
+          <a:stretch>
+            <a:fillRect/>
+          </a:stretch>
+        </p:blipFill>
+        <p:spPr bwMode="auto">
+          <a:xfrm>
+            <a:off x="4772395" y="2226102"/>
+            <a:ext cx="933967" cy="1760782"/>
+          </a:xfrm>
+          <a:prstGeom prst="rect">
+            <a:avLst/>
+          </a:prstGeom>
+          <a:noFill/>
+          <a:extLst>
+            <a:ext uri="{909E8E84-426E-40DD-AFC4-6F175D3DCCD1}">
+              <a14:hiddenFill xmlns:a14="http://schemas.microsoft.com/office/drawing/2010/main">
+                <a:solidFill>
+                  <a:srgbClr val="FFFFFF"/>
+                </a:solidFill>
+              </a14:hiddenFill>
+            </a:ext>
+          </a:extLst>
+        </p:spPr>
+      </p:pic>
+      <p:pic>
+        <p:nvPicPr>
+          <p:cNvPr id="1027" name="Picture 3" descr="C:\Users\Jeremie\Downloads\1369879771_man_person_mens_room.png"/>
+          <p:cNvPicPr>
+            <a:picLocks noChangeAspect="1" noChangeArrowheads="1"/>
+          </p:cNvPicPr>
+          <p:nvPr/>
+        </p:nvPicPr>
+        <p:blipFill>
+          <a:blip r:embed="rId4">
+            <a:extLst>
+              <a:ext uri="{28A0092B-C50C-407E-A947-70E740481C1C}">
+                <a14:useLocalDpi xmlns:a14="http://schemas.microsoft.com/office/drawing/2010/main" val="0"/>
+              </a:ext>
+            </a:extLst>
+          </a:blip>
+          <a:srcRect/>
+          <a:stretch>
+            <a:fillRect/>
+          </a:stretch>
+        </p:blipFill>
+        <p:spPr bwMode="auto">
+          <a:xfrm>
+            <a:off x="2925688" y="1887293"/>
+            <a:ext cx="2438400" cy="2438400"/>
+          </a:xfrm>
+          <a:prstGeom prst="rect">
+            <a:avLst/>
+          </a:prstGeom>
+          <a:noFill/>
+          <a:extLst>
+            <a:ext uri="{909E8E84-426E-40DD-AFC4-6F175D3DCCD1}">
+              <a14:hiddenFill xmlns:a14="http://schemas.microsoft.com/office/drawing/2010/main">
+                <a:solidFill>
+                  <a:srgbClr val="FFFFFF"/>
+                </a:solidFill>
+              </a14:hiddenFill>
+            </a:ext>
+          </a:extLst>
+        </p:spPr>
+      </p:pic>
+      <p:sp>
+        <p:nvSpPr>
+          <p:cNvPr id="4" name="Ellipse 3"/>
+          <p:cNvSpPr/>
+          <p:nvPr/>
+        </p:nvSpPr>
+        <p:spPr>
+          <a:xfrm>
+            <a:off x="3986436" y="4781229"/>
+            <a:ext cx="1218056" cy="1218056"/>
+          </a:xfrm>
+          <a:prstGeom prst="ellipse">
+            <a:avLst/>
+          </a:prstGeom>
+          <a:noFill/>
+          <a:ln w="76200">
+            <a:solidFill>
+              <a:schemeClr val="tx1"/>
+            </a:solidFill>
+          </a:ln>
+        </p:spPr>
+        <p:style>
+          <a:lnRef idx="1">
+            <a:schemeClr val="dk1"/>
+          </a:lnRef>
+          <a:fillRef idx="2">
+            <a:schemeClr val="dk1"/>
+          </a:fillRef>
+          <a:effectRef idx="1">
+            <a:schemeClr val="dk1"/>
+          </a:effectRef>
+          <a:fontRef idx="minor">
+            <a:schemeClr val="dk1"/>
+          </a:fontRef>
+        </p:style>
+        <p:txBody>
+          <a:bodyPr rtlCol="0" anchor="ctr"/>
+          <a:lstStyle/>
+          <a:p>
+            <a:pPr algn="ctr"/>
+            <a:r>
+              <a:rPr lang="fr-FR" sz="9600" b="1" dirty="0"/>
+              <a:t>1</a:t>
+            </a:r>
+            <a:endParaRPr lang="fr-FR" sz="9600" b="1" dirty="0"/>
+          </a:p>
+        </p:txBody>
+      </p:sp>
+      <p:pic>
+        <p:nvPicPr>
+          <p:cNvPr id="2050" name="Picture 2" descr="C:\Users\Jeremie\Downloads\1370484028_preferences-desktop-notification.png"/>
+          <p:cNvPicPr>
+            <a:picLocks noChangeAspect="1" noChangeArrowheads="1"/>
+          </p:cNvPicPr>
+          <p:nvPr/>
+        </p:nvPicPr>
+        <p:blipFill>
+          <a:blip r:embed="rId5">
+            <a:extLst>
+              <a:ext uri="{28A0092B-C50C-407E-A947-70E740481C1C}">
+                <a14:useLocalDpi xmlns:a14="http://schemas.microsoft.com/office/drawing/2010/main" val="0"/>
+              </a:ext>
+            </a:extLst>
+          </a:blip>
+          <a:srcRect/>
+          <a:stretch>
+            <a:fillRect/>
+          </a:stretch>
+        </p:blipFill>
+        <p:spPr bwMode="auto">
+          <a:xfrm>
+            <a:off x="5239378" y="1700808"/>
+            <a:ext cx="931168" cy="931168"/>
+          </a:xfrm>
+          <a:prstGeom prst="rect">
+            <a:avLst/>
+          </a:prstGeom>
+          <a:noFill/>
+          <a:extLst>
+            <a:ext uri="{909E8E84-426E-40DD-AFC4-6F175D3DCCD1}">
+              <a14:hiddenFill xmlns:a14="http://schemas.microsoft.com/office/drawing/2010/main">
+                <a:solidFill>
+                  <a:srgbClr val="FFFFFF"/>
+                </a:solidFill>
+              </a14:hiddenFill>
+            </a:ext>
+          </a:extLst>
+        </p:spPr>
+      </p:pic>
+    </p:spTree>
+    <p:extLst>
+      <p:ext uri="{BB962C8B-B14F-4D97-AF65-F5344CB8AC3E}">
+        <p14:creationId xmlns:p14="http://schemas.microsoft.com/office/powerpoint/2010/main" val="3514449605"/>
+      </p:ext>
+    </p:extLst>
+  </p:cSld>
+  <p:clrMapOvr>
+    <a:masterClrMapping/>
+  </p:clrMapOvr>
+</p:sld>
+</file>
+
+<file path=ppt/slides/slide15.xml><?xml version="1.0" encoding="utf-8"?>
+<p:sld xmlns:a="http://schemas.openxmlformats.org/drawingml/2006/main" xmlns:r="http://schemas.openxmlformats.org/officeDocument/2006/relationships" xmlns:p="http://schemas.openxmlformats.org/presentationml/2006/main">
+  <p:cSld>
+    <p:spTree>
+      <p:nvGrpSpPr>
+        <p:cNvPr id="1" name=""/>
+        <p:cNvGrpSpPr/>
+        <p:nvPr/>
+      </p:nvGrpSpPr>
+      <p:grpSpPr>
+        <a:xfrm>
+          <a:off x="0" y="0"/>
+          <a:ext cx="0" cy="0"/>
+          <a:chOff x="0" y="0"/>
+          <a:chExt cx="0" cy="0"/>
+        </a:xfrm>
+      </p:grpSpPr>
+      <p:sp>
+        <p:nvSpPr>
+          <p:cNvPr id="4" name="Ellipse 3"/>
+          <p:cNvSpPr/>
+          <p:nvPr/>
+        </p:nvSpPr>
+        <p:spPr>
+          <a:xfrm>
+            <a:off x="3986436" y="4781229"/>
+            <a:ext cx="1218056" cy="1218056"/>
+          </a:xfrm>
+          <a:prstGeom prst="ellipse">
+            <a:avLst/>
+          </a:prstGeom>
+          <a:noFill/>
+          <a:ln w="76200">
+            <a:solidFill>
+              <a:schemeClr val="tx1"/>
+            </a:solidFill>
+          </a:ln>
+        </p:spPr>
+        <p:style>
+          <a:lnRef idx="1">
+            <a:schemeClr val="dk1"/>
+          </a:lnRef>
+          <a:fillRef idx="2">
+            <a:schemeClr val="dk1"/>
+          </a:fillRef>
+          <a:effectRef idx="1">
+            <a:schemeClr val="dk1"/>
+          </a:effectRef>
+          <a:fontRef idx="minor">
+            <a:schemeClr val="dk1"/>
+          </a:fontRef>
+        </p:style>
+        <p:txBody>
+          <a:bodyPr rtlCol="0" anchor="ctr"/>
+          <a:lstStyle/>
+          <a:p>
+            <a:pPr algn="ctr"/>
+            <a:r>
+              <a:rPr lang="fr-FR" sz="9600" b="1" dirty="0"/>
+              <a:t>2</a:t>
+            </a:r>
+          </a:p>
+        </p:txBody>
+      </p:sp>
+      <p:pic>
+        <p:nvPicPr>
+          <p:cNvPr id="3074" name="Picture 2" descr="C:\Users\Jeremie\Documents\Etudes\2011-2013 - UTT\Semestre 5\IF11\Projet\Maquettes\Prototype\liste_evenement.png"/>
+          <p:cNvPicPr>
+            <a:picLocks noChangeAspect="1" noChangeArrowheads="1"/>
+          </p:cNvPicPr>
+          <p:nvPr/>
+        </p:nvPicPr>
+        <p:blipFill>
+          <a:blip r:embed="rId3">
+            <a:extLst>
+              <a:ext uri="{28A0092B-C50C-407E-A947-70E740481C1C}">
+                <a14:useLocalDpi xmlns:a14="http://schemas.microsoft.com/office/drawing/2010/main" val="0"/>
+              </a:ext>
+            </a:extLst>
+          </a:blip>
+          <a:srcRect/>
+          <a:stretch>
+            <a:fillRect/>
+          </a:stretch>
+        </p:blipFill>
+        <p:spPr bwMode="auto">
+          <a:xfrm>
+            <a:off x="3691367" y="908720"/>
+            <a:ext cx="1808191" cy="3420000"/>
+          </a:xfrm>
+          <a:prstGeom prst="rect">
+            <a:avLst/>
+          </a:prstGeom>
+          <a:noFill/>
+          <a:extLst>
+            <a:ext uri="{909E8E84-426E-40DD-AFC4-6F175D3DCCD1}">
+              <a14:hiddenFill xmlns:a14="http://schemas.microsoft.com/office/drawing/2010/main">
+                <a:solidFill>
+                  <a:srgbClr val="FFFFFF"/>
+                </a:solidFill>
+              </a14:hiddenFill>
+            </a:ext>
+          </a:extLst>
+        </p:spPr>
+      </p:pic>
+    </p:spTree>
+    <p:extLst>
+      <p:ext uri="{BB962C8B-B14F-4D97-AF65-F5344CB8AC3E}">
+        <p14:creationId xmlns:p14="http://schemas.microsoft.com/office/powerpoint/2010/main" val="3218930357"/>
+      </p:ext>
+    </p:extLst>
+  </p:cSld>
+  <p:clrMapOvr>
+    <a:masterClrMapping/>
+  </p:clrMapOvr>
+</p:sld>
+</file>
+
+<file path=ppt/slides/slide16.xml><?xml version="1.0" encoding="utf-8"?>
+<p:sld xmlns:a="http://schemas.openxmlformats.org/drawingml/2006/main" xmlns:r="http://schemas.openxmlformats.org/officeDocument/2006/relationships" xmlns:p="http://schemas.openxmlformats.org/presentationml/2006/main">
+  <p:cSld>
+    <p:spTree>
+      <p:nvGrpSpPr>
+        <p:cNvPr id="1" name=""/>
+        <p:cNvGrpSpPr/>
+        <p:nvPr/>
+      </p:nvGrpSpPr>
+      <p:grpSpPr>
+        <a:xfrm>
+          <a:off x="0" y="0"/>
+          <a:ext cx="0" cy="0"/>
+          <a:chOff x="0" y="0"/>
+          <a:chExt cx="0" cy="0"/>
+        </a:xfrm>
+      </p:grpSpPr>
+      <p:sp>
+        <p:nvSpPr>
+          <p:cNvPr id="4" name="Ellipse 3"/>
+          <p:cNvSpPr/>
+          <p:nvPr/>
+        </p:nvSpPr>
+        <p:spPr>
+          <a:xfrm>
+            <a:off x="3986436" y="4781229"/>
+            <a:ext cx="1218056" cy="1218056"/>
+          </a:xfrm>
+          <a:prstGeom prst="ellipse">
+            <a:avLst/>
+          </a:prstGeom>
+          <a:noFill/>
+          <a:ln w="76200">
+            <a:solidFill>
+              <a:schemeClr val="tx1"/>
+            </a:solidFill>
+          </a:ln>
+        </p:spPr>
+        <p:style>
+          <a:lnRef idx="1">
+            <a:schemeClr val="dk1"/>
+          </a:lnRef>
+          <a:fillRef idx="2">
+            <a:schemeClr val="dk1"/>
+          </a:fillRef>
+          <a:effectRef idx="1">
+            <a:schemeClr val="dk1"/>
+          </a:effectRef>
+          <a:fontRef idx="minor">
+            <a:schemeClr val="dk1"/>
+          </a:fontRef>
+        </p:style>
+        <p:txBody>
+          <a:bodyPr rtlCol="0" anchor="ctr"/>
+          <a:lstStyle/>
+          <a:p>
+            <a:pPr algn="ctr"/>
+            <a:r>
+              <a:rPr lang="fr-FR" sz="9600" b="1" dirty="0"/>
+              <a:t>3</a:t>
+            </a:r>
+            <a:endParaRPr lang="fr-FR" sz="9600" b="1" dirty="0"/>
+          </a:p>
+        </p:txBody>
+      </p:sp>
+      <p:pic>
+        <p:nvPicPr>
+          <p:cNvPr id="4098" name="Picture 2" descr="C:\Users\Jeremie\Documents\Etudes\2011-2013 - UTT\Semestre 5\IF11\Projet\Maquettes\Prototype\description_evenement.png"/>
+          <p:cNvPicPr>
+            <a:picLocks noChangeAspect="1" noChangeArrowheads="1"/>
+          </p:cNvPicPr>
+          <p:nvPr/>
+        </p:nvPicPr>
+        <p:blipFill>
+          <a:blip r:embed="rId3">
+            <a:extLst>
+              <a:ext uri="{28A0092B-C50C-407E-A947-70E740481C1C}">
+                <a14:useLocalDpi xmlns:a14="http://schemas.microsoft.com/office/drawing/2010/main" val="0"/>
+              </a:ext>
+            </a:extLst>
+          </a:blip>
+          <a:srcRect/>
+          <a:stretch>
+            <a:fillRect/>
+          </a:stretch>
+        </p:blipFill>
+        <p:spPr bwMode="auto">
+          <a:xfrm>
+            <a:off x="3564703" y="764704"/>
+            <a:ext cx="2061522" cy="3708000"/>
+          </a:xfrm>
+          <a:prstGeom prst="rect">
+            <a:avLst/>
+          </a:prstGeom>
+          <a:noFill/>
+          <a:extLst>
+            <a:ext uri="{909E8E84-426E-40DD-AFC4-6F175D3DCCD1}">
+              <a14:hiddenFill xmlns:a14="http://schemas.microsoft.com/office/drawing/2010/main">
+                <a:solidFill>
+                  <a:srgbClr val="FFFFFF"/>
+                </a:solidFill>
+              </a14:hiddenFill>
+            </a:ext>
+          </a:extLst>
+        </p:spPr>
+      </p:pic>
+    </p:spTree>
+    <p:extLst>
+      <p:ext uri="{BB962C8B-B14F-4D97-AF65-F5344CB8AC3E}">
+        <p14:creationId xmlns:p14="http://schemas.microsoft.com/office/powerpoint/2010/main" val="3214738338"/>
+      </p:ext>
+    </p:extLst>
+  </p:cSld>
+  <p:clrMapOvr>
+    <a:masterClrMapping/>
+  </p:clrMapOvr>
 </p:sld>
 </file>
 
@@ -4685,6 +6142,47 @@
       </p:grpSpPr>
       <p:pic>
         <p:nvPicPr>
+          <p:cNvPr id="1026" name="Picture 2" descr="C:\Users\Jeremie\Documents\Etudes\2011-2013 - UTT\Semestre 5\IF11\Projet\Maquettes\Prototype\smartphone.png"/>
+          <p:cNvPicPr>
+            <a:picLocks noChangeAspect="1" noChangeArrowheads="1"/>
+          </p:cNvPicPr>
+          <p:nvPr/>
+        </p:nvPicPr>
+        <p:blipFill>
+          <a:blip r:embed="rId3" cstate="print">
+            <a:extLst>
+              <a:ext uri="{28A0092B-C50C-407E-A947-70E740481C1C}">
+                <a14:useLocalDpi xmlns:a14="http://schemas.microsoft.com/office/drawing/2010/main" val="0"/>
+              </a:ext>
+            </a:extLst>
+          </a:blip>
+          <a:srcRect/>
+          <a:stretch>
+            <a:fillRect/>
+          </a:stretch>
+        </p:blipFill>
+        <p:spPr bwMode="auto">
+          <a:xfrm>
+            <a:off x="4772395" y="2226102"/>
+            <a:ext cx="933967" cy="1760782"/>
+          </a:xfrm>
+          <a:prstGeom prst="rect">
+            <a:avLst/>
+          </a:prstGeom>
+          <a:noFill/>
+          <a:extLst>
+            <a:ext uri="{909E8E84-426E-40DD-AFC4-6F175D3DCCD1}">
+              <a14:hiddenFill xmlns:a14="http://schemas.microsoft.com/office/drawing/2010/main">
+                <a:solidFill>
+                  <a:srgbClr val="FFFFFF"/>
+                </a:solidFill>
+              </a14:hiddenFill>
+            </a:ext>
+          </a:extLst>
+        </p:spPr>
+      </p:pic>
+      <p:pic>
+        <p:nvPicPr>
           <p:cNvPr id="1027" name="Picture 3" descr="C:\Users\Jeremie\Downloads\1369879771_man_person_mens_room.png"/>
           <p:cNvPicPr>
             <a:picLocks noChangeAspect="1" noChangeArrowheads="1"/>
@@ -4692,7 +6190,7 @@
           <p:nvPr/>
         </p:nvPicPr>
         <p:blipFill>
-          <a:blip r:embed="rId3">
+          <a:blip r:embed="rId4">
             <a:extLst>
               <a:ext uri="{28A0092B-C50C-407E-A947-70E740481C1C}">
                 <a14:useLocalDpi xmlns:a14="http://schemas.microsoft.com/office/drawing/2010/main" val="0"/>
@@ -4771,47 +6269,6 @@
           </a:p>
         </p:txBody>
       </p:sp>
-      <p:pic>
-        <p:nvPicPr>
-          <p:cNvPr id="2050" name="Picture 2" descr="C:\Users\Jeremie\Downloads\phone.png"/>
-          <p:cNvPicPr>
-            <a:picLocks noChangeAspect="1" noChangeArrowheads="1"/>
-          </p:cNvPicPr>
-          <p:nvPr/>
-        </p:nvPicPr>
-        <p:blipFill>
-          <a:blip r:embed="rId4" cstate="print">
-            <a:extLst>
-              <a:ext uri="{28A0092B-C50C-407E-A947-70E740481C1C}">
-                <a14:useLocalDpi xmlns:a14="http://schemas.microsoft.com/office/drawing/2010/main" val="0"/>
-              </a:ext>
-            </a:extLst>
-          </a:blip>
-          <a:srcRect/>
-          <a:stretch>
-            <a:fillRect/>
-          </a:stretch>
-        </p:blipFill>
-        <p:spPr bwMode="auto">
-          <a:xfrm>
-            <a:off x="4913512" y="2475176"/>
-            <a:ext cx="698368" cy="1262633"/>
-          </a:xfrm>
-          <a:prstGeom prst="rect">
-            <a:avLst/>
-          </a:prstGeom>
-          <a:noFill/>
-          <a:extLst>
-            <a:ext uri="{909E8E84-426E-40DD-AFC4-6F175D3DCCD1}">
-              <a14:hiddenFill xmlns:a14="http://schemas.microsoft.com/office/drawing/2010/main">
-                <a:solidFill>
-                  <a:srgbClr val="FFFFFF"/>
-                </a:solidFill>
-              </a14:hiddenFill>
-            </a:ext>
-          </a:extLst>
-        </p:spPr>
-      </p:pic>
       <p:sp>
         <p:nvSpPr>
           <p:cNvPr id="2" name="Rectangle à coins arrondis 1"/>
@@ -4858,248 +6315,14 @@
       </p:sp>
       <p:sp>
         <p:nvSpPr>
-          <p:cNvPr id="3" name="Rectangle à coins arrondis 2"/>
-          <p:cNvSpPr/>
-          <p:nvPr/>
-        </p:nvSpPr>
-        <p:spPr>
-          <a:xfrm>
-            <a:off x="5041694" y="2806659"/>
-            <a:ext cx="181470" cy="181549"/>
-          </a:xfrm>
-          <a:prstGeom prst="roundRect">
-            <a:avLst/>
-          </a:prstGeom>
-          <a:noFill/>
-        </p:spPr>
-        <p:style>
-          <a:lnRef idx="1">
-            <a:schemeClr val="dk1"/>
-          </a:lnRef>
-          <a:fillRef idx="2">
-            <a:schemeClr val="dk1"/>
-          </a:fillRef>
-          <a:effectRef idx="1">
-            <a:schemeClr val="dk1"/>
-          </a:effectRef>
-          <a:fontRef idx="minor">
-            <a:schemeClr val="dk1"/>
-          </a:fontRef>
-        </p:style>
-        <p:txBody>
-          <a:bodyPr rtlCol="0" anchor="ctr"/>
-          <a:lstStyle/>
-          <a:p>
-            <a:pPr algn="ctr"/>
-            <a:endParaRPr lang="fr-FR"/>
-          </a:p>
-        </p:txBody>
-      </p:sp>
-      <p:sp>
-        <p:nvSpPr>
-          <p:cNvPr id="9" name="Rectangle à coins arrondis 8"/>
-          <p:cNvSpPr/>
-          <p:nvPr/>
-        </p:nvSpPr>
-        <p:spPr>
-          <a:xfrm>
-            <a:off x="5292025" y="2806659"/>
-            <a:ext cx="181470" cy="181549"/>
-          </a:xfrm>
-          <a:prstGeom prst="roundRect">
-            <a:avLst/>
-          </a:prstGeom>
-          <a:noFill/>
-        </p:spPr>
-        <p:style>
-          <a:lnRef idx="1">
-            <a:schemeClr val="dk1"/>
-          </a:lnRef>
-          <a:fillRef idx="2">
-            <a:schemeClr val="dk1"/>
-          </a:fillRef>
-          <a:effectRef idx="1">
-            <a:schemeClr val="dk1"/>
-          </a:effectRef>
-          <a:fontRef idx="minor">
-            <a:schemeClr val="dk1"/>
-          </a:fontRef>
-        </p:style>
-        <p:txBody>
-          <a:bodyPr rtlCol="0" anchor="ctr"/>
-          <a:lstStyle/>
-          <a:p>
-            <a:pPr algn="ctr"/>
-            <a:endParaRPr lang="fr-FR"/>
-          </a:p>
-        </p:txBody>
-      </p:sp>
-      <p:sp>
-        <p:nvSpPr>
-          <p:cNvPr id="10" name="Rectangle à coins arrondis 9"/>
-          <p:cNvSpPr/>
-          <p:nvPr/>
-        </p:nvSpPr>
-        <p:spPr>
-          <a:xfrm>
-            <a:off x="5041694" y="3049833"/>
-            <a:ext cx="181470" cy="181549"/>
-          </a:xfrm>
-          <a:prstGeom prst="roundRect">
-            <a:avLst/>
-          </a:prstGeom>
-          <a:noFill/>
-        </p:spPr>
-        <p:style>
-          <a:lnRef idx="1">
-            <a:schemeClr val="dk1"/>
-          </a:lnRef>
-          <a:fillRef idx="2">
-            <a:schemeClr val="dk1"/>
-          </a:fillRef>
-          <a:effectRef idx="1">
-            <a:schemeClr val="dk1"/>
-          </a:effectRef>
-          <a:fontRef idx="minor">
-            <a:schemeClr val="dk1"/>
-          </a:fontRef>
-        </p:style>
-        <p:txBody>
-          <a:bodyPr rtlCol="0" anchor="ctr"/>
-          <a:lstStyle/>
-          <a:p>
-            <a:pPr algn="ctr"/>
-            <a:endParaRPr lang="fr-FR"/>
-          </a:p>
-        </p:txBody>
-      </p:sp>
-      <p:sp>
-        <p:nvSpPr>
-          <p:cNvPr id="11" name="Rectangle à coins arrondis 10"/>
-          <p:cNvSpPr/>
-          <p:nvPr/>
-        </p:nvSpPr>
-        <p:spPr>
-          <a:xfrm>
-            <a:off x="5292025" y="3049833"/>
-            <a:ext cx="181470" cy="181549"/>
-          </a:xfrm>
-          <a:prstGeom prst="roundRect">
-            <a:avLst/>
-          </a:prstGeom>
-          <a:noFill/>
-        </p:spPr>
-        <p:style>
-          <a:lnRef idx="1">
-            <a:schemeClr val="dk1"/>
-          </a:lnRef>
-          <a:fillRef idx="2">
-            <a:schemeClr val="dk1"/>
-          </a:fillRef>
-          <a:effectRef idx="1">
-            <a:schemeClr val="dk1"/>
-          </a:effectRef>
-          <a:fontRef idx="minor">
-            <a:schemeClr val="dk1"/>
-          </a:fontRef>
-        </p:style>
-        <p:txBody>
-          <a:bodyPr rtlCol="0" anchor="ctr"/>
-          <a:lstStyle/>
-          <a:p>
-            <a:pPr algn="ctr"/>
-            <a:endParaRPr lang="fr-FR"/>
-          </a:p>
-        </p:txBody>
-      </p:sp>
-      <p:sp>
-        <p:nvSpPr>
-          <p:cNvPr id="12" name="Rectangle à coins arrondis 11"/>
-          <p:cNvSpPr/>
-          <p:nvPr/>
-        </p:nvSpPr>
-        <p:spPr>
-          <a:xfrm>
-            <a:off x="5041694" y="3293007"/>
-            <a:ext cx="181470" cy="181549"/>
-          </a:xfrm>
-          <a:prstGeom prst="roundRect">
-            <a:avLst/>
-          </a:prstGeom>
-          <a:noFill/>
-        </p:spPr>
-        <p:style>
-          <a:lnRef idx="1">
-            <a:schemeClr val="dk1"/>
-          </a:lnRef>
-          <a:fillRef idx="2">
-            <a:schemeClr val="dk1"/>
-          </a:fillRef>
-          <a:effectRef idx="1">
-            <a:schemeClr val="dk1"/>
-          </a:effectRef>
-          <a:fontRef idx="minor">
-            <a:schemeClr val="dk1"/>
-          </a:fontRef>
-        </p:style>
-        <p:txBody>
-          <a:bodyPr rtlCol="0" anchor="ctr"/>
-          <a:lstStyle/>
-          <a:p>
-            <a:pPr algn="ctr"/>
-            <a:endParaRPr lang="fr-FR"/>
-          </a:p>
-        </p:txBody>
-      </p:sp>
-      <p:sp>
-        <p:nvSpPr>
-          <p:cNvPr id="13" name="Rectangle à coins arrondis 12"/>
-          <p:cNvSpPr/>
-          <p:nvPr/>
-        </p:nvSpPr>
-        <p:spPr>
-          <a:xfrm>
-            <a:off x="5292025" y="3293007"/>
-            <a:ext cx="181470" cy="181549"/>
-          </a:xfrm>
-          <a:prstGeom prst="roundRect">
-            <a:avLst/>
-          </a:prstGeom>
-          <a:noFill/>
-        </p:spPr>
-        <p:style>
-          <a:lnRef idx="1">
-            <a:schemeClr val="dk1"/>
-          </a:lnRef>
-          <a:fillRef idx="2">
-            <a:schemeClr val="dk1"/>
-          </a:fillRef>
-          <a:effectRef idx="1">
-            <a:schemeClr val="dk1"/>
-          </a:effectRef>
-          <a:fontRef idx="minor">
-            <a:schemeClr val="dk1"/>
-          </a:fontRef>
-        </p:style>
-        <p:txBody>
-          <a:bodyPr rtlCol="0" anchor="ctr"/>
-          <a:lstStyle/>
-          <a:p>
-            <a:pPr algn="ctr"/>
-            <a:endParaRPr lang="fr-FR"/>
-          </a:p>
-        </p:txBody>
-      </p:sp>
-      <p:sp>
-        <p:nvSpPr>
           <p:cNvPr id="14" name="Flèche droite 13"/>
           <p:cNvSpPr/>
           <p:nvPr/>
         </p:nvSpPr>
         <p:spPr>
           <a:xfrm rot="5400000" flipV="1">
-            <a:off x="4594952" y="1895720"/>
-            <a:ext cx="1074962" cy="741595"/>
+            <a:off x="4498475" y="1992197"/>
+            <a:ext cx="1267917" cy="741595"/>
           </a:xfrm>
           <a:prstGeom prst="rightArrow">
             <a:avLst/>
@@ -5442,7 +6665,6 @@
               <a:rPr lang="fr-FR" sz="9600" b="1" dirty="0"/>
               <a:t>5</a:t>
             </a:r>
-            <a:endParaRPr lang="fr-FR" sz="9600" b="1" dirty="0"/>
           </a:p>
         </p:txBody>
       </p:sp>

</xml_diff>

<commit_message>
Mise à jour du scénario "Participer à un évènement"
</commit_message>
<xml_diff>
--- a/Diagrammes/Scenarios - Schemas.pptx
+++ b/Diagrammes/Scenarios - Schemas.pptx
@@ -5,7 +5,7 @@
     <p:sldMasterId id="2147483648" r:id="rId1"/>
   </p:sldMasterIdLst>
   <p:notesMasterIdLst>
-    <p:notesMasterId r:id="rId18"/>
+    <p:notesMasterId r:id="rId19"/>
   </p:notesMasterIdLst>
   <p:sldIdLst>
     <p:sldId id="256" r:id="rId2"/>
@@ -24,6 +24,7 @@
     <p:sldId id="270" r:id="rId15"/>
     <p:sldId id="271" r:id="rId16"/>
     <p:sldId id="272" r:id="rId17"/>
+    <p:sldId id="273" r:id="rId18"/>
   </p:sldIdLst>
   <p:sldSz cx="9144000" cy="6858000" type="screen4x3"/>
   <p:notesSz cx="6858000" cy="9144000"/>
@@ -207,7 +208,7 @@
           <a:p>
             <a:fld id="{9DC360AA-BC29-41D1-BC41-D450D544EA21}" type="datetimeFigureOut">
               <a:rPr lang="fr-FR" smtClean="0"/>
-              <a:t>05/06/2013</a:t>
+              <a:t>06/06/2013</a:t>
             </a:fld>
             <a:endParaRPr lang="fr-FR"/>
           </a:p>
@@ -1147,6 +1148,90 @@
 </p:notes>
 </file>
 
+<file path=ppt/notesSlides/notesSlide17.xml><?xml version="1.0" encoding="utf-8"?>
+<p:notes xmlns:a="http://schemas.openxmlformats.org/drawingml/2006/main" xmlns:r="http://schemas.openxmlformats.org/officeDocument/2006/relationships" xmlns:p="http://schemas.openxmlformats.org/presentationml/2006/main">
+  <p:cSld>
+    <p:spTree>
+      <p:nvGrpSpPr>
+        <p:cNvPr id="1" name=""/>
+        <p:cNvGrpSpPr/>
+        <p:nvPr/>
+      </p:nvGrpSpPr>
+      <p:grpSpPr>
+        <a:xfrm>
+          <a:off x="0" y="0"/>
+          <a:ext cx="0" cy="0"/>
+          <a:chOff x="0" y="0"/>
+          <a:chExt cx="0" cy="0"/>
+        </a:xfrm>
+      </p:grpSpPr>
+      <p:sp>
+        <p:nvSpPr>
+          <p:cNvPr id="2" name="Espace réservé de l'image des diapositives 1"/>
+          <p:cNvSpPr>
+            <a:spLocks noGrp="1" noRot="1" noChangeAspect="1"/>
+          </p:cNvSpPr>
+          <p:nvPr>
+            <p:ph type="sldImg"/>
+          </p:nvPr>
+        </p:nvSpPr>
+        <p:spPr/>
+      </p:sp>
+      <p:sp>
+        <p:nvSpPr>
+          <p:cNvPr id="3" name="Espace réservé des commentaires 2"/>
+          <p:cNvSpPr>
+            <a:spLocks noGrp="1"/>
+          </p:cNvSpPr>
+          <p:nvPr>
+            <p:ph type="body" idx="1"/>
+          </p:nvPr>
+        </p:nvSpPr>
+        <p:spPr/>
+        <p:txBody>
+          <a:bodyPr/>
+          <a:lstStyle/>
+          <a:p>
+            <a:endParaRPr lang="fr-FR" dirty="0" smtClean="0"/>
+          </a:p>
+        </p:txBody>
+      </p:sp>
+      <p:sp>
+        <p:nvSpPr>
+          <p:cNvPr id="4" name="Espace réservé du numéro de diapositive 3"/>
+          <p:cNvSpPr>
+            <a:spLocks noGrp="1"/>
+          </p:cNvSpPr>
+          <p:nvPr>
+            <p:ph type="sldNum" sz="quarter" idx="10"/>
+          </p:nvPr>
+        </p:nvSpPr>
+        <p:spPr/>
+        <p:txBody>
+          <a:bodyPr/>
+          <a:lstStyle/>
+          <a:p>
+            <a:fld id="{70C5B279-D8FA-4EB8-A0B5-CACAE048C97A}" type="slidenum">
+              <a:rPr lang="fr-FR" smtClean="0"/>
+              <a:t>17</a:t>
+            </a:fld>
+            <a:endParaRPr lang="fr-FR"/>
+          </a:p>
+        </p:txBody>
+      </p:sp>
+    </p:spTree>
+    <p:extLst>
+      <p:ext uri="{BB962C8B-B14F-4D97-AF65-F5344CB8AC3E}">
+        <p14:creationId xmlns:p14="http://schemas.microsoft.com/office/powerpoint/2010/main" val="2110943"/>
+      </p:ext>
+    </p:extLst>
+  </p:cSld>
+  <p:clrMapOvr>
+    <a:masterClrMapping/>
+  </p:clrMapOvr>
+</p:notes>
+</file>
+
 <file path=ppt/notesSlides/notesSlide2.xml><?xml version="1.0" encoding="utf-8"?>
 <p:notes xmlns:a="http://schemas.openxmlformats.org/drawingml/2006/main" xmlns:r="http://schemas.openxmlformats.org/officeDocument/2006/relationships" xmlns:p="http://schemas.openxmlformats.org/presentationml/2006/main">
   <p:cSld>
@@ -2017,7 +2102,7 @@
           <a:p>
             <a:fld id="{ADD8993A-F23A-49CB-BEF1-B5681606AAB7}" type="datetimeFigureOut">
               <a:rPr lang="fr-FR" smtClean="0"/>
-              <a:t>05/06/2013</a:t>
+              <a:t>06/06/2013</a:t>
             </a:fld>
             <a:endParaRPr lang="fr-FR"/>
           </a:p>
@@ -2187,7 +2272,7 @@
           <a:p>
             <a:fld id="{ADD8993A-F23A-49CB-BEF1-B5681606AAB7}" type="datetimeFigureOut">
               <a:rPr lang="fr-FR" smtClean="0"/>
-              <a:t>05/06/2013</a:t>
+              <a:t>06/06/2013</a:t>
             </a:fld>
             <a:endParaRPr lang="fr-FR"/>
           </a:p>
@@ -2367,7 +2452,7 @@
           <a:p>
             <a:fld id="{ADD8993A-F23A-49CB-BEF1-B5681606AAB7}" type="datetimeFigureOut">
               <a:rPr lang="fr-FR" smtClean="0"/>
-              <a:t>05/06/2013</a:t>
+              <a:t>06/06/2013</a:t>
             </a:fld>
             <a:endParaRPr lang="fr-FR"/>
           </a:p>
@@ -2537,7 +2622,7 @@
           <a:p>
             <a:fld id="{ADD8993A-F23A-49CB-BEF1-B5681606AAB7}" type="datetimeFigureOut">
               <a:rPr lang="fr-FR" smtClean="0"/>
-              <a:t>05/06/2013</a:t>
+              <a:t>06/06/2013</a:t>
             </a:fld>
             <a:endParaRPr lang="fr-FR"/>
           </a:p>
@@ -2783,7 +2868,7 @@
           <a:p>
             <a:fld id="{ADD8993A-F23A-49CB-BEF1-B5681606AAB7}" type="datetimeFigureOut">
               <a:rPr lang="fr-FR" smtClean="0"/>
-              <a:t>05/06/2013</a:t>
+              <a:t>06/06/2013</a:t>
             </a:fld>
             <a:endParaRPr lang="fr-FR"/>
           </a:p>
@@ -3071,7 +3156,7 @@
           <a:p>
             <a:fld id="{ADD8993A-F23A-49CB-BEF1-B5681606AAB7}" type="datetimeFigureOut">
               <a:rPr lang="fr-FR" smtClean="0"/>
-              <a:t>05/06/2013</a:t>
+              <a:t>06/06/2013</a:t>
             </a:fld>
             <a:endParaRPr lang="fr-FR"/>
           </a:p>
@@ -3493,7 +3578,7 @@
           <a:p>
             <a:fld id="{ADD8993A-F23A-49CB-BEF1-B5681606AAB7}" type="datetimeFigureOut">
               <a:rPr lang="fr-FR" smtClean="0"/>
-              <a:t>05/06/2013</a:t>
+              <a:t>06/06/2013</a:t>
             </a:fld>
             <a:endParaRPr lang="fr-FR"/>
           </a:p>
@@ -3611,7 +3696,7 @@
           <a:p>
             <a:fld id="{ADD8993A-F23A-49CB-BEF1-B5681606AAB7}" type="datetimeFigureOut">
               <a:rPr lang="fr-FR" smtClean="0"/>
-              <a:t>05/06/2013</a:t>
+              <a:t>06/06/2013</a:t>
             </a:fld>
             <a:endParaRPr lang="fr-FR"/>
           </a:p>
@@ -3706,7 +3791,7 @@
           <a:p>
             <a:fld id="{ADD8993A-F23A-49CB-BEF1-B5681606AAB7}" type="datetimeFigureOut">
               <a:rPr lang="fr-FR" smtClean="0"/>
-              <a:t>05/06/2013</a:t>
+              <a:t>06/06/2013</a:t>
             </a:fld>
             <a:endParaRPr lang="fr-FR"/>
           </a:p>
@@ -3983,7 +4068,7 @@
           <a:p>
             <a:fld id="{ADD8993A-F23A-49CB-BEF1-B5681606AAB7}" type="datetimeFigureOut">
               <a:rPr lang="fr-FR" smtClean="0"/>
-              <a:t>05/06/2013</a:t>
+              <a:t>06/06/2013</a:t>
             </a:fld>
             <a:endParaRPr lang="fr-FR"/>
           </a:p>
@@ -4236,7 +4321,7 @@
           <a:p>
             <a:fld id="{ADD8993A-F23A-49CB-BEF1-B5681606AAB7}" type="datetimeFigureOut">
               <a:rPr lang="fr-FR" smtClean="0"/>
-              <a:t>05/06/2013</a:t>
+              <a:t>06/06/2013</a:t>
             </a:fld>
             <a:endParaRPr lang="fr-FR"/>
           </a:p>
@@ -4449,7 +4534,7 @@
           <a:p>
             <a:fld id="{ADD8993A-F23A-49CB-BEF1-B5681606AAB7}" type="datetimeFigureOut">
               <a:rPr lang="fr-FR" smtClean="0"/>
-              <a:t>05/06/2013</a:t>
+              <a:t>06/06/2013</a:t>
             </a:fld>
             <a:endParaRPr lang="fr-FR"/>
           </a:p>
@@ -5628,7 +5713,6 @@
               <a:rPr lang="fr-FR" sz="9600" b="1" dirty="0"/>
               <a:t>1</a:t>
             </a:r>
-            <a:endParaRPr lang="fr-FR" sz="9600" b="1" dirty="0"/>
           </a:p>
         </p:txBody>
       </p:sp>
@@ -5865,7 +5949,6 @@
               <a:rPr lang="fr-FR" sz="9600" b="1" dirty="0"/>
               <a:t>3</a:t>
             </a:r>
-            <a:endParaRPr lang="fr-FR" sz="9600" b="1" dirty="0"/>
           </a:p>
         </p:txBody>
       </p:sp>
@@ -5914,6 +5997,125 @@
     <p:extLst>
       <p:ext uri="{BB962C8B-B14F-4D97-AF65-F5344CB8AC3E}">
         <p14:creationId xmlns:p14="http://schemas.microsoft.com/office/powerpoint/2010/main" val="3214738338"/>
+      </p:ext>
+    </p:extLst>
+  </p:cSld>
+  <p:clrMapOvr>
+    <a:masterClrMapping/>
+  </p:clrMapOvr>
+</p:sld>
+</file>
+
+<file path=ppt/slides/slide17.xml><?xml version="1.0" encoding="utf-8"?>
+<p:sld xmlns:a="http://schemas.openxmlformats.org/drawingml/2006/main" xmlns:r="http://schemas.openxmlformats.org/officeDocument/2006/relationships" xmlns:p="http://schemas.openxmlformats.org/presentationml/2006/main">
+  <p:cSld>
+    <p:spTree>
+      <p:nvGrpSpPr>
+        <p:cNvPr id="1" name=""/>
+        <p:cNvGrpSpPr/>
+        <p:nvPr/>
+      </p:nvGrpSpPr>
+      <p:grpSpPr>
+        <a:xfrm>
+          <a:off x="0" y="0"/>
+          <a:ext cx="0" cy="0"/>
+          <a:chOff x="0" y="0"/>
+          <a:chExt cx="0" cy="0"/>
+        </a:xfrm>
+      </p:grpSpPr>
+      <p:sp>
+        <p:nvSpPr>
+          <p:cNvPr id="4" name="Ellipse 3"/>
+          <p:cNvSpPr/>
+          <p:nvPr/>
+        </p:nvSpPr>
+        <p:spPr>
+          <a:xfrm>
+            <a:off x="3986436" y="4781229"/>
+            <a:ext cx="1218056" cy="1218056"/>
+          </a:xfrm>
+          <a:prstGeom prst="ellipse">
+            <a:avLst/>
+          </a:prstGeom>
+          <a:noFill/>
+          <a:ln w="76200">
+            <a:solidFill>
+              <a:schemeClr val="tx1"/>
+            </a:solidFill>
+          </a:ln>
+        </p:spPr>
+        <p:style>
+          <a:lnRef idx="1">
+            <a:schemeClr val="dk1"/>
+          </a:lnRef>
+          <a:fillRef idx="2">
+            <a:schemeClr val="dk1"/>
+          </a:fillRef>
+          <a:effectRef idx="1">
+            <a:schemeClr val="dk1"/>
+          </a:effectRef>
+          <a:fontRef idx="minor">
+            <a:schemeClr val="dk1"/>
+          </a:fontRef>
+        </p:style>
+        <p:txBody>
+          <a:bodyPr rtlCol="0" anchor="ctr"/>
+          <a:lstStyle/>
+          <a:p>
+            <a:pPr algn="ctr"/>
+            <a:r>
+              <a:rPr lang="fr-FR" sz="9600" b="1" dirty="0"/>
+              <a:t>4</a:t>
+            </a:r>
+            <a:endParaRPr lang="fr-FR" sz="9600" b="1" dirty="0"/>
+          </a:p>
+        </p:txBody>
+      </p:sp>
+      <p:pic>
+        <p:nvPicPr>
+          <p:cNvPr id="4098" name="Picture 2" descr="C:\Users\Jeremie\Documents\Etudes\2011-2013 - UTT\Semestre 5\IF11\Projet\Maquettes\Prototype\calcul_itineraire_modifiee.png"/>
+          <p:cNvPicPr>
+            <a:picLocks noChangeAspect="1" noChangeArrowheads="1"/>
+          </p:cNvPicPr>
+          <p:nvPr/>
+        </p:nvPicPr>
+        <p:blipFill>
+          <a:blip r:embed="rId3">
+            <a:extLst>
+              <a:ext uri="{28A0092B-C50C-407E-A947-70E740481C1C}">
+                <a14:useLocalDpi xmlns:a14="http://schemas.microsoft.com/office/drawing/2010/main" val="0"/>
+              </a:ext>
+            </a:extLst>
+          </a:blip>
+          <a:srcRect/>
+          <a:stretch>
+            <a:fillRect/>
+          </a:stretch>
+        </p:blipFill>
+        <p:spPr bwMode="auto">
+          <a:xfrm>
+            <a:off x="3594726" y="830048"/>
+            <a:ext cx="2001476" cy="3600000"/>
+          </a:xfrm>
+          <a:prstGeom prst="rect">
+            <a:avLst/>
+          </a:prstGeom>
+          <a:noFill/>
+          <a:extLst>
+            <a:ext uri="{909E8E84-426E-40DD-AFC4-6F175D3DCCD1}">
+              <a14:hiddenFill xmlns:a14="http://schemas.microsoft.com/office/drawing/2010/main">
+                <a:solidFill>
+                  <a:srgbClr val="FFFFFF"/>
+                </a:solidFill>
+              </a14:hiddenFill>
+            </a:ext>
+          </a:extLst>
+        </p:spPr>
+      </p:pic>
+    </p:spTree>
+    <p:extLst>
+      <p:ext uri="{BB962C8B-B14F-4D97-AF65-F5344CB8AC3E}">
+        <p14:creationId xmlns:p14="http://schemas.microsoft.com/office/powerpoint/2010/main" val="153695294"/>
       </p:ext>
     </p:extLst>
   </p:cSld>

</xml_diff>